<commit_message>
replace with the new schematic
</commit_message>
<xml_diff>
--- a/VEEPortingGuide/images/mjvm_gt.pptx
+++ b/VEEPortingGuide/images/mjvm_gt.pptx
@@ -104,6 +104,11 @@
       </a:defRPr>
     </a:lvl9pPr>
   </p:defaultTextStyle>
+  <p:extLst>
+    <p:ext uri="{EFAFB233-063F-42B5-8137-9DF3F51BA10A}">
+      <p15:sldGuideLst xmlns:p15="http://schemas.microsoft.com/office/powerpoint/2012/main"/>
+    </p:ext>
+  </p:extLst>
 </p:presentation>
 </file>
 
@@ -129,7 +134,7 @@
           <p:cNvPr id="2" name="Title 1">
             <a:extLst>
               <a:ext uri="{FF2B5EF4-FFF2-40B4-BE49-F238E27FC236}">
-                <a16:creationId xmlns:a16="http://schemas.microsoft.com/office/drawing/2014/main" id="{36D501D0-571E-4187-BCA8-1BB8997AE7B1}"/>
+                <a16:creationId xmlns:a16="http://schemas.microsoft.com/office/drawing/2014/main" xmlns="" id="{36D501D0-571E-4187-BCA8-1BB8997AE7B1}"/>
               </a:ext>
             </a:extLst>
           </p:cNvPr>
@@ -167,7 +172,7 @@
           <p:cNvPr id="3" name="Subtitle 2">
             <a:extLst>
               <a:ext uri="{FF2B5EF4-FFF2-40B4-BE49-F238E27FC236}">
-                <a16:creationId xmlns:a16="http://schemas.microsoft.com/office/drawing/2014/main" id="{80591CFA-63BD-4829-9528-9296AF0C6993}"/>
+                <a16:creationId xmlns:a16="http://schemas.microsoft.com/office/drawing/2014/main" xmlns="" id="{80591CFA-63BD-4829-9528-9296AF0C6993}"/>
               </a:ext>
             </a:extLst>
           </p:cNvPr>
@@ -238,7 +243,7 @@
           <p:cNvPr id="4" name="Date Placeholder 3">
             <a:extLst>
               <a:ext uri="{FF2B5EF4-FFF2-40B4-BE49-F238E27FC236}">
-                <a16:creationId xmlns:a16="http://schemas.microsoft.com/office/drawing/2014/main" id="{EE6262B1-606A-46B6-B7BB-DF431A86E3BE}"/>
+                <a16:creationId xmlns:a16="http://schemas.microsoft.com/office/drawing/2014/main" xmlns="" id="{EE6262B1-606A-46B6-B7BB-DF431A86E3BE}"/>
               </a:ext>
             </a:extLst>
           </p:cNvPr>
@@ -256,7 +261,7 @@
           <a:p>
             <a:fld id="{2EF1CE80-3B0F-4FF4-8DDD-D91053D20B5D}" type="datetimeFigureOut">
               <a:rPr lang="en-GB" smtClean="0"/>
-              <a:t>19/03/2020</a:t>
+              <a:t>11/05/2023</a:t>
             </a:fld>
             <a:endParaRPr lang="en-GB"/>
           </a:p>
@@ -267,7 +272,7 @@
           <p:cNvPr id="5" name="Footer Placeholder 4">
             <a:extLst>
               <a:ext uri="{FF2B5EF4-FFF2-40B4-BE49-F238E27FC236}">
-                <a16:creationId xmlns:a16="http://schemas.microsoft.com/office/drawing/2014/main" id="{0CB4C543-0059-4BF9-A0C0-6C43C9EF4428}"/>
+                <a16:creationId xmlns:a16="http://schemas.microsoft.com/office/drawing/2014/main" xmlns="" id="{0CB4C543-0059-4BF9-A0C0-6C43C9EF4428}"/>
               </a:ext>
             </a:extLst>
           </p:cNvPr>
@@ -292,7 +297,7 @@
           <p:cNvPr id="6" name="Slide Number Placeholder 5">
             <a:extLst>
               <a:ext uri="{FF2B5EF4-FFF2-40B4-BE49-F238E27FC236}">
-                <a16:creationId xmlns:a16="http://schemas.microsoft.com/office/drawing/2014/main" id="{B5DA5201-30BA-40A6-ABBF-327ED21C103B}"/>
+                <a16:creationId xmlns:a16="http://schemas.microsoft.com/office/drawing/2014/main" xmlns="" id="{B5DA5201-30BA-40A6-ABBF-327ED21C103B}"/>
               </a:ext>
             </a:extLst>
           </p:cNvPr>
@@ -351,7 +356,7 @@
           <p:cNvPr id="2" name="Title 1">
             <a:extLst>
               <a:ext uri="{FF2B5EF4-FFF2-40B4-BE49-F238E27FC236}">
-                <a16:creationId xmlns:a16="http://schemas.microsoft.com/office/drawing/2014/main" id="{8AEC602F-2F6C-4D56-B28B-4F0C4E1818E6}"/>
+                <a16:creationId xmlns:a16="http://schemas.microsoft.com/office/drawing/2014/main" xmlns="" id="{8AEC602F-2F6C-4D56-B28B-4F0C4E1818E6}"/>
               </a:ext>
             </a:extLst>
           </p:cNvPr>
@@ -380,7 +385,7 @@
           <p:cNvPr id="3" name="Vertical Text Placeholder 2">
             <a:extLst>
               <a:ext uri="{FF2B5EF4-FFF2-40B4-BE49-F238E27FC236}">
-                <a16:creationId xmlns:a16="http://schemas.microsoft.com/office/drawing/2014/main" id="{3AD6F418-54B4-4A68-84D3-F34452DF08D7}"/>
+                <a16:creationId xmlns:a16="http://schemas.microsoft.com/office/drawing/2014/main" xmlns="" id="{3AD6F418-54B4-4A68-84D3-F34452DF08D7}"/>
               </a:ext>
             </a:extLst>
           </p:cNvPr>
@@ -438,7 +443,7 @@
           <p:cNvPr id="4" name="Date Placeholder 3">
             <a:extLst>
               <a:ext uri="{FF2B5EF4-FFF2-40B4-BE49-F238E27FC236}">
-                <a16:creationId xmlns:a16="http://schemas.microsoft.com/office/drawing/2014/main" id="{7D4DF722-EC70-4666-A88A-8986079526F9}"/>
+                <a16:creationId xmlns:a16="http://schemas.microsoft.com/office/drawing/2014/main" xmlns="" id="{7D4DF722-EC70-4666-A88A-8986079526F9}"/>
               </a:ext>
             </a:extLst>
           </p:cNvPr>
@@ -456,7 +461,7 @@
           <a:p>
             <a:fld id="{2EF1CE80-3B0F-4FF4-8DDD-D91053D20B5D}" type="datetimeFigureOut">
               <a:rPr lang="en-GB" smtClean="0"/>
-              <a:t>19/03/2020</a:t>
+              <a:t>11/05/2023</a:t>
             </a:fld>
             <a:endParaRPr lang="en-GB"/>
           </a:p>
@@ -467,7 +472,7 @@
           <p:cNvPr id="5" name="Footer Placeholder 4">
             <a:extLst>
               <a:ext uri="{FF2B5EF4-FFF2-40B4-BE49-F238E27FC236}">
-                <a16:creationId xmlns:a16="http://schemas.microsoft.com/office/drawing/2014/main" id="{67B39934-1208-4257-96DC-C9B7678B2F15}"/>
+                <a16:creationId xmlns:a16="http://schemas.microsoft.com/office/drawing/2014/main" xmlns="" id="{67B39934-1208-4257-96DC-C9B7678B2F15}"/>
               </a:ext>
             </a:extLst>
           </p:cNvPr>
@@ -492,7 +497,7 @@
           <p:cNvPr id="6" name="Slide Number Placeholder 5">
             <a:extLst>
               <a:ext uri="{FF2B5EF4-FFF2-40B4-BE49-F238E27FC236}">
-                <a16:creationId xmlns:a16="http://schemas.microsoft.com/office/drawing/2014/main" id="{289693F1-DB37-4C25-92FB-2CBD54ECE831}"/>
+                <a16:creationId xmlns:a16="http://schemas.microsoft.com/office/drawing/2014/main" xmlns="" id="{289693F1-DB37-4C25-92FB-2CBD54ECE831}"/>
               </a:ext>
             </a:extLst>
           </p:cNvPr>
@@ -551,7 +556,7 @@
           <p:cNvPr id="2" name="Vertical Title 1">
             <a:extLst>
               <a:ext uri="{FF2B5EF4-FFF2-40B4-BE49-F238E27FC236}">
-                <a16:creationId xmlns:a16="http://schemas.microsoft.com/office/drawing/2014/main" id="{BA78D753-47EF-420F-ADA2-6B4295817C40}"/>
+                <a16:creationId xmlns:a16="http://schemas.microsoft.com/office/drawing/2014/main" xmlns="" id="{BA78D753-47EF-420F-ADA2-6B4295817C40}"/>
               </a:ext>
             </a:extLst>
           </p:cNvPr>
@@ -585,7 +590,7 @@
           <p:cNvPr id="3" name="Vertical Text Placeholder 2">
             <a:extLst>
               <a:ext uri="{FF2B5EF4-FFF2-40B4-BE49-F238E27FC236}">
-                <a16:creationId xmlns:a16="http://schemas.microsoft.com/office/drawing/2014/main" id="{FAB39BC0-D1FE-440F-863E-AED78ECF58DF}"/>
+                <a16:creationId xmlns:a16="http://schemas.microsoft.com/office/drawing/2014/main" xmlns="" id="{FAB39BC0-D1FE-440F-863E-AED78ECF58DF}"/>
               </a:ext>
             </a:extLst>
           </p:cNvPr>
@@ -648,7 +653,7 @@
           <p:cNvPr id="4" name="Date Placeholder 3">
             <a:extLst>
               <a:ext uri="{FF2B5EF4-FFF2-40B4-BE49-F238E27FC236}">
-                <a16:creationId xmlns:a16="http://schemas.microsoft.com/office/drawing/2014/main" id="{18332DAA-DFE6-42AA-943E-70A2B13A9D29}"/>
+                <a16:creationId xmlns:a16="http://schemas.microsoft.com/office/drawing/2014/main" xmlns="" id="{18332DAA-DFE6-42AA-943E-70A2B13A9D29}"/>
               </a:ext>
             </a:extLst>
           </p:cNvPr>
@@ -666,7 +671,7 @@
           <a:p>
             <a:fld id="{2EF1CE80-3B0F-4FF4-8DDD-D91053D20B5D}" type="datetimeFigureOut">
               <a:rPr lang="en-GB" smtClean="0"/>
-              <a:t>19/03/2020</a:t>
+              <a:t>11/05/2023</a:t>
             </a:fld>
             <a:endParaRPr lang="en-GB"/>
           </a:p>
@@ -677,7 +682,7 @@
           <p:cNvPr id="5" name="Footer Placeholder 4">
             <a:extLst>
               <a:ext uri="{FF2B5EF4-FFF2-40B4-BE49-F238E27FC236}">
-                <a16:creationId xmlns:a16="http://schemas.microsoft.com/office/drawing/2014/main" id="{9D36BF86-5E60-4BC8-96FD-383075D77663}"/>
+                <a16:creationId xmlns:a16="http://schemas.microsoft.com/office/drawing/2014/main" xmlns="" id="{9D36BF86-5E60-4BC8-96FD-383075D77663}"/>
               </a:ext>
             </a:extLst>
           </p:cNvPr>
@@ -702,7 +707,7 @@
           <p:cNvPr id="6" name="Slide Number Placeholder 5">
             <a:extLst>
               <a:ext uri="{FF2B5EF4-FFF2-40B4-BE49-F238E27FC236}">
-                <a16:creationId xmlns:a16="http://schemas.microsoft.com/office/drawing/2014/main" id="{D1CA54EC-FDDC-4557-9EC3-D24B83C13ECE}"/>
+                <a16:creationId xmlns:a16="http://schemas.microsoft.com/office/drawing/2014/main" xmlns="" id="{D1CA54EC-FDDC-4557-9EC3-D24B83C13ECE}"/>
               </a:ext>
             </a:extLst>
           </p:cNvPr>
@@ -761,7 +766,7 @@
           <p:cNvPr id="2" name="Title 1">
             <a:extLst>
               <a:ext uri="{FF2B5EF4-FFF2-40B4-BE49-F238E27FC236}">
-                <a16:creationId xmlns:a16="http://schemas.microsoft.com/office/drawing/2014/main" id="{ABF315A5-18F6-4EED-B34D-894672AC94FC}"/>
+                <a16:creationId xmlns:a16="http://schemas.microsoft.com/office/drawing/2014/main" xmlns="" id="{ABF315A5-18F6-4EED-B34D-894672AC94FC}"/>
               </a:ext>
             </a:extLst>
           </p:cNvPr>
@@ -790,7 +795,7 @@
           <p:cNvPr id="3" name="Content Placeholder 2">
             <a:extLst>
               <a:ext uri="{FF2B5EF4-FFF2-40B4-BE49-F238E27FC236}">
-                <a16:creationId xmlns:a16="http://schemas.microsoft.com/office/drawing/2014/main" id="{BBE2DD86-4C58-4C3C-AF96-B9B1746330DB}"/>
+                <a16:creationId xmlns:a16="http://schemas.microsoft.com/office/drawing/2014/main" xmlns="" id="{BBE2DD86-4C58-4C3C-AF96-B9B1746330DB}"/>
               </a:ext>
             </a:extLst>
           </p:cNvPr>
@@ -848,7 +853,7 @@
           <p:cNvPr id="4" name="Date Placeholder 3">
             <a:extLst>
               <a:ext uri="{FF2B5EF4-FFF2-40B4-BE49-F238E27FC236}">
-                <a16:creationId xmlns:a16="http://schemas.microsoft.com/office/drawing/2014/main" id="{E1C4AFE4-3EBC-47C8-ACE6-40D13D592203}"/>
+                <a16:creationId xmlns:a16="http://schemas.microsoft.com/office/drawing/2014/main" xmlns="" id="{E1C4AFE4-3EBC-47C8-ACE6-40D13D592203}"/>
               </a:ext>
             </a:extLst>
           </p:cNvPr>
@@ -866,7 +871,7 @@
           <a:p>
             <a:fld id="{2EF1CE80-3B0F-4FF4-8DDD-D91053D20B5D}" type="datetimeFigureOut">
               <a:rPr lang="en-GB" smtClean="0"/>
-              <a:t>19/03/2020</a:t>
+              <a:t>11/05/2023</a:t>
             </a:fld>
             <a:endParaRPr lang="en-GB"/>
           </a:p>
@@ -877,7 +882,7 @@
           <p:cNvPr id="5" name="Footer Placeholder 4">
             <a:extLst>
               <a:ext uri="{FF2B5EF4-FFF2-40B4-BE49-F238E27FC236}">
-                <a16:creationId xmlns:a16="http://schemas.microsoft.com/office/drawing/2014/main" id="{0814F7E3-03A9-4261-B877-5B64A9C945A2}"/>
+                <a16:creationId xmlns:a16="http://schemas.microsoft.com/office/drawing/2014/main" xmlns="" id="{0814F7E3-03A9-4261-B877-5B64A9C945A2}"/>
               </a:ext>
             </a:extLst>
           </p:cNvPr>
@@ -902,7 +907,7 @@
           <p:cNvPr id="6" name="Slide Number Placeholder 5">
             <a:extLst>
               <a:ext uri="{FF2B5EF4-FFF2-40B4-BE49-F238E27FC236}">
-                <a16:creationId xmlns:a16="http://schemas.microsoft.com/office/drawing/2014/main" id="{8145E5D0-D3A7-492A-B378-863ACE9DF26C}"/>
+                <a16:creationId xmlns:a16="http://schemas.microsoft.com/office/drawing/2014/main" xmlns="" id="{8145E5D0-D3A7-492A-B378-863ACE9DF26C}"/>
               </a:ext>
             </a:extLst>
           </p:cNvPr>
@@ -961,7 +966,7 @@
           <p:cNvPr id="2" name="Title 1">
             <a:extLst>
               <a:ext uri="{FF2B5EF4-FFF2-40B4-BE49-F238E27FC236}">
-                <a16:creationId xmlns:a16="http://schemas.microsoft.com/office/drawing/2014/main" id="{16C9BF5C-88FD-4100-8537-F2107F2C98BA}"/>
+                <a16:creationId xmlns:a16="http://schemas.microsoft.com/office/drawing/2014/main" xmlns="" id="{16C9BF5C-88FD-4100-8537-F2107F2C98BA}"/>
               </a:ext>
             </a:extLst>
           </p:cNvPr>
@@ -999,7 +1004,7 @@
           <p:cNvPr id="3" name="Text Placeholder 2">
             <a:extLst>
               <a:ext uri="{FF2B5EF4-FFF2-40B4-BE49-F238E27FC236}">
-                <a16:creationId xmlns:a16="http://schemas.microsoft.com/office/drawing/2014/main" id="{AD0762D1-300C-444C-92C3-4C6E38572FB1}"/>
+                <a16:creationId xmlns:a16="http://schemas.microsoft.com/office/drawing/2014/main" xmlns="" id="{AD0762D1-300C-444C-92C3-4C6E38572FB1}"/>
               </a:ext>
             </a:extLst>
           </p:cNvPr>
@@ -1124,7 +1129,7 @@
           <p:cNvPr id="4" name="Date Placeholder 3">
             <a:extLst>
               <a:ext uri="{FF2B5EF4-FFF2-40B4-BE49-F238E27FC236}">
-                <a16:creationId xmlns:a16="http://schemas.microsoft.com/office/drawing/2014/main" id="{E7414B98-53D5-4764-86DC-83434412BE6D}"/>
+                <a16:creationId xmlns:a16="http://schemas.microsoft.com/office/drawing/2014/main" xmlns="" id="{E7414B98-53D5-4764-86DC-83434412BE6D}"/>
               </a:ext>
             </a:extLst>
           </p:cNvPr>
@@ -1142,7 +1147,7 @@
           <a:p>
             <a:fld id="{2EF1CE80-3B0F-4FF4-8DDD-D91053D20B5D}" type="datetimeFigureOut">
               <a:rPr lang="en-GB" smtClean="0"/>
-              <a:t>19/03/2020</a:t>
+              <a:t>11/05/2023</a:t>
             </a:fld>
             <a:endParaRPr lang="en-GB"/>
           </a:p>
@@ -1153,7 +1158,7 @@
           <p:cNvPr id="5" name="Footer Placeholder 4">
             <a:extLst>
               <a:ext uri="{FF2B5EF4-FFF2-40B4-BE49-F238E27FC236}">
-                <a16:creationId xmlns:a16="http://schemas.microsoft.com/office/drawing/2014/main" id="{E79B5D51-3C37-40C3-A63B-079F55A97EDD}"/>
+                <a16:creationId xmlns:a16="http://schemas.microsoft.com/office/drawing/2014/main" xmlns="" id="{E79B5D51-3C37-40C3-A63B-079F55A97EDD}"/>
               </a:ext>
             </a:extLst>
           </p:cNvPr>
@@ -1178,7 +1183,7 @@
           <p:cNvPr id="6" name="Slide Number Placeholder 5">
             <a:extLst>
               <a:ext uri="{FF2B5EF4-FFF2-40B4-BE49-F238E27FC236}">
-                <a16:creationId xmlns:a16="http://schemas.microsoft.com/office/drawing/2014/main" id="{52CE64CC-6A09-4698-A88D-1EB5727E0A79}"/>
+                <a16:creationId xmlns:a16="http://schemas.microsoft.com/office/drawing/2014/main" xmlns="" id="{52CE64CC-6A09-4698-A88D-1EB5727E0A79}"/>
               </a:ext>
             </a:extLst>
           </p:cNvPr>
@@ -1237,7 +1242,7 @@
           <p:cNvPr id="2" name="Title 1">
             <a:extLst>
               <a:ext uri="{FF2B5EF4-FFF2-40B4-BE49-F238E27FC236}">
-                <a16:creationId xmlns:a16="http://schemas.microsoft.com/office/drawing/2014/main" id="{E6964362-D305-4FE2-9CE7-34ADCE8163C1}"/>
+                <a16:creationId xmlns:a16="http://schemas.microsoft.com/office/drawing/2014/main" xmlns="" id="{E6964362-D305-4FE2-9CE7-34ADCE8163C1}"/>
               </a:ext>
             </a:extLst>
           </p:cNvPr>
@@ -1266,7 +1271,7 @@
           <p:cNvPr id="3" name="Content Placeholder 2">
             <a:extLst>
               <a:ext uri="{FF2B5EF4-FFF2-40B4-BE49-F238E27FC236}">
-                <a16:creationId xmlns:a16="http://schemas.microsoft.com/office/drawing/2014/main" id="{FEB8B7AF-7134-4717-AB87-110651B4F920}"/>
+                <a16:creationId xmlns:a16="http://schemas.microsoft.com/office/drawing/2014/main" xmlns="" id="{FEB8B7AF-7134-4717-AB87-110651B4F920}"/>
               </a:ext>
             </a:extLst>
           </p:cNvPr>
@@ -1329,7 +1334,7 @@
           <p:cNvPr id="4" name="Content Placeholder 3">
             <a:extLst>
               <a:ext uri="{FF2B5EF4-FFF2-40B4-BE49-F238E27FC236}">
-                <a16:creationId xmlns:a16="http://schemas.microsoft.com/office/drawing/2014/main" id="{8336237F-0934-4C4D-BA3C-56BD560D35E9}"/>
+                <a16:creationId xmlns:a16="http://schemas.microsoft.com/office/drawing/2014/main" xmlns="" id="{8336237F-0934-4C4D-BA3C-56BD560D35E9}"/>
               </a:ext>
             </a:extLst>
           </p:cNvPr>
@@ -1392,7 +1397,7 @@
           <p:cNvPr id="5" name="Date Placeholder 4">
             <a:extLst>
               <a:ext uri="{FF2B5EF4-FFF2-40B4-BE49-F238E27FC236}">
-                <a16:creationId xmlns:a16="http://schemas.microsoft.com/office/drawing/2014/main" id="{B743127B-6C70-4AC7-88EB-715891A073A4}"/>
+                <a16:creationId xmlns:a16="http://schemas.microsoft.com/office/drawing/2014/main" xmlns="" id="{B743127B-6C70-4AC7-88EB-715891A073A4}"/>
               </a:ext>
             </a:extLst>
           </p:cNvPr>
@@ -1410,7 +1415,7 @@
           <a:p>
             <a:fld id="{2EF1CE80-3B0F-4FF4-8DDD-D91053D20B5D}" type="datetimeFigureOut">
               <a:rPr lang="en-GB" smtClean="0"/>
-              <a:t>19/03/2020</a:t>
+              <a:t>11/05/2023</a:t>
             </a:fld>
             <a:endParaRPr lang="en-GB"/>
           </a:p>
@@ -1421,7 +1426,7 @@
           <p:cNvPr id="6" name="Footer Placeholder 5">
             <a:extLst>
               <a:ext uri="{FF2B5EF4-FFF2-40B4-BE49-F238E27FC236}">
-                <a16:creationId xmlns:a16="http://schemas.microsoft.com/office/drawing/2014/main" id="{BCDE2958-3B39-42CA-9882-25A856AE160B}"/>
+                <a16:creationId xmlns:a16="http://schemas.microsoft.com/office/drawing/2014/main" xmlns="" id="{BCDE2958-3B39-42CA-9882-25A856AE160B}"/>
               </a:ext>
             </a:extLst>
           </p:cNvPr>
@@ -1446,7 +1451,7 @@
           <p:cNvPr id="7" name="Slide Number Placeholder 6">
             <a:extLst>
               <a:ext uri="{FF2B5EF4-FFF2-40B4-BE49-F238E27FC236}">
-                <a16:creationId xmlns:a16="http://schemas.microsoft.com/office/drawing/2014/main" id="{FCE38453-5BDB-4397-9AEF-19E3217E93F2}"/>
+                <a16:creationId xmlns:a16="http://schemas.microsoft.com/office/drawing/2014/main" xmlns="" id="{FCE38453-5BDB-4397-9AEF-19E3217E93F2}"/>
               </a:ext>
             </a:extLst>
           </p:cNvPr>
@@ -1505,7 +1510,7 @@
           <p:cNvPr id="2" name="Title 1">
             <a:extLst>
               <a:ext uri="{FF2B5EF4-FFF2-40B4-BE49-F238E27FC236}">
-                <a16:creationId xmlns:a16="http://schemas.microsoft.com/office/drawing/2014/main" id="{A8B08CE1-60F1-46C4-ADC0-B8E3EAF816A9}"/>
+                <a16:creationId xmlns:a16="http://schemas.microsoft.com/office/drawing/2014/main" xmlns="" id="{A8B08CE1-60F1-46C4-ADC0-B8E3EAF816A9}"/>
               </a:ext>
             </a:extLst>
           </p:cNvPr>
@@ -1539,7 +1544,7 @@
           <p:cNvPr id="3" name="Text Placeholder 2">
             <a:extLst>
               <a:ext uri="{FF2B5EF4-FFF2-40B4-BE49-F238E27FC236}">
-                <a16:creationId xmlns:a16="http://schemas.microsoft.com/office/drawing/2014/main" id="{EC27F180-05B2-4A9F-A2E0-50511BDC5012}"/>
+                <a16:creationId xmlns:a16="http://schemas.microsoft.com/office/drawing/2014/main" xmlns="" id="{EC27F180-05B2-4A9F-A2E0-50511BDC5012}"/>
               </a:ext>
             </a:extLst>
           </p:cNvPr>
@@ -1610,7 +1615,7 @@
           <p:cNvPr id="4" name="Content Placeholder 3">
             <a:extLst>
               <a:ext uri="{FF2B5EF4-FFF2-40B4-BE49-F238E27FC236}">
-                <a16:creationId xmlns:a16="http://schemas.microsoft.com/office/drawing/2014/main" id="{2C61C6AC-42FD-4A57-B9E5-830F7E8029C6}"/>
+                <a16:creationId xmlns:a16="http://schemas.microsoft.com/office/drawing/2014/main" xmlns="" id="{2C61C6AC-42FD-4A57-B9E5-830F7E8029C6}"/>
               </a:ext>
             </a:extLst>
           </p:cNvPr>
@@ -1673,7 +1678,7 @@
           <p:cNvPr id="5" name="Text Placeholder 4">
             <a:extLst>
               <a:ext uri="{FF2B5EF4-FFF2-40B4-BE49-F238E27FC236}">
-                <a16:creationId xmlns:a16="http://schemas.microsoft.com/office/drawing/2014/main" id="{F59683D4-DB02-42F7-892C-82DBC475C50B}"/>
+                <a16:creationId xmlns:a16="http://schemas.microsoft.com/office/drawing/2014/main" xmlns="" id="{F59683D4-DB02-42F7-892C-82DBC475C50B}"/>
               </a:ext>
             </a:extLst>
           </p:cNvPr>
@@ -1744,7 +1749,7 @@
           <p:cNvPr id="6" name="Content Placeholder 5">
             <a:extLst>
               <a:ext uri="{FF2B5EF4-FFF2-40B4-BE49-F238E27FC236}">
-                <a16:creationId xmlns:a16="http://schemas.microsoft.com/office/drawing/2014/main" id="{113F6F05-B0D5-4634-8BD7-C035924CE9AA}"/>
+                <a16:creationId xmlns:a16="http://schemas.microsoft.com/office/drawing/2014/main" xmlns="" id="{113F6F05-B0D5-4634-8BD7-C035924CE9AA}"/>
               </a:ext>
             </a:extLst>
           </p:cNvPr>
@@ -1807,7 +1812,7 @@
           <p:cNvPr id="7" name="Date Placeholder 6">
             <a:extLst>
               <a:ext uri="{FF2B5EF4-FFF2-40B4-BE49-F238E27FC236}">
-                <a16:creationId xmlns:a16="http://schemas.microsoft.com/office/drawing/2014/main" id="{5CDB27D5-1030-42B1-A324-E254BF4F09AA}"/>
+                <a16:creationId xmlns:a16="http://schemas.microsoft.com/office/drawing/2014/main" xmlns="" id="{5CDB27D5-1030-42B1-A324-E254BF4F09AA}"/>
               </a:ext>
             </a:extLst>
           </p:cNvPr>
@@ -1825,7 +1830,7 @@
           <a:p>
             <a:fld id="{2EF1CE80-3B0F-4FF4-8DDD-D91053D20B5D}" type="datetimeFigureOut">
               <a:rPr lang="en-GB" smtClean="0"/>
-              <a:t>19/03/2020</a:t>
+              <a:t>11/05/2023</a:t>
             </a:fld>
             <a:endParaRPr lang="en-GB"/>
           </a:p>
@@ -1836,7 +1841,7 @@
           <p:cNvPr id="8" name="Footer Placeholder 7">
             <a:extLst>
               <a:ext uri="{FF2B5EF4-FFF2-40B4-BE49-F238E27FC236}">
-                <a16:creationId xmlns:a16="http://schemas.microsoft.com/office/drawing/2014/main" id="{3E02D0DC-BEDB-4624-94A1-3155565E797A}"/>
+                <a16:creationId xmlns:a16="http://schemas.microsoft.com/office/drawing/2014/main" xmlns="" id="{3E02D0DC-BEDB-4624-94A1-3155565E797A}"/>
               </a:ext>
             </a:extLst>
           </p:cNvPr>
@@ -1861,7 +1866,7 @@
           <p:cNvPr id="9" name="Slide Number Placeholder 8">
             <a:extLst>
               <a:ext uri="{FF2B5EF4-FFF2-40B4-BE49-F238E27FC236}">
-                <a16:creationId xmlns:a16="http://schemas.microsoft.com/office/drawing/2014/main" id="{F4D96C5E-0E80-404C-AB9E-8ADB4BE380B3}"/>
+                <a16:creationId xmlns:a16="http://schemas.microsoft.com/office/drawing/2014/main" xmlns="" id="{F4D96C5E-0E80-404C-AB9E-8ADB4BE380B3}"/>
               </a:ext>
             </a:extLst>
           </p:cNvPr>
@@ -1920,7 +1925,7 @@
           <p:cNvPr id="2" name="Title 1">
             <a:extLst>
               <a:ext uri="{FF2B5EF4-FFF2-40B4-BE49-F238E27FC236}">
-                <a16:creationId xmlns:a16="http://schemas.microsoft.com/office/drawing/2014/main" id="{25F468D1-D0D1-463F-85C9-1E6CC3BE16F3}"/>
+                <a16:creationId xmlns:a16="http://schemas.microsoft.com/office/drawing/2014/main" xmlns="" id="{25F468D1-D0D1-463F-85C9-1E6CC3BE16F3}"/>
               </a:ext>
             </a:extLst>
           </p:cNvPr>
@@ -1949,7 +1954,7 @@
           <p:cNvPr id="3" name="Date Placeholder 2">
             <a:extLst>
               <a:ext uri="{FF2B5EF4-FFF2-40B4-BE49-F238E27FC236}">
-                <a16:creationId xmlns:a16="http://schemas.microsoft.com/office/drawing/2014/main" id="{63B0A26A-993D-4AB3-BA41-2ADF9A265D6B}"/>
+                <a16:creationId xmlns:a16="http://schemas.microsoft.com/office/drawing/2014/main" xmlns="" id="{63B0A26A-993D-4AB3-BA41-2ADF9A265D6B}"/>
               </a:ext>
             </a:extLst>
           </p:cNvPr>
@@ -1967,7 +1972,7 @@
           <a:p>
             <a:fld id="{2EF1CE80-3B0F-4FF4-8DDD-D91053D20B5D}" type="datetimeFigureOut">
               <a:rPr lang="en-GB" smtClean="0"/>
-              <a:t>19/03/2020</a:t>
+              <a:t>11/05/2023</a:t>
             </a:fld>
             <a:endParaRPr lang="en-GB"/>
           </a:p>
@@ -1978,7 +1983,7 @@
           <p:cNvPr id="4" name="Footer Placeholder 3">
             <a:extLst>
               <a:ext uri="{FF2B5EF4-FFF2-40B4-BE49-F238E27FC236}">
-                <a16:creationId xmlns:a16="http://schemas.microsoft.com/office/drawing/2014/main" id="{A6CBD593-AB5A-4358-85C9-ECFB3B647839}"/>
+                <a16:creationId xmlns:a16="http://schemas.microsoft.com/office/drawing/2014/main" xmlns="" id="{A6CBD593-AB5A-4358-85C9-ECFB3B647839}"/>
               </a:ext>
             </a:extLst>
           </p:cNvPr>
@@ -2003,7 +2008,7 @@
           <p:cNvPr id="5" name="Slide Number Placeholder 4">
             <a:extLst>
               <a:ext uri="{FF2B5EF4-FFF2-40B4-BE49-F238E27FC236}">
-                <a16:creationId xmlns:a16="http://schemas.microsoft.com/office/drawing/2014/main" id="{7A483774-B70E-4141-ACAD-B33137B244CE}"/>
+                <a16:creationId xmlns:a16="http://schemas.microsoft.com/office/drawing/2014/main" xmlns="" id="{7A483774-B70E-4141-ACAD-B33137B244CE}"/>
               </a:ext>
             </a:extLst>
           </p:cNvPr>
@@ -2062,7 +2067,7 @@
           <p:cNvPr id="2" name="Date Placeholder 1">
             <a:extLst>
               <a:ext uri="{FF2B5EF4-FFF2-40B4-BE49-F238E27FC236}">
-                <a16:creationId xmlns:a16="http://schemas.microsoft.com/office/drawing/2014/main" id="{E7E4C2FA-D1E1-49F1-92BE-1F58745605A1}"/>
+                <a16:creationId xmlns:a16="http://schemas.microsoft.com/office/drawing/2014/main" xmlns="" id="{E7E4C2FA-D1E1-49F1-92BE-1F58745605A1}"/>
               </a:ext>
             </a:extLst>
           </p:cNvPr>
@@ -2080,7 +2085,7 @@
           <a:p>
             <a:fld id="{2EF1CE80-3B0F-4FF4-8DDD-D91053D20B5D}" type="datetimeFigureOut">
               <a:rPr lang="en-GB" smtClean="0"/>
-              <a:t>19/03/2020</a:t>
+              <a:t>11/05/2023</a:t>
             </a:fld>
             <a:endParaRPr lang="en-GB"/>
           </a:p>
@@ -2091,7 +2096,7 @@
           <p:cNvPr id="3" name="Footer Placeholder 2">
             <a:extLst>
               <a:ext uri="{FF2B5EF4-FFF2-40B4-BE49-F238E27FC236}">
-                <a16:creationId xmlns:a16="http://schemas.microsoft.com/office/drawing/2014/main" id="{5EE101C6-E8F9-40ED-964E-28C23149A756}"/>
+                <a16:creationId xmlns:a16="http://schemas.microsoft.com/office/drawing/2014/main" xmlns="" id="{5EE101C6-E8F9-40ED-964E-28C23149A756}"/>
               </a:ext>
             </a:extLst>
           </p:cNvPr>
@@ -2116,7 +2121,7 @@
           <p:cNvPr id="4" name="Slide Number Placeholder 3">
             <a:extLst>
               <a:ext uri="{FF2B5EF4-FFF2-40B4-BE49-F238E27FC236}">
-                <a16:creationId xmlns:a16="http://schemas.microsoft.com/office/drawing/2014/main" id="{D220A47A-49FC-4B40-B425-040D244600A1}"/>
+                <a16:creationId xmlns:a16="http://schemas.microsoft.com/office/drawing/2014/main" xmlns="" id="{D220A47A-49FC-4B40-B425-040D244600A1}"/>
               </a:ext>
             </a:extLst>
           </p:cNvPr>
@@ -2175,7 +2180,7 @@
           <p:cNvPr id="2" name="Title 1">
             <a:extLst>
               <a:ext uri="{FF2B5EF4-FFF2-40B4-BE49-F238E27FC236}">
-                <a16:creationId xmlns:a16="http://schemas.microsoft.com/office/drawing/2014/main" id="{6D446781-9341-4105-B5B4-A6BF94000B2C}"/>
+                <a16:creationId xmlns:a16="http://schemas.microsoft.com/office/drawing/2014/main" xmlns="" id="{6D446781-9341-4105-B5B4-A6BF94000B2C}"/>
               </a:ext>
             </a:extLst>
           </p:cNvPr>
@@ -2213,7 +2218,7 @@
           <p:cNvPr id="3" name="Content Placeholder 2">
             <a:extLst>
               <a:ext uri="{FF2B5EF4-FFF2-40B4-BE49-F238E27FC236}">
-                <a16:creationId xmlns:a16="http://schemas.microsoft.com/office/drawing/2014/main" id="{C4A7AC57-11D4-4A41-BBBC-630C6D8A5DBD}"/>
+                <a16:creationId xmlns:a16="http://schemas.microsoft.com/office/drawing/2014/main" xmlns="" id="{C4A7AC57-11D4-4A41-BBBC-630C6D8A5DBD}"/>
               </a:ext>
             </a:extLst>
           </p:cNvPr>
@@ -2304,7 +2309,7 @@
           <p:cNvPr id="4" name="Text Placeholder 3">
             <a:extLst>
               <a:ext uri="{FF2B5EF4-FFF2-40B4-BE49-F238E27FC236}">
-                <a16:creationId xmlns:a16="http://schemas.microsoft.com/office/drawing/2014/main" id="{4D42A010-631C-47D2-9EA5-4CE84B50A8EE}"/>
+                <a16:creationId xmlns:a16="http://schemas.microsoft.com/office/drawing/2014/main" xmlns="" id="{4D42A010-631C-47D2-9EA5-4CE84B50A8EE}"/>
               </a:ext>
             </a:extLst>
           </p:cNvPr>
@@ -2375,7 +2380,7 @@
           <p:cNvPr id="5" name="Date Placeholder 4">
             <a:extLst>
               <a:ext uri="{FF2B5EF4-FFF2-40B4-BE49-F238E27FC236}">
-                <a16:creationId xmlns:a16="http://schemas.microsoft.com/office/drawing/2014/main" id="{EA8B88B6-6EE9-48F7-BF8B-1929DC1119CE}"/>
+                <a16:creationId xmlns:a16="http://schemas.microsoft.com/office/drawing/2014/main" xmlns="" id="{EA8B88B6-6EE9-48F7-BF8B-1929DC1119CE}"/>
               </a:ext>
             </a:extLst>
           </p:cNvPr>
@@ -2393,7 +2398,7 @@
           <a:p>
             <a:fld id="{2EF1CE80-3B0F-4FF4-8DDD-D91053D20B5D}" type="datetimeFigureOut">
               <a:rPr lang="en-GB" smtClean="0"/>
-              <a:t>19/03/2020</a:t>
+              <a:t>11/05/2023</a:t>
             </a:fld>
             <a:endParaRPr lang="en-GB"/>
           </a:p>
@@ -2404,7 +2409,7 @@
           <p:cNvPr id="6" name="Footer Placeholder 5">
             <a:extLst>
               <a:ext uri="{FF2B5EF4-FFF2-40B4-BE49-F238E27FC236}">
-                <a16:creationId xmlns:a16="http://schemas.microsoft.com/office/drawing/2014/main" id="{685F8A9A-2D72-49DE-B1BB-59274C57CB29}"/>
+                <a16:creationId xmlns:a16="http://schemas.microsoft.com/office/drawing/2014/main" xmlns="" id="{685F8A9A-2D72-49DE-B1BB-59274C57CB29}"/>
               </a:ext>
             </a:extLst>
           </p:cNvPr>
@@ -2429,7 +2434,7 @@
           <p:cNvPr id="7" name="Slide Number Placeholder 6">
             <a:extLst>
               <a:ext uri="{FF2B5EF4-FFF2-40B4-BE49-F238E27FC236}">
-                <a16:creationId xmlns:a16="http://schemas.microsoft.com/office/drawing/2014/main" id="{05E915DD-F09B-47CF-8B44-620C0E41A9C5}"/>
+                <a16:creationId xmlns:a16="http://schemas.microsoft.com/office/drawing/2014/main" xmlns="" id="{05E915DD-F09B-47CF-8B44-620C0E41A9C5}"/>
               </a:ext>
             </a:extLst>
           </p:cNvPr>
@@ -2488,7 +2493,7 @@
           <p:cNvPr id="2" name="Title 1">
             <a:extLst>
               <a:ext uri="{FF2B5EF4-FFF2-40B4-BE49-F238E27FC236}">
-                <a16:creationId xmlns:a16="http://schemas.microsoft.com/office/drawing/2014/main" id="{4A5FD46D-395D-4A70-8FCE-56FC385CE059}"/>
+                <a16:creationId xmlns:a16="http://schemas.microsoft.com/office/drawing/2014/main" xmlns="" id="{4A5FD46D-395D-4A70-8FCE-56FC385CE059}"/>
               </a:ext>
             </a:extLst>
           </p:cNvPr>
@@ -2526,7 +2531,7 @@
           <p:cNvPr id="3" name="Picture Placeholder 2">
             <a:extLst>
               <a:ext uri="{FF2B5EF4-FFF2-40B4-BE49-F238E27FC236}">
-                <a16:creationId xmlns:a16="http://schemas.microsoft.com/office/drawing/2014/main" id="{1CF4FB20-C75C-49A1-B59A-9E30E643079A}"/>
+                <a16:creationId xmlns:a16="http://schemas.microsoft.com/office/drawing/2014/main" xmlns="" id="{1CF4FB20-C75C-49A1-B59A-9E30E643079A}"/>
               </a:ext>
             </a:extLst>
           </p:cNvPr>
@@ -2593,7 +2598,7 @@
           <p:cNvPr id="4" name="Text Placeholder 3">
             <a:extLst>
               <a:ext uri="{FF2B5EF4-FFF2-40B4-BE49-F238E27FC236}">
-                <a16:creationId xmlns:a16="http://schemas.microsoft.com/office/drawing/2014/main" id="{42FB3E42-51D6-46EE-B4BD-ADDA5F5DEC99}"/>
+                <a16:creationId xmlns:a16="http://schemas.microsoft.com/office/drawing/2014/main" xmlns="" id="{42FB3E42-51D6-46EE-B4BD-ADDA5F5DEC99}"/>
               </a:ext>
             </a:extLst>
           </p:cNvPr>
@@ -2664,7 +2669,7 @@
           <p:cNvPr id="5" name="Date Placeholder 4">
             <a:extLst>
               <a:ext uri="{FF2B5EF4-FFF2-40B4-BE49-F238E27FC236}">
-                <a16:creationId xmlns:a16="http://schemas.microsoft.com/office/drawing/2014/main" id="{EBB04B11-1424-4494-BA1E-6DBC17B3B33A}"/>
+                <a16:creationId xmlns:a16="http://schemas.microsoft.com/office/drawing/2014/main" xmlns="" id="{EBB04B11-1424-4494-BA1E-6DBC17B3B33A}"/>
               </a:ext>
             </a:extLst>
           </p:cNvPr>
@@ -2682,7 +2687,7 @@
           <a:p>
             <a:fld id="{2EF1CE80-3B0F-4FF4-8DDD-D91053D20B5D}" type="datetimeFigureOut">
               <a:rPr lang="en-GB" smtClean="0"/>
-              <a:t>19/03/2020</a:t>
+              <a:t>11/05/2023</a:t>
             </a:fld>
             <a:endParaRPr lang="en-GB"/>
           </a:p>
@@ -2693,7 +2698,7 @@
           <p:cNvPr id="6" name="Footer Placeholder 5">
             <a:extLst>
               <a:ext uri="{FF2B5EF4-FFF2-40B4-BE49-F238E27FC236}">
-                <a16:creationId xmlns:a16="http://schemas.microsoft.com/office/drawing/2014/main" id="{278CFF4E-2A94-49F9-8C2F-7A436159E375}"/>
+                <a16:creationId xmlns:a16="http://schemas.microsoft.com/office/drawing/2014/main" xmlns="" id="{278CFF4E-2A94-49F9-8C2F-7A436159E375}"/>
               </a:ext>
             </a:extLst>
           </p:cNvPr>
@@ -2718,7 +2723,7 @@
           <p:cNvPr id="7" name="Slide Number Placeholder 6">
             <a:extLst>
               <a:ext uri="{FF2B5EF4-FFF2-40B4-BE49-F238E27FC236}">
-                <a16:creationId xmlns:a16="http://schemas.microsoft.com/office/drawing/2014/main" id="{2FFA691B-869B-44F7-BDC1-94D5775BE8B7}"/>
+                <a16:creationId xmlns:a16="http://schemas.microsoft.com/office/drawing/2014/main" xmlns="" id="{2FFA691B-869B-44F7-BDC1-94D5775BE8B7}"/>
               </a:ext>
             </a:extLst>
           </p:cNvPr>
@@ -2782,7 +2787,7 @@
           <p:cNvPr id="2" name="Title Placeholder 1">
             <a:extLst>
               <a:ext uri="{FF2B5EF4-FFF2-40B4-BE49-F238E27FC236}">
-                <a16:creationId xmlns:a16="http://schemas.microsoft.com/office/drawing/2014/main" id="{2175626A-1284-4EAC-B2CE-CC10CB2AB1C1}"/>
+                <a16:creationId xmlns:a16="http://schemas.microsoft.com/office/drawing/2014/main" xmlns="" id="{2175626A-1284-4EAC-B2CE-CC10CB2AB1C1}"/>
               </a:ext>
             </a:extLst>
           </p:cNvPr>
@@ -2821,7 +2826,7 @@
           <p:cNvPr id="3" name="Text Placeholder 2">
             <a:extLst>
               <a:ext uri="{FF2B5EF4-FFF2-40B4-BE49-F238E27FC236}">
-                <a16:creationId xmlns:a16="http://schemas.microsoft.com/office/drawing/2014/main" id="{19B7ABAF-855B-43ED-BFE1-A04E1899B7D9}"/>
+                <a16:creationId xmlns:a16="http://schemas.microsoft.com/office/drawing/2014/main" xmlns="" id="{19B7ABAF-855B-43ED-BFE1-A04E1899B7D9}"/>
               </a:ext>
             </a:extLst>
           </p:cNvPr>
@@ -2889,7 +2894,7 @@
           <p:cNvPr id="4" name="Date Placeholder 3">
             <a:extLst>
               <a:ext uri="{FF2B5EF4-FFF2-40B4-BE49-F238E27FC236}">
-                <a16:creationId xmlns:a16="http://schemas.microsoft.com/office/drawing/2014/main" id="{800C5F50-F14C-4358-B6C4-FA59F4F33FA5}"/>
+                <a16:creationId xmlns:a16="http://schemas.microsoft.com/office/drawing/2014/main" xmlns="" id="{800C5F50-F14C-4358-B6C4-FA59F4F33FA5}"/>
               </a:ext>
             </a:extLst>
           </p:cNvPr>
@@ -2925,7 +2930,7 @@
           <a:p>
             <a:fld id="{2EF1CE80-3B0F-4FF4-8DDD-D91053D20B5D}" type="datetimeFigureOut">
               <a:rPr lang="en-GB" smtClean="0"/>
-              <a:t>19/03/2020</a:t>
+              <a:t>11/05/2023</a:t>
             </a:fld>
             <a:endParaRPr lang="en-GB"/>
           </a:p>
@@ -2936,7 +2941,7 @@
           <p:cNvPr id="5" name="Footer Placeholder 4">
             <a:extLst>
               <a:ext uri="{FF2B5EF4-FFF2-40B4-BE49-F238E27FC236}">
-                <a16:creationId xmlns:a16="http://schemas.microsoft.com/office/drawing/2014/main" id="{2767B0B6-9D8E-4ED5-BDF3-670214FE1F1E}"/>
+                <a16:creationId xmlns:a16="http://schemas.microsoft.com/office/drawing/2014/main" xmlns="" id="{2767B0B6-9D8E-4ED5-BDF3-670214FE1F1E}"/>
               </a:ext>
             </a:extLst>
           </p:cNvPr>
@@ -2979,7 +2984,7 @@
           <p:cNvPr id="6" name="Slide Number Placeholder 5">
             <a:extLst>
               <a:ext uri="{FF2B5EF4-FFF2-40B4-BE49-F238E27FC236}">
-                <a16:creationId xmlns:a16="http://schemas.microsoft.com/office/drawing/2014/main" id="{7E7C2747-61DF-4234-B124-4729801189BD}"/>
+                <a16:creationId xmlns:a16="http://schemas.microsoft.com/office/drawing/2014/main" xmlns="" id="{7E7C2747-61DF-4234-B124-4729801189BD}"/>
               </a:ext>
             </a:extLst>
           </p:cNvPr>
@@ -3344,10 +3349,10 @@
       </p:grpSpPr>
       <p:sp>
         <p:nvSpPr>
-          <p:cNvPr id="4" name="Rounded Rectangle 167">
-            <a:extLst>
-              <a:ext uri="{FF2B5EF4-FFF2-40B4-BE49-F238E27FC236}">
-                <a16:creationId xmlns:a16="http://schemas.microsoft.com/office/drawing/2014/main" id="{C3D56BE2-D398-44DE-93B6-DEF3FF203EF4}"/>
+          <p:cNvPr id="63" name="Rounded Rectangle 62">
+            <a:extLst>
+              <a:ext uri="{FF2B5EF4-FFF2-40B4-BE49-F238E27FC236}">
+                <a16:creationId xmlns:a16="http://schemas.microsoft.com/office/drawing/2014/main" xmlns="" id="{1F883338-EDF0-AC46-A358-DA5CCFB6811C}"/>
               </a:ext>
             </a:extLst>
           </p:cNvPr>
@@ -3356,29 +3361,25 @@
         </p:nvSpPr>
         <p:spPr>
           <a:xfrm>
-            <a:off x="3321050" y="1593000"/>
-            <a:ext cx="1152000" cy="3960000"/>
+            <a:off x="4124585" y="3196538"/>
+            <a:ext cx="3492274" cy="983763"/>
           </a:xfrm>
           <a:prstGeom prst="roundRect">
             <a:avLst>
-              <a:gd name="adj" fmla="val 6944"/>
+              <a:gd name="adj" fmla="val 8158"/>
             </a:avLst>
           </a:prstGeom>
           <a:solidFill>
-            <a:srgbClr val="FFFFFF">
-              <a:lumMod val="95000"/>
-            </a:srgbClr>
+            <a:srgbClr val="CBD3D7"/>
           </a:solidFill>
           <a:ln w="12700" cap="flat" cmpd="sng" algn="ctr">
-            <a:solidFill>
-              <a:srgbClr val="CBD3D7"/>
-            </a:solidFill>
+            <a:noFill/>
             <a:prstDash val="solid"/>
           </a:ln>
           <a:effectLst/>
         </p:spPr>
         <p:txBody>
-          <a:bodyPr wrap="square" tIns="36000" bIns="36000" rtlCol="0" anchor="ctr">
+          <a:bodyPr wrap="square" lIns="90000" tIns="36000" bIns="36000" rtlCol="0" anchor="ctr">
             <a:noAutofit/>
           </a:bodyPr>
           <a:lstStyle/>
@@ -3400,7 +3401,86 @@
               <a:tabLst/>
               <a:defRPr/>
             </a:pPr>
-            <a:endParaRPr kumimoji="0" lang="en-US" sz="1200" b="0" i="1" u="none" strike="noStrike" kern="0" cap="none" spc="0" normalizeH="0" baseline="0" noProof="0" dirty="0">
+            <a:endParaRPr kumimoji="0" lang="en-US" sz="1600" b="1" i="0" u="none" strike="noStrike" kern="0" cap="none" spc="0" normalizeH="0" baseline="0" noProof="0" dirty="0" smtClean="0">
+              <a:ln>
+                <a:noFill/>
+              </a:ln>
+              <a:solidFill>
+                <a:srgbClr val="FFFFFF"/>
+              </a:solidFill>
+              <a:effectLst>
+                <a:outerShdw blurRad="76200" dist="38100" dir="5400000" algn="t" rotWithShape="0">
+                  <a:prstClr val="black">
+                    <a:alpha val="70000"/>
+                  </a:prstClr>
+                </a:outerShdw>
+              </a:effectLst>
+              <a:uLnTx/>
+              <a:uFillTx/>
+              <a:latin typeface="Source Sans Pro" charset="0"/>
+              <a:ea typeface="Source Sans Pro" charset="0"/>
+              <a:cs typeface="Source Sans Pro" charset="0"/>
+            </a:endParaRPr>
+          </a:p>
+        </p:txBody>
+      </p:sp>
+      <p:sp>
+        <p:nvSpPr>
+          <p:cNvPr id="64" name="Rounded Rectangle 63">
+            <a:extLst>
+              <a:ext uri="{FF2B5EF4-FFF2-40B4-BE49-F238E27FC236}">
+                <a16:creationId xmlns:a16="http://schemas.microsoft.com/office/drawing/2014/main" xmlns="" id="{7B700EBA-290A-ED4C-BA67-860025D94553}"/>
+              </a:ext>
+            </a:extLst>
+          </p:cNvPr>
+          <p:cNvSpPr/>
+          <p:nvPr/>
+        </p:nvSpPr>
+        <p:spPr>
+          <a:xfrm rot="16200000">
+            <a:off x="5991314" y="2185812"/>
+            <a:ext cx="1361728" cy="1665304"/>
+          </a:xfrm>
+          <a:prstGeom prst="roundRect">
+            <a:avLst>
+              <a:gd name="adj" fmla="val 9271"/>
+            </a:avLst>
+          </a:prstGeom>
+          <a:solidFill>
+            <a:srgbClr val="FFFFFF"/>
+          </a:solidFill>
+          <a:ln w="12700" cap="flat" cmpd="sng" algn="ctr">
+            <a:solidFill>
+              <a:srgbClr val="CBD3D7">
+                <a:lumMod val="75000"/>
+              </a:srgbClr>
+            </a:solidFill>
+            <a:prstDash val="solid"/>
+          </a:ln>
+          <a:effectLst/>
+        </p:spPr>
+        <p:txBody>
+          <a:bodyPr lIns="180000" tIns="0" bIns="0" rtlCol="0" anchor="ctr"/>
+          <a:lstStyle/>
+          <a:p>
+            <a:pPr marL="0" marR="0" lvl="0" indent="0" defTabSz="914377" eaLnBrk="1" fontAlgn="auto" latinLnBrk="0" hangingPunct="1">
+              <a:lnSpc>
+                <a:spcPct val="100000"/>
+              </a:lnSpc>
+              <a:spcBef>
+                <a:spcPts val="0"/>
+              </a:spcBef>
+              <a:spcAft>
+                <a:spcPts val="0"/>
+              </a:spcAft>
+              <a:buClrTx/>
+              <a:buSzTx/>
+              <a:buFontTx/>
+              <a:buNone/>
+              <a:tabLst/>
+              <a:defRPr/>
+            </a:pPr>
+            <a:endParaRPr kumimoji="0" lang="en-US" sz="1800" b="0" i="0" u="none" strike="noStrike" kern="0" cap="none" spc="0" normalizeH="0" baseline="0" noProof="0" dirty="0" smtClean="0">
               <a:ln>
                 <a:noFill/>
               </a:ln>
@@ -3410,19 +3490,1495 @@
               <a:effectLst/>
               <a:uLnTx/>
               <a:uFillTx/>
-              <a:latin typeface="Source Sans Pro Light" charset="0"/>
-              <a:ea typeface="Source Sans Pro Light" charset="0"/>
-              <a:cs typeface="Source Sans Pro Light" charset="0"/>
+              <a:latin typeface="Source Sans Pro" panose="020B0503030403020204" pitchFamily="34" charset="0"/>
+              <a:ea typeface="Source Sans Pro" panose="020B0503030403020204" pitchFamily="34" charset="0"/>
+              <a:cs typeface="+mn-cs"/>
             </a:endParaRPr>
           </a:p>
         </p:txBody>
       </p:sp>
-      <p:sp>
-        <p:nvSpPr>
-          <p:cNvPr id="8" name="Rounded Rectangle 167">
-            <a:extLst>
-              <a:ext uri="{FF2B5EF4-FFF2-40B4-BE49-F238E27FC236}">
-                <a16:creationId xmlns:a16="http://schemas.microsoft.com/office/drawing/2014/main" id="{51B8A76F-BE67-4A23-B4EB-AC759DAB2733}"/>
+      <p:grpSp>
+        <p:nvGrpSpPr>
+          <p:cNvPr id="65" name="Group 64">
+            <a:extLst>
+              <a:ext uri="{FF2B5EF4-FFF2-40B4-BE49-F238E27FC236}">
+                <a16:creationId xmlns:a16="http://schemas.microsoft.com/office/drawing/2014/main" xmlns="" id="{81554C5B-09F0-9149-B0D7-E5CB583FED16}"/>
+              </a:ext>
+            </a:extLst>
+          </p:cNvPr>
+          <p:cNvGrpSpPr/>
+          <p:nvPr/>
+        </p:nvGrpSpPr>
+        <p:grpSpPr>
+          <a:xfrm>
+            <a:off x="4023808" y="4396962"/>
+            <a:ext cx="3680918" cy="671594"/>
+            <a:chOff x="4610790" y="3771078"/>
+            <a:chExt cx="3680918" cy="671594"/>
+          </a:xfrm>
+        </p:grpSpPr>
+        <p:sp>
+          <p:nvSpPr>
+            <p:cNvPr id="66" name="Arc 65">
+              <a:extLst>
+                <a:ext uri="{FF2B5EF4-FFF2-40B4-BE49-F238E27FC236}">
+                  <a16:creationId xmlns:a16="http://schemas.microsoft.com/office/drawing/2014/main" xmlns="" id="{466FBFFF-3F0A-4E4C-86B2-EA5A51527170}"/>
+                </a:ext>
+              </a:extLst>
+            </p:cNvPr>
+            <p:cNvSpPr/>
+            <p:nvPr/>
+          </p:nvSpPr>
+          <p:spPr>
+            <a:xfrm rot="16200000">
+              <a:off x="4607067" y="4217002"/>
+              <a:ext cx="229393" cy="221947"/>
+            </a:xfrm>
+            <a:prstGeom prst="arc">
+              <a:avLst>
+                <a:gd name="adj1" fmla="val 16200000"/>
+                <a:gd name="adj2" fmla="val 21512081"/>
+              </a:avLst>
+            </a:prstGeom>
+            <a:noFill/>
+            <a:ln w="38100" cap="flat" cmpd="sng" algn="ctr">
+              <a:solidFill>
+                <a:srgbClr val="CBD3D7">
+                  <a:lumMod val="25000"/>
+                </a:srgbClr>
+              </a:solidFill>
+              <a:prstDash val="solid"/>
+            </a:ln>
+            <a:effectLst/>
+          </p:spPr>
+          <p:txBody>
+            <a:bodyPr rtlCol="0" anchor="ctr"/>
+            <a:lstStyle/>
+            <a:p>
+              <a:pPr marL="0" marR="0" lvl="0" indent="0" algn="ctr" defTabSz="914377" eaLnBrk="1" fontAlgn="auto" latinLnBrk="0" hangingPunct="1">
+                <a:lnSpc>
+                  <a:spcPct val="100000"/>
+                </a:lnSpc>
+                <a:spcBef>
+                  <a:spcPts val="0"/>
+                </a:spcBef>
+                <a:spcAft>
+                  <a:spcPts val="0"/>
+                </a:spcAft>
+                <a:buClrTx/>
+                <a:buSzTx/>
+                <a:buFontTx/>
+                <a:buNone/>
+                <a:tabLst/>
+                <a:defRPr/>
+              </a:pPr>
+              <a:endParaRPr kumimoji="0" lang="en-US" sz="1800" b="0" i="0" u="none" strike="noStrike" kern="0" cap="none" spc="0" normalizeH="0" baseline="0" noProof="0" dirty="0" smtClean="0">
+                <a:ln>
+                  <a:noFill/>
+                </a:ln>
+                <a:solidFill>
+                  <a:srgbClr val="4B5357"/>
+                </a:solidFill>
+                <a:effectLst/>
+                <a:uLnTx/>
+                <a:uFillTx/>
+                <a:latin typeface="Calibri Light"/>
+                <a:ea typeface="+mn-ea"/>
+                <a:cs typeface="+mn-cs"/>
+              </a:endParaRPr>
+            </a:p>
+          </p:txBody>
+        </p:sp>
+        <p:sp>
+          <p:nvSpPr>
+            <p:cNvPr id="67" name="Arc 66">
+              <a:extLst>
+                <a:ext uri="{FF2B5EF4-FFF2-40B4-BE49-F238E27FC236}">
+                  <a16:creationId xmlns:a16="http://schemas.microsoft.com/office/drawing/2014/main" xmlns="" id="{1A326D3B-0AC5-F149-AE14-054FAE4F032D}"/>
+                </a:ext>
+              </a:extLst>
+            </p:cNvPr>
+            <p:cNvSpPr/>
+            <p:nvPr/>
+          </p:nvSpPr>
+          <p:spPr>
+            <a:xfrm>
+              <a:off x="8065179" y="4222805"/>
+              <a:ext cx="226529" cy="213972"/>
+            </a:xfrm>
+            <a:prstGeom prst="arc">
+              <a:avLst>
+                <a:gd name="adj1" fmla="val 16200000"/>
+                <a:gd name="adj2" fmla="val 21595897"/>
+              </a:avLst>
+            </a:prstGeom>
+            <a:noFill/>
+            <a:ln w="38100" cap="flat" cmpd="sng" algn="ctr">
+              <a:solidFill>
+                <a:srgbClr val="CBD3D7">
+                  <a:lumMod val="25000"/>
+                </a:srgbClr>
+              </a:solidFill>
+              <a:prstDash val="solid"/>
+            </a:ln>
+            <a:effectLst/>
+          </p:spPr>
+          <p:txBody>
+            <a:bodyPr rtlCol="0" anchor="ctr"/>
+            <a:lstStyle/>
+            <a:p>
+              <a:pPr marL="0" marR="0" lvl="0" indent="0" algn="ctr" defTabSz="914377" eaLnBrk="1" fontAlgn="auto" latinLnBrk="0" hangingPunct="1">
+                <a:lnSpc>
+                  <a:spcPct val="100000"/>
+                </a:lnSpc>
+                <a:spcBef>
+                  <a:spcPts val="0"/>
+                </a:spcBef>
+                <a:spcAft>
+                  <a:spcPts val="0"/>
+                </a:spcAft>
+                <a:buClrTx/>
+                <a:buSzTx/>
+                <a:buFontTx/>
+                <a:buNone/>
+                <a:tabLst/>
+                <a:defRPr/>
+              </a:pPr>
+              <a:endParaRPr kumimoji="0" lang="en-US" sz="1800" b="0" i="0" u="none" strike="noStrike" kern="0" cap="none" spc="0" normalizeH="0" baseline="0" noProof="0" dirty="0" smtClean="0">
+                <a:ln>
+                  <a:noFill/>
+                </a:ln>
+                <a:solidFill>
+                  <a:srgbClr val="4B5357"/>
+                </a:solidFill>
+                <a:effectLst/>
+                <a:uLnTx/>
+                <a:uFillTx/>
+                <a:latin typeface="Calibri Light"/>
+                <a:ea typeface="+mn-ea"/>
+                <a:cs typeface="+mn-cs"/>
+              </a:endParaRPr>
+            </a:p>
+          </p:txBody>
+        </p:sp>
+        <p:sp>
+          <p:nvSpPr>
+            <p:cNvPr id="68" name="Snip Same Side Corner Rectangle 90">
+              <a:extLst>
+                <a:ext uri="{FF2B5EF4-FFF2-40B4-BE49-F238E27FC236}">
+                  <a16:creationId xmlns:a16="http://schemas.microsoft.com/office/drawing/2014/main" xmlns="" id="{ECD1F32B-38F5-E448-8384-162A1BA839D4}"/>
+                </a:ext>
+              </a:extLst>
+            </p:cNvPr>
+            <p:cNvSpPr/>
+            <p:nvPr/>
+          </p:nvSpPr>
+          <p:spPr>
+            <a:xfrm>
+              <a:off x="4706155" y="3771078"/>
+              <a:ext cx="3492274" cy="543100"/>
+            </a:xfrm>
+            <a:prstGeom prst="snip2SameRect">
+              <a:avLst>
+                <a:gd name="adj1" fmla="val 11791"/>
+                <a:gd name="adj2" fmla="val 0"/>
+              </a:avLst>
+            </a:prstGeom>
+            <a:solidFill>
+              <a:srgbClr val="4B5357">
+                <a:lumMod val="50000"/>
+              </a:srgbClr>
+            </a:solidFill>
+            <a:ln w="25400" cap="flat" cmpd="sng" algn="ctr">
+              <a:noFill/>
+              <a:prstDash val="solid"/>
+            </a:ln>
+            <a:effectLst/>
+          </p:spPr>
+          <p:txBody>
+            <a:bodyPr wrap="square" tIns="0" bIns="36000" rtlCol="0" anchor="b">
+              <a:noAutofit/>
+            </a:bodyPr>
+            <a:lstStyle/>
+            <a:p>
+              <a:pPr marL="0" marR="0" lvl="0" indent="0" algn="ctr" defTabSz="914377" eaLnBrk="1" fontAlgn="auto" latinLnBrk="0" hangingPunct="1">
+                <a:lnSpc>
+                  <a:spcPts val="1600"/>
+                </a:lnSpc>
+                <a:spcBef>
+                  <a:spcPts val="0"/>
+                </a:spcBef>
+                <a:spcAft>
+                  <a:spcPts val="0"/>
+                </a:spcAft>
+                <a:buClrTx/>
+                <a:buSzTx/>
+                <a:buFontTx/>
+                <a:buNone/>
+                <a:tabLst/>
+                <a:defRPr/>
+              </a:pPr>
+              <a:endParaRPr kumimoji="0" lang="en-US" sz="1200" b="1" i="1" u="none" strike="noStrike" kern="0" cap="none" spc="0" normalizeH="0" baseline="0" noProof="0" dirty="0" smtClean="0">
+                <a:ln>
+                  <a:noFill/>
+                </a:ln>
+                <a:solidFill>
+                  <a:srgbClr val="FFFFFF"/>
+                </a:solidFill>
+                <a:effectLst/>
+                <a:uLnTx/>
+                <a:uFillTx/>
+                <a:latin typeface="Source Sans Pro SemiBold" charset="0"/>
+                <a:ea typeface="Source Sans Pro SemiBold" charset="0"/>
+                <a:cs typeface="Source Sans Pro SemiBold" charset="0"/>
+              </a:endParaRPr>
+            </a:p>
+          </p:txBody>
+        </p:sp>
+      </p:grpSp>
+      <p:grpSp>
+        <p:nvGrpSpPr>
+          <p:cNvPr id="69" name="Group 68">
+            <a:extLst>
+              <a:ext uri="{FF2B5EF4-FFF2-40B4-BE49-F238E27FC236}">
+                <a16:creationId xmlns:a16="http://schemas.microsoft.com/office/drawing/2014/main" xmlns="" id="{8D9204EE-3FB2-2A41-A54F-69A77353A4FA}"/>
+              </a:ext>
+            </a:extLst>
+          </p:cNvPr>
+          <p:cNvGrpSpPr/>
+          <p:nvPr/>
+        </p:nvGrpSpPr>
+        <p:grpSpPr>
+          <a:xfrm>
+            <a:off x="4824241" y="4136913"/>
+            <a:ext cx="1856244" cy="721545"/>
+            <a:chOff x="4123484" y="5527673"/>
+            <a:chExt cx="1856244" cy="721545"/>
+          </a:xfrm>
+        </p:grpSpPr>
+        <p:sp>
+          <p:nvSpPr>
+            <p:cNvPr id="70" name="Rounded Rectangle 370">
+              <a:extLst>
+                <a:ext uri="{FF2B5EF4-FFF2-40B4-BE49-F238E27FC236}">
+                  <a16:creationId xmlns:a16="http://schemas.microsoft.com/office/drawing/2014/main" xmlns="" id="{31AD8B8A-22F2-4846-8108-D7315C1342E8}"/>
+                </a:ext>
+              </a:extLst>
+            </p:cNvPr>
+            <p:cNvSpPr/>
+            <p:nvPr/>
+          </p:nvSpPr>
+          <p:spPr>
+            <a:xfrm>
+              <a:off x="4123484" y="5527673"/>
+              <a:ext cx="1856244" cy="721545"/>
+            </a:xfrm>
+            <a:custGeom>
+              <a:avLst/>
+              <a:gdLst>
+                <a:gd name="connsiteX0" fmla="*/ 0 w 1377675"/>
+                <a:gd name="connsiteY0" fmla="*/ 66568 h 1084694"/>
+                <a:gd name="connsiteX1" fmla="*/ 66568 w 1377675"/>
+                <a:gd name="connsiteY1" fmla="*/ 0 h 1084694"/>
+                <a:gd name="connsiteX2" fmla="*/ 1311107 w 1377675"/>
+                <a:gd name="connsiteY2" fmla="*/ 0 h 1084694"/>
+                <a:gd name="connsiteX3" fmla="*/ 1377675 w 1377675"/>
+                <a:gd name="connsiteY3" fmla="*/ 66568 h 1084694"/>
+                <a:gd name="connsiteX4" fmla="*/ 1377675 w 1377675"/>
+                <a:gd name="connsiteY4" fmla="*/ 1018126 h 1084694"/>
+                <a:gd name="connsiteX5" fmla="*/ 1311107 w 1377675"/>
+                <a:gd name="connsiteY5" fmla="*/ 1084694 h 1084694"/>
+                <a:gd name="connsiteX6" fmla="*/ 66568 w 1377675"/>
+                <a:gd name="connsiteY6" fmla="*/ 1084694 h 1084694"/>
+                <a:gd name="connsiteX7" fmla="*/ 0 w 1377675"/>
+                <a:gd name="connsiteY7" fmla="*/ 1018126 h 1084694"/>
+                <a:gd name="connsiteX8" fmla="*/ 0 w 1377675"/>
+                <a:gd name="connsiteY8" fmla="*/ 66568 h 1084694"/>
+                <a:gd name="connsiteX0" fmla="*/ 0 w 1377675"/>
+                <a:gd name="connsiteY0" fmla="*/ 66568 h 1084694"/>
+                <a:gd name="connsiteX1" fmla="*/ 66568 w 1377675"/>
+                <a:gd name="connsiteY1" fmla="*/ 0 h 1084694"/>
+                <a:gd name="connsiteX2" fmla="*/ 1311107 w 1377675"/>
+                <a:gd name="connsiteY2" fmla="*/ 0 h 1084694"/>
+                <a:gd name="connsiteX3" fmla="*/ 1377675 w 1377675"/>
+                <a:gd name="connsiteY3" fmla="*/ 409468 h 1084694"/>
+                <a:gd name="connsiteX4" fmla="*/ 1377675 w 1377675"/>
+                <a:gd name="connsiteY4" fmla="*/ 1018126 h 1084694"/>
+                <a:gd name="connsiteX5" fmla="*/ 1311107 w 1377675"/>
+                <a:gd name="connsiteY5" fmla="*/ 1084694 h 1084694"/>
+                <a:gd name="connsiteX6" fmla="*/ 66568 w 1377675"/>
+                <a:gd name="connsiteY6" fmla="*/ 1084694 h 1084694"/>
+                <a:gd name="connsiteX7" fmla="*/ 0 w 1377675"/>
+                <a:gd name="connsiteY7" fmla="*/ 1018126 h 1084694"/>
+                <a:gd name="connsiteX8" fmla="*/ 0 w 1377675"/>
+                <a:gd name="connsiteY8" fmla="*/ 66568 h 1084694"/>
+                <a:gd name="connsiteX0" fmla="*/ 0 w 1381139"/>
+                <a:gd name="connsiteY0" fmla="*/ 388686 h 1084694"/>
+                <a:gd name="connsiteX1" fmla="*/ 70032 w 1381139"/>
+                <a:gd name="connsiteY1" fmla="*/ 0 h 1084694"/>
+                <a:gd name="connsiteX2" fmla="*/ 1314571 w 1381139"/>
+                <a:gd name="connsiteY2" fmla="*/ 0 h 1084694"/>
+                <a:gd name="connsiteX3" fmla="*/ 1381139 w 1381139"/>
+                <a:gd name="connsiteY3" fmla="*/ 409468 h 1084694"/>
+                <a:gd name="connsiteX4" fmla="*/ 1381139 w 1381139"/>
+                <a:gd name="connsiteY4" fmla="*/ 1018126 h 1084694"/>
+                <a:gd name="connsiteX5" fmla="*/ 1314571 w 1381139"/>
+                <a:gd name="connsiteY5" fmla="*/ 1084694 h 1084694"/>
+                <a:gd name="connsiteX6" fmla="*/ 70032 w 1381139"/>
+                <a:gd name="connsiteY6" fmla="*/ 1084694 h 1084694"/>
+                <a:gd name="connsiteX7" fmla="*/ 3464 w 1381139"/>
+                <a:gd name="connsiteY7" fmla="*/ 1018126 h 1084694"/>
+                <a:gd name="connsiteX8" fmla="*/ 0 w 1381139"/>
+                <a:gd name="connsiteY8" fmla="*/ 388686 h 1084694"/>
+                <a:gd name="connsiteX0" fmla="*/ 0 w 3085063"/>
+                <a:gd name="connsiteY0" fmla="*/ 388686 h 1084694"/>
+                <a:gd name="connsiteX1" fmla="*/ 70032 w 3085063"/>
+                <a:gd name="connsiteY1" fmla="*/ 0 h 1084694"/>
+                <a:gd name="connsiteX2" fmla="*/ 3084489 w 3085063"/>
+                <a:gd name="connsiteY2" fmla="*/ 256309 h 1084694"/>
+                <a:gd name="connsiteX3" fmla="*/ 1381139 w 3085063"/>
+                <a:gd name="connsiteY3" fmla="*/ 409468 h 1084694"/>
+                <a:gd name="connsiteX4" fmla="*/ 1381139 w 3085063"/>
+                <a:gd name="connsiteY4" fmla="*/ 1018126 h 1084694"/>
+                <a:gd name="connsiteX5" fmla="*/ 1314571 w 3085063"/>
+                <a:gd name="connsiteY5" fmla="*/ 1084694 h 1084694"/>
+                <a:gd name="connsiteX6" fmla="*/ 70032 w 3085063"/>
+                <a:gd name="connsiteY6" fmla="*/ 1084694 h 1084694"/>
+                <a:gd name="connsiteX7" fmla="*/ 3464 w 3085063"/>
+                <a:gd name="connsiteY7" fmla="*/ 1018126 h 1084694"/>
+                <a:gd name="connsiteX8" fmla="*/ 0 w 3085063"/>
+                <a:gd name="connsiteY8" fmla="*/ 388686 h 1084694"/>
+                <a:gd name="connsiteX0" fmla="*/ 1150005 w 4235068"/>
+                <a:gd name="connsiteY0" fmla="*/ 132377 h 828385"/>
+                <a:gd name="connsiteX1" fmla="*/ 837 w 4235068"/>
+                <a:gd name="connsiteY1" fmla="*/ 3463 h 828385"/>
+                <a:gd name="connsiteX2" fmla="*/ 4234494 w 4235068"/>
+                <a:gd name="connsiteY2" fmla="*/ 0 h 828385"/>
+                <a:gd name="connsiteX3" fmla="*/ 2531144 w 4235068"/>
+                <a:gd name="connsiteY3" fmla="*/ 153159 h 828385"/>
+                <a:gd name="connsiteX4" fmla="*/ 2531144 w 4235068"/>
+                <a:gd name="connsiteY4" fmla="*/ 761817 h 828385"/>
+                <a:gd name="connsiteX5" fmla="*/ 2464576 w 4235068"/>
+                <a:gd name="connsiteY5" fmla="*/ 828385 h 828385"/>
+                <a:gd name="connsiteX6" fmla="*/ 1220037 w 4235068"/>
+                <a:gd name="connsiteY6" fmla="*/ 828385 h 828385"/>
+                <a:gd name="connsiteX7" fmla="*/ 1153469 w 4235068"/>
+                <a:gd name="connsiteY7" fmla="*/ 761817 h 828385"/>
+                <a:gd name="connsiteX8" fmla="*/ 1150005 w 4235068"/>
+                <a:gd name="connsiteY8" fmla="*/ 132377 h 828385"/>
+                <a:gd name="connsiteX0" fmla="*/ 1150005 w 2930911"/>
+                <a:gd name="connsiteY0" fmla="*/ 128914 h 824922"/>
+                <a:gd name="connsiteX1" fmla="*/ 837 w 2930911"/>
+                <a:gd name="connsiteY1" fmla="*/ 0 h 824922"/>
+                <a:gd name="connsiteX2" fmla="*/ 2928703 w 2930911"/>
+                <a:gd name="connsiteY2" fmla="*/ 1 h 824922"/>
+                <a:gd name="connsiteX3" fmla="*/ 2531144 w 2930911"/>
+                <a:gd name="connsiteY3" fmla="*/ 149696 h 824922"/>
+                <a:gd name="connsiteX4" fmla="*/ 2531144 w 2930911"/>
+                <a:gd name="connsiteY4" fmla="*/ 758354 h 824922"/>
+                <a:gd name="connsiteX5" fmla="*/ 2464576 w 2930911"/>
+                <a:gd name="connsiteY5" fmla="*/ 824922 h 824922"/>
+                <a:gd name="connsiteX6" fmla="*/ 1220037 w 2930911"/>
+                <a:gd name="connsiteY6" fmla="*/ 824922 h 824922"/>
+                <a:gd name="connsiteX7" fmla="*/ 1153469 w 2930911"/>
+                <a:gd name="connsiteY7" fmla="*/ 758354 h 824922"/>
+                <a:gd name="connsiteX8" fmla="*/ 1150005 w 2930911"/>
+                <a:gd name="connsiteY8" fmla="*/ 128914 h 824922"/>
+                <a:gd name="connsiteX0" fmla="*/ 1150005 w 2930911"/>
+                <a:gd name="connsiteY0" fmla="*/ 128914 h 824922"/>
+                <a:gd name="connsiteX1" fmla="*/ 837 w 2930911"/>
+                <a:gd name="connsiteY1" fmla="*/ 0 h 824922"/>
+                <a:gd name="connsiteX2" fmla="*/ 2928703 w 2930911"/>
+                <a:gd name="connsiteY2" fmla="*/ 1 h 824922"/>
+                <a:gd name="connsiteX3" fmla="*/ 2531144 w 2930911"/>
+                <a:gd name="connsiteY3" fmla="*/ 149696 h 824922"/>
+                <a:gd name="connsiteX4" fmla="*/ 2531144 w 2930911"/>
+                <a:gd name="connsiteY4" fmla="*/ 758354 h 824922"/>
+                <a:gd name="connsiteX5" fmla="*/ 2464576 w 2930911"/>
+                <a:gd name="connsiteY5" fmla="*/ 824922 h 824922"/>
+                <a:gd name="connsiteX6" fmla="*/ 1220037 w 2930911"/>
+                <a:gd name="connsiteY6" fmla="*/ 824922 h 824922"/>
+                <a:gd name="connsiteX7" fmla="*/ 1153469 w 2930911"/>
+                <a:gd name="connsiteY7" fmla="*/ 758354 h 824922"/>
+                <a:gd name="connsiteX8" fmla="*/ 1150005 w 2930911"/>
+                <a:gd name="connsiteY8" fmla="*/ 128914 h 824922"/>
+                <a:gd name="connsiteX0" fmla="*/ 1150004 w 2930910"/>
+                <a:gd name="connsiteY0" fmla="*/ 128914 h 824922"/>
+                <a:gd name="connsiteX1" fmla="*/ 836 w 2930910"/>
+                <a:gd name="connsiteY1" fmla="*/ 0 h 824922"/>
+                <a:gd name="connsiteX2" fmla="*/ 2928702 w 2930910"/>
+                <a:gd name="connsiteY2" fmla="*/ 1 h 824922"/>
+                <a:gd name="connsiteX3" fmla="*/ 2531143 w 2930910"/>
+                <a:gd name="connsiteY3" fmla="*/ 149696 h 824922"/>
+                <a:gd name="connsiteX4" fmla="*/ 2531143 w 2930910"/>
+                <a:gd name="connsiteY4" fmla="*/ 758354 h 824922"/>
+                <a:gd name="connsiteX5" fmla="*/ 2464575 w 2930910"/>
+                <a:gd name="connsiteY5" fmla="*/ 824922 h 824922"/>
+                <a:gd name="connsiteX6" fmla="*/ 1220036 w 2930910"/>
+                <a:gd name="connsiteY6" fmla="*/ 824922 h 824922"/>
+                <a:gd name="connsiteX7" fmla="*/ 1153468 w 2930910"/>
+                <a:gd name="connsiteY7" fmla="*/ 758354 h 824922"/>
+                <a:gd name="connsiteX8" fmla="*/ 1150004 w 2930910"/>
+                <a:gd name="connsiteY8" fmla="*/ 128914 h 824922"/>
+                <a:gd name="connsiteX0" fmla="*/ 375627 w 2156533"/>
+                <a:gd name="connsiteY0" fmla="*/ 128913 h 824921"/>
+                <a:gd name="connsiteX1" fmla="*/ 2314 w 2156533"/>
+                <a:gd name="connsiteY1" fmla="*/ 6926 h 824921"/>
+                <a:gd name="connsiteX2" fmla="*/ 2154325 w 2156533"/>
+                <a:gd name="connsiteY2" fmla="*/ 0 h 824921"/>
+                <a:gd name="connsiteX3" fmla="*/ 1756766 w 2156533"/>
+                <a:gd name="connsiteY3" fmla="*/ 149695 h 824921"/>
+                <a:gd name="connsiteX4" fmla="*/ 1756766 w 2156533"/>
+                <a:gd name="connsiteY4" fmla="*/ 758353 h 824921"/>
+                <a:gd name="connsiteX5" fmla="*/ 1690198 w 2156533"/>
+                <a:gd name="connsiteY5" fmla="*/ 824921 h 824921"/>
+                <a:gd name="connsiteX6" fmla="*/ 445659 w 2156533"/>
+                <a:gd name="connsiteY6" fmla="*/ 824921 h 824921"/>
+                <a:gd name="connsiteX7" fmla="*/ 379091 w 2156533"/>
+                <a:gd name="connsiteY7" fmla="*/ 758353 h 824921"/>
+                <a:gd name="connsiteX8" fmla="*/ 375627 w 2156533"/>
+                <a:gd name="connsiteY8" fmla="*/ 128913 h 824921"/>
+                <a:gd name="connsiteX0" fmla="*/ 418185 w 2199091"/>
+                <a:gd name="connsiteY0" fmla="*/ 128913 h 824921"/>
+                <a:gd name="connsiteX1" fmla="*/ 44872 w 2199091"/>
+                <a:gd name="connsiteY1" fmla="*/ 6926 h 824921"/>
+                <a:gd name="connsiteX2" fmla="*/ 2196883 w 2199091"/>
+                <a:gd name="connsiteY2" fmla="*/ 0 h 824921"/>
+                <a:gd name="connsiteX3" fmla="*/ 1799324 w 2199091"/>
+                <a:gd name="connsiteY3" fmla="*/ 149695 h 824921"/>
+                <a:gd name="connsiteX4" fmla="*/ 1799324 w 2199091"/>
+                <a:gd name="connsiteY4" fmla="*/ 758353 h 824921"/>
+                <a:gd name="connsiteX5" fmla="*/ 1732756 w 2199091"/>
+                <a:gd name="connsiteY5" fmla="*/ 824921 h 824921"/>
+                <a:gd name="connsiteX6" fmla="*/ 488217 w 2199091"/>
+                <a:gd name="connsiteY6" fmla="*/ 824921 h 824921"/>
+                <a:gd name="connsiteX7" fmla="*/ 421649 w 2199091"/>
+                <a:gd name="connsiteY7" fmla="*/ 758353 h 824921"/>
+                <a:gd name="connsiteX8" fmla="*/ 418185 w 2199091"/>
+                <a:gd name="connsiteY8" fmla="*/ 128913 h 824921"/>
+                <a:gd name="connsiteX0" fmla="*/ 404178 w 2197426"/>
+                <a:gd name="connsiteY0" fmla="*/ 129381 h 825389"/>
+                <a:gd name="connsiteX1" fmla="*/ 30865 w 2197426"/>
+                <a:gd name="connsiteY1" fmla="*/ 7394 h 825389"/>
+                <a:gd name="connsiteX2" fmla="*/ 2182876 w 2197426"/>
+                <a:gd name="connsiteY2" fmla="*/ 468 h 825389"/>
+                <a:gd name="connsiteX3" fmla="*/ 1785317 w 2197426"/>
+                <a:gd name="connsiteY3" fmla="*/ 150163 h 825389"/>
+                <a:gd name="connsiteX4" fmla="*/ 1785317 w 2197426"/>
+                <a:gd name="connsiteY4" fmla="*/ 758821 h 825389"/>
+                <a:gd name="connsiteX5" fmla="*/ 1718749 w 2197426"/>
+                <a:gd name="connsiteY5" fmla="*/ 825389 h 825389"/>
+                <a:gd name="connsiteX6" fmla="*/ 474210 w 2197426"/>
+                <a:gd name="connsiteY6" fmla="*/ 825389 h 825389"/>
+                <a:gd name="connsiteX7" fmla="*/ 407642 w 2197426"/>
+                <a:gd name="connsiteY7" fmla="*/ 758821 h 825389"/>
+                <a:gd name="connsiteX8" fmla="*/ 404178 w 2197426"/>
+                <a:gd name="connsiteY8" fmla="*/ 129381 h 825389"/>
+                <a:gd name="connsiteX0" fmla="*/ 373313 w 2152011"/>
+                <a:gd name="connsiteY0" fmla="*/ 129381 h 825389"/>
+                <a:gd name="connsiteX1" fmla="*/ 0 w 2152011"/>
+                <a:gd name="connsiteY1" fmla="*/ 7394 h 825389"/>
+                <a:gd name="connsiteX2" fmla="*/ 2152011 w 2152011"/>
+                <a:gd name="connsiteY2" fmla="*/ 468 h 825389"/>
+                <a:gd name="connsiteX3" fmla="*/ 1754452 w 2152011"/>
+                <a:gd name="connsiteY3" fmla="*/ 150163 h 825389"/>
+                <a:gd name="connsiteX4" fmla="*/ 1754452 w 2152011"/>
+                <a:gd name="connsiteY4" fmla="*/ 758821 h 825389"/>
+                <a:gd name="connsiteX5" fmla="*/ 1687884 w 2152011"/>
+                <a:gd name="connsiteY5" fmla="*/ 825389 h 825389"/>
+                <a:gd name="connsiteX6" fmla="*/ 443345 w 2152011"/>
+                <a:gd name="connsiteY6" fmla="*/ 825389 h 825389"/>
+                <a:gd name="connsiteX7" fmla="*/ 376777 w 2152011"/>
+                <a:gd name="connsiteY7" fmla="*/ 758821 h 825389"/>
+                <a:gd name="connsiteX8" fmla="*/ 373313 w 2152011"/>
+                <a:gd name="connsiteY8" fmla="*/ 129381 h 825389"/>
+                <a:gd name="connsiteX0" fmla="*/ 436994 w 2018842"/>
+                <a:gd name="connsiteY0" fmla="*/ 132057 h 828065"/>
+                <a:gd name="connsiteX1" fmla="*/ 63681 w 2018842"/>
+                <a:gd name="connsiteY1" fmla="*/ 10070 h 828065"/>
+                <a:gd name="connsiteX2" fmla="*/ 2018842 w 2018842"/>
+                <a:gd name="connsiteY2" fmla="*/ 6319 h 828065"/>
+                <a:gd name="connsiteX3" fmla="*/ 1818133 w 2018842"/>
+                <a:gd name="connsiteY3" fmla="*/ 152839 h 828065"/>
+                <a:gd name="connsiteX4" fmla="*/ 1818133 w 2018842"/>
+                <a:gd name="connsiteY4" fmla="*/ 761497 h 828065"/>
+                <a:gd name="connsiteX5" fmla="*/ 1751565 w 2018842"/>
+                <a:gd name="connsiteY5" fmla="*/ 828065 h 828065"/>
+                <a:gd name="connsiteX6" fmla="*/ 507026 w 2018842"/>
+                <a:gd name="connsiteY6" fmla="*/ 828065 h 828065"/>
+                <a:gd name="connsiteX7" fmla="*/ 440458 w 2018842"/>
+                <a:gd name="connsiteY7" fmla="*/ 761497 h 828065"/>
+                <a:gd name="connsiteX8" fmla="*/ 436994 w 2018842"/>
+                <a:gd name="connsiteY8" fmla="*/ 132057 h 828065"/>
+                <a:gd name="connsiteX0" fmla="*/ 436994 w 2023402"/>
+                <a:gd name="connsiteY0" fmla="*/ 131514 h 827522"/>
+                <a:gd name="connsiteX1" fmla="*/ 63681 w 2023402"/>
+                <a:gd name="connsiteY1" fmla="*/ 9527 h 827522"/>
+                <a:gd name="connsiteX2" fmla="*/ 2018842 w 2023402"/>
+                <a:gd name="connsiteY2" fmla="*/ 5776 h 827522"/>
+                <a:gd name="connsiteX3" fmla="*/ 1818133 w 2023402"/>
+                <a:gd name="connsiteY3" fmla="*/ 152296 h 827522"/>
+                <a:gd name="connsiteX4" fmla="*/ 1818133 w 2023402"/>
+                <a:gd name="connsiteY4" fmla="*/ 760954 h 827522"/>
+                <a:gd name="connsiteX5" fmla="*/ 1751565 w 2023402"/>
+                <a:gd name="connsiteY5" fmla="*/ 827522 h 827522"/>
+                <a:gd name="connsiteX6" fmla="*/ 507026 w 2023402"/>
+                <a:gd name="connsiteY6" fmla="*/ 827522 h 827522"/>
+                <a:gd name="connsiteX7" fmla="*/ 440458 w 2023402"/>
+                <a:gd name="connsiteY7" fmla="*/ 760954 h 827522"/>
+                <a:gd name="connsiteX8" fmla="*/ 436994 w 2023402"/>
+                <a:gd name="connsiteY8" fmla="*/ 131514 h 827522"/>
+                <a:gd name="connsiteX0" fmla="*/ 260186 w 1921406"/>
+                <a:gd name="connsiteY0" fmla="*/ 144219 h 840227"/>
+                <a:gd name="connsiteX1" fmla="*/ 83723 w 1921406"/>
+                <a:gd name="connsiteY1" fmla="*/ 15882 h 840227"/>
+                <a:gd name="connsiteX2" fmla="*/ 1842034 w 1921406"/>
+                <a:gd name="connsiteY2" fmla="*/ 18481 h 840227"/>
+                <a:gd name="connsiteX3" fmla="*/ 1641325 w 1921406"/>
+                <a:gd name="connsiteY3" fmla="*/ 165001 h 840227"/>
+                <a:gd name="connsiteX4" fmla="*/ 1641325 w 1921406"/>
+                <a:gd name="connsiteY4" fmla="*/ 773659 h 840227"/>
+                <a:gd name="connsiteX5" fmla="*/ 1574757 w 1921406"/>
+                <a:gd name="connsiteY5" fmla="*/ 840227 h 840227"/>
+                <a:gd name="connsiteX6" fmla="*/ 330218 w 1921406"/>
+                <a:gd name="connsiteY6" fmla="*/ 840227 h 840227"/>
+                <a:gd name="connsiteX7" fmla="*/ 263650 w 1921406"/>
+                <a:gd name="connsiteY7" fmla="*/ 773659 h 840227"/>
+                <a:gd name="connsiteX8" fmla="*/ 260186 w 1921406"/>
+                <a:gd name="connsiteY8" fmla="*/ 144219 h 840227"/>
+                <a:gd name="connsiteX0" fmla="*/ 184184 w 1845404"/>
+                <a:gd name="connsiteY0" fmla="*/ 137193 h 833201"/>
+                <a:gd name="connsiteX1" fmla="*/ 7721 w 1845404"/>
+                <a:gd name="connsiteY1" fmla="*/ 8856 h 833201"/>
+                <a:gd name="connsiteX2" fmla="*/ 1766032 w 1845404"/>
+                <a:gd name="connsiteY2" fmla="*/ 11455 h 833201"/>
+                <a:gd name="connsiteX3" fmla="*/ 1565323 w 1845404"/>
+                <a:gd name="connsiteY3" fmla="*/ 157975 h 833201"/>
+                <a:gd name="connsiteX4" fmla="*/ 1565323 w 1845404"/>
+                <a:gd name="connsiteY4" fmla="*/ 766633 h 833201"/>
+                <a:gd name="connsiteX5" fmla="*/ 1498755 w 1845404"/>
+                <a:gd name="connsiteY5" fmla="*/ 833201 h 833201"/>
+                <a:gd name="connsiteX6" fmla="*/ 254216 w 1845404"/>
+                <a:gd name="connsiteY6" fmla="*/ 833201 h 833201"/>
+                <a:gd name="connsiteX7" fmla="*/ 187648 w 1845404"/>
+                <a:gd name="connsiteY7" fmla="*/ 766633 h 833201"/>
+                <a:gd name="connsiteX8" fmla="*/ 184184 w 1845404"/>
+                <a:gd name="connsiteY8" fmla="*/ 137193 h 833201"/>
+                <a:gd name="connsiteX0" fmla="*/ 254154 w 1839241"/>
+                <a:gd name="connsiteY0" fmla="*/ 147999 h 844007"/>
+                <a:gd name="connsiteX1" fmla="*/ 77691 w 1839241"/>
+                <a:gd name="connsiteY1" fmla="*/ 19662 h 844007"/>
+                <a:gd name="connsiteX2" fmla="*/ 1747102 w 1839241"/>
+                <a:gd name="connsiteY2" fmla="*/ 15911 h 844007"/>
+                <a:gd name="connsiteX3" fmla="*/ 1635293 w 1839241"/>
+                <a:gd name="connsiteY3" fmla="*/ 168781 h 844007"/>
+                <a:gd name="connsiteX4" fmla="*/ 1635293 w 1839241"/>
+                <a:gd name="connsiteY4" fmla="*/ 777439 h 844007"/>
+                <a:gd name="connsiteX5" fmla="*/ 1568725 w 1839241"/>
+                <a:gd name="connsiteY5" fmla="*/ 844007 h 844007"/>
+                <a:gd name="connsiteX6" fmla="*/ 324186 w 1839241"/>
+                <a:gd name="connsiteY6" fmla="*/ 844007 h 844007"/>
+                <a:gd name="connsiteX7" fmla="*/ 257618 w 1839241"/>
+                <a:gd name="connsiteY7" fmla="*/ 777439 h 844007"/>
+                <a:gd name="connsiteX8" fmla="*/ 254154 w 1839241"/>
+                <a:gd name="connsiteY8" fmla="*/ 147999 h 844007"/>
+                <a:gd name="connsiteX0" fmla="*/ 254154 w 1752323"/>
+                <a:gd name="connsiteY0" fmla="*/ 139925 h 835933"/>
+                <a:gd name="connsiteX1" fmla="*/ 77691 w 1752323"/>
+                <a:gd name="connsiteY1" fmla="*/ 11588 h 835933"/>
+                <a:gd name="connsiteX2" fmla="*/ 1747102 w 1752323"/>
+                <a:gd name="connsiteY2" fmla="*/ 7837 h 835933"/>
+                <a:gd name="connsiteX3" fmla="*/ 1635293 w 1752323"/>
+                <a:gd name="connsiteY3" fmla="*/ 160707 h 835933"/>
+                <a:gd name="connsiteX4" fmla="*/ 1635293 w 1752323"/>
+                <a:gd name="connsiteY4" fmla="*/ 769365 h 835933"/>
+                <a:gd name="connsiteX5" fmla="*/ 1568725 w 1752323"/>
+                <a:gd name="connsiteY5" fmla="*/ 835933 h 835933"/>
+                <a:gd name="connsiteX6" fmla="*/ 324186 w 1752323"/>
+                <a:gd name="connsiteY6" fmla="*/ 835933 h 835933"/>
+                <a:gd name="connsiteX7" fmla="*/ 257618 w 1752323"/>
+                <a:gd name="connsiteY7" fmla="*/ 769365 h 835933"/>
+                <a:gd name="connsiteX8" fmla="*/ 254154 w 1752323"/>
+                <a:gd name="connsiteY8" fmla="*/ 139925 h 835933"/>
+                <a:gd name="connsiteX0" fmla="*/ 256302 w 1786136"/>
+                <a:gd name="connsiteY0" fmla="*/ 138666 h 834674"/>
+                <a:gd name="connsiteX1" fmla="*/ 79839 w 1786136"/>
+                <a:gd name="connsiteY1" fmla="*/ 10329 h 834674"/>
+                <a:gd name="connsiteX2" fmla="*/ 1781000 w 1786136"/>
+                <a:gd name="connsiteY2" fmla="*/ 9753 h 834674"/>
+                <a:gd name="connsiteX3" fmla="*/ 1637441 w 1786136"/>
+                <a:gd name="connsiteY3" fmla="*/ 159448 h 834674"/>
+                <a:gd name="connsiteX4" fmla="*/ 1637441 w 1786136"/>
+                <a:gd name="connsiteY4" fmla="*/ 768106 h 834674"/>
+                <a:gd name="connsiteX5" fmla="*/ 1570873 w 1786136"/>
+                <a:gd name="connsiteY5" fmla="*/ 834674 h 834674"/>
+                <a:gd name="connsiteX6" fmla="*/ 326334 w 1786136"/>
+                <a:gd name="connsiteY6" fmla="*/ 834674 h 834674"/>
+                <a:gd name="connsiteX7" fmla="*/ 259766 w 1786136"/>
+                <a:gd name="connsiteY7" fmla="*/ 768106 h 834674"/>
+                <a:gd name="connsiteX8" fmla="*/ 256302 w 1786136"/>
+                <a:gd name="connsiteY8" fmla="*/ 138666 h 834674"/>
+                <a:gd name="connsiteX0" fmla="*/ 181625 w 1710512"/>
+                <a:gd name="connsiteY0" fmla="*/ 130557 h 826565"/>
+                <a:gd name="connsiteX1" fmla="*/ 5162 w 1710512"/>
+                <a:gd name="connsiteY1" fmla="*/ 2220 h 826565"/>
+                <a:gd name="connsiteX2" fmla="*/ 1706323 w 1710512"/>
+                <a:gd name="connsiteY2" fmla="*/ 1644 h 826565"/>
+                <a:gd name="connsiteX3" fmla="*/ 1562764 w 1710512"/>
+                <a:gd name="connsiteY3" fmla="*/ 151339 h 826565"/>
+                <a:gd name="connsiteX4" fmla="*/ 1562764 w 1710512"/>
+                <a:gd name="connsiteY4" fmla="*/ 759997 h 826565"/>
+                <a:gd name="connsiteX5" fmla="*/ 1496196 w 1710512"/>
+                <a:gd name="connsiteY5" fmla="*/ 826565 h 826565"/>
+                <a:gd name="connsiteX6" fmla="*/ 251657 w 1710512"/>
+                <a:gd name="connsiteY6" fmla="*/ 826565 h 826565"/>
+                <a:gd name="connsiteX7" fmla="*/ 185089 w 1710512"/>
+                <a:gd name="connsiteY7" fmla="*/ 759997 h 826565"/>
+                <a:gd name="connsiteX8" fmla="*/ 181625 w 1710512"/>
+                <a:gd name="connsiteY8" fmla="*/ 130557 h 826565"/>
+                <a:gd name="connsiteX0" fmla="*/ 157442 w 1767509"/>
+                <a:gd name="connsiteY0" fmla="*/ 139313 h 835321"/>
+                <a:gd name="connsiteX1" fmla="*/ 6379 w 1767509"/>
+                <a:gd name="connsiteY1" fmla="*/ 14151 h 835321"/>
+                <a:gd name="connsiteX2" fmla="*/ 1682140 w 1767509"/>
+                <a:gd name="connsiteY2" fmla="*/ 10400 h 835321"/>
+                <a:gd name="connsiteX3" fmla="*/ 1538581 w 1767509"/>
+                <a:gd name="connsiteY3" fmla="*/ 160095 h 835321"/>
+                <a:gd name="connsiteX4" fmla="*/ 1538581 w 1767509"/>
+                <a:gd name="connsiteY4" fmla="*/ 768753 h 835321"/>
+                <a:gd name="connsiteX5" fmla="*/ 1472013 w 1767509"/>
+                <a:gd name="connsiteY5" fmla="*/ 835321 h 835321"/>
+                <a:gd name="connsiteX6" fmla="*/ 227474 w 1767509"/>
+                <a:gd name="connsiteY6" fmla="*/ 835321 h 835321"/>
+                <a:gd name="connsiteX7" fmla="*/ 160906 w 1767509"/>
+                <a:gd name="connsiteY7" fmla="*/ 768753 h 835321"/>
+                <a:gd name="connsiteX8" fmla="*/ 157442 w 1767509"/>
+                <a:gd name="connsiteY8" fmla="*/ 139313 h 835321"/>
+                <a:gd name="connsiteX0" fmla="*/ 155631 w 1765698"/>
+                <a:gd name="connsiteY0" fmla="*/ 139999 h 836007"/>
+                <a:gd name="connsiteX1" fmla="*/ 4568 w 1765698"/>
+                <a:gd name="connsiteY1" fmla="*/ 14837 h 836007"/>
+                <a:gd name="connsiteX2" fmla="*/ 1680329 w 1765698"/>
+                <a:gd name="connsiteY2" fmla="*/ 11086 h 836007"/>
+                <a:gd name="connsiteX3" fmla="*/ 1536770 w 1765698"/>
+                <a:gd name="connsiteY3" fmla="*/ 160781 h 836007"/>
+                <a:gd name="connsiteX4" fmla="*/ 1536770 w 1765698"/>
+                <a:gd name="connsiteY4" fmla="*/ 769439 h 836007"/>
+                <a:gd name="connsiteX5" fmla="*/ 1470202 w 1765698"/>
+                <a:gd name="connsiteY5" fmla="*/ 836007 h 836007"/>
+                <a:gd name="connsiteX6" fmla="*/ 225663 w 1765698"/>
+                <a:gd name="connsiteY6" fmla="*/ 836007 h 836007"/>
+                <a:gd name="connsiteX7" fmla="*/ 159095 w 1765698"/>
+                <a:gd name="connsiteY7" fmla="*/ 769439 h 836007"/>
+                <a:gd name="connsiteX8" fmla="*/ 155631 w 1765698"/>
+                <a:gd name="connsiteY8" fmla="*/ 139999 h 836007"/>
+                <a:gd name="connsiteX0" fmla="*/ 155631 w 1765698"/>
+                <a:gd name="connsiteY0" fmla="*/ 139999 h 836007"/>
+                <a:gd name="connsiteX1" fmla="*/ 4568 w 1765698"/>
+                <a:gd name="connsiteY1" fmla="*/ 14837 h 836007"/>
+                <a:gd name="connsiteX2" fmla="*/ 1680329 w 1765698"/>
+                <a:gd name="connsiteY2" fmla="*/ 11086 h 836007"/>
+                <a:gd name="connsiteX3" fmla="*/ 1536770 w 1765698"/>
+                <a:gd name="connsiteY3" fmla="*/ 160781 h 836007"/>
+                <a:gd name="connsiteX4" fmla="*/ 1536770 w 1765698"/>
+                <a:gd name="connsiteY4" fmla="*/ 769439 h 836007"/>
+                <a:gd name="connsiteX5" fmla="*/ 1470202 w 1765698"/>
+                <a:gd name="connsiteY5" fmla="*/ 836007 h 836007"/>
+                <a:gd name="connsiteX6" fmla="*/ 225663 w 1765698"/>
+                <a:gd name="connsiteY6" fmla="*/ 836007 h 836007"/>
+                <a:gd name="connsiteX7" fmla="*/ 159095 w 1765698"/>
+                <a:gd name="connsiteY7" fmla="*/ 769439 h 836007"/>
+                <a:gd name="connsiteX8" fmla="*/ 155631 w 1765698"/>
+                <a:gd name="connsiteY8" fmla="*/ 139999 h 836007"/>
+                <a:gd name="connsiteX0" fmla="*/ 154777 w 1684351"/>
+                <a:gd name="connsiteY0" fmla="*/ 131536 h 827544"/>
+                <a:gd name="connsiteX1" fmla="*/ 3714 w 1684351"/>
+                <a:gd name="connsiteY1" fmla="*/ 6374 h 827544"/>
+                <a:gd name="connsiteX2" fmla="*/ 1679475 w 1684351"/>
+                <a:gd name="connsiteY2" fmla="*/ 2623 h 827544"/>
+                <a:gd name="connsiteX3" fmla="*/ 1535916 w 1684351"/>
+                <a:gd name="connsiteY3" fmla="*/ 152318 h 827544"/>
+                <a:gd name="connsiteX4" fmla="*/ 1535916 w 1684351"/>
+                <a:gd name="connsiteY4" fmla="*/ 760976 h 827544"/>
+                <a:gd name="connsiteX5" fmla="*/ 1469348 w 1684351"/>
+                <a:gd name="connsiteY5" fmla="*/ 827544 h 827544"/>
+                <a:gd name="connsiteX6" fmla="*/ 224809 w 1684351"/>
+                <a:gd name="connsiteY6" fmla="*/ 827544 h 827544"/>
+                <a:gd name="connsiteX7" fmla="*/ 158241 w 1684351"/>
+                <a:gd name="connsiteY7" fmla="*/ 760976 h 827544"/>
+                <a:gd name="connsiteX8" fmla="*/ 154777 w 1684351"/>
+                <a:gd name="connsiteY8" fmla="*/ 131536 h 827544"/>
+                <a:gd name="connsiteX0" fmla="*/ 236936 w 1786555"/>
+                <a:gd name="connsiteY0" fmla="*/ 135949 h 831957"/>
+                <a:gd name="connsiteX1" fmla="*/ 85873 w 1786555"/>
+                <a:gd name="connsiteY1" fmla="*/ 10787 h 831957"/>
+                <a:gd name="connsiteX2" fmla="*/ 1780684 w 1786555"/>
+                <a:gd name="connsiteY2" fmla="*/ 10211 h 831957"/>
+                <a:gd name="connsiteX3" fmla="*/ 1618075 w 1786555"/>
+                <a:gd name="connsiteY3" fmla="*/ 156731 h 831957"/>
+                <a:gd name="connsiteX4" fmla="*/ 1618075 w 1786555"/>
+                <a:gd name="connsiteY4" fmla="*/ 765389 h 831957"/>
+                <a:gd name="connsiteX5" fmla="*/ 1551507 w 1786555"/>
+                <a:gd name="connsiteY5" fmla="*/ 831957 h 831957"/>
+                <a:gd name="connsiteX6" fmla="*/ 306968 w 1786555"/>
+                <a:gd name="connsiteY6" fmla="*/ 831957 h 831957"/>
+                <a:gd name="connsiteX7" fmla="*/ 240400 w 1786555"/>
+                <a:gd name="connsiteY7" fmla="*/ 765389 h 831957"/>
+                <a:gd name="connsiteX8" fmla="*/ 236936 w 1786555"/>
+                <a:gd name="connsiteY8" fmla="*/ 135949 h 831957"/>
+                <a:gd name="connsiteX0" fmla="*/ 157046 w 1705555"/>
+                <a:gd name="connsiteY0" fmla="*/ 128377 h 824385"/>
+                <a:gd name="connsiteX1" fmla="*/ 5983 w 1705555"/>
+                <a:gd name="connsiteY1" fmla="*/ 3215 h 824385"/>
+                <a:gd name="connsiteX2" fmla="*/ 1700794 w 1705555"/>
+                <a:gd name="connsiteY2" fmla="*/ 2639 h 824385"/>
+                <a:gd name="connsiteX3" fmla="*/ 1538185 w 1705555"/>
+                <a:gd name="connsiteY3" fmla="*/ 149159 h 824385"/>
+                <a:gd name="connsiteX4" fmla="*/ 1538185 w 1705555"/>
+                <a:gd name="connsiteY4" fmla="*/ 757817 h 824385"/>
+                <a:gd name="connsiteX5" fmla="*/ 1471617 w 1705555"/>
+                <a:gd name="connsiteY5" fmla="*/ 824385 h 824385"/>
+                <a:gd name="connsiteX6" fmla="*/ 227078 w 1705555"/>
+                <a:gd name="connsiteY6" fmla="*/ 824385 h 824385"/>
+                <a:gd name="connsiteX7" fmla="*/ 160510 w 1705555"/>
+                <a:gd name="connsiteY7" fmla="*/ 757817 h 824385"/>
+                <a:gd name="connsiteX8" fmla="*/ 157046 w 1705555"/>
+                <a:gd name="connsiteY8" fmla="*/ 128377 h 824385"/>
+                <a:gd name="connsiteX0" fmla="*/ 158360 w 1784749"/>
+                <a:gd name="connsiteY0" fmla="*/ 140824 h 836832"/>
+                <a:gd name="connsiteX1" fmla="*/ 7297 w 1784749"/>
+                <a:gd name="connsiteY1" fmla="*/ 15662 h 836832"/>
+                <a:gd name="connsiteX2" fmla="*/ 1702108 w 1784749"/>
+                <a:gd name="connsiteY2" fmla="*/ 15086 h 836832"/>
+                <a:gd name="connsiteX3" fmla="*/ 1539499 w 1784749"/>
+                <a:gd name="connsiteY3" fmla="*/ 215581 h 836832"/>
+                <a:gd name="connsiteX4" fmla="*/ 1539499 w 1784749"/>
+                <a:gd name="connsiteY4" fmla="*/ 770264 h 836832"/>
+                <a:gd name="connsiteX5" fmla="*/ 1472931 w 1784749"/>
+                <a:gd name="connsiteY5" fmla="*/ 836832 h 836832"/>
+                <a:gd name="connsiteX6" fmla="*/ 228392 w 1784749"/>
+                <a:gd name="connsiteY6" fmla="*/ 836832 h 836832"/>
+                <a:gd name="connsiteX7" fmla="*/ 161824 w 1784749"/>
+                <a:gd name="connsiteY7" fmla="*/ 770264 h 836832"/>
+                <a:gd name="connsiteX8" fmla="*/ 158360 w 1784749"/>
+                <a:gd name="connsiteY8" fmla="*/ 140824 h 836832"/>
+                <a:gd name="connsiteX0" fmla="*/ 239426 w 1862640"/>
+                <a:gd name="connsiteY0" fmla="*/ 233513 h 846971"/>
+                <a:gd name="connsiteX1" fmla="*/ 85188 w 1862640"/>
+                <a:gd name="connsiteY1" fmla="*/ 25801 h 846971"/>
+                <a:gd name="connsiteX2" fmla="*/ 1779999 w 1862640"/>
+                <a:gd name="connsiteY2" fmla="*/ 25225 h 846971"/>
+                <a:gd name="connsiteX3" fmla="*/ 1617390 w 1862640"/>
+                <a:gd name="connsiteY3" fmla="*/ 225720 h 846971"/>
+                <a:gd name="connsiteX4" fmla="*/ 1617390 w 1862640"/>
+                <a:gd name="connsiteY4" fmla="*/ 780403 h 846971"/>
+                <a:gd name="connsiteX5" fmla="*/ 1550822 w 1862640"/>
+                <a:gd name="connsiteY5" fmla="*/ 846971 h 846971"/>
+                <a:gd name="connsiteX6" fmla="*/ 306283 w 1862640"/>
+                <a:gd name="connsiteY6" fmla="*/ 846971 h 846971"/>
+                <a:gd name="connsiteX7" fmla="*/ 239715 w 1862640"/>
+                <a:gd name="connsiteY7" fmla="*/ 780403 h 846971"/>
+                <a:gd name="connsiteX8" fmla="*/ 239426 w 1862640"/>
+                <a:gd name="connsiteY8" fmla="*/ 233513 h 846971"/>
+                <a:gd name="connsiteX0" fmla="*/ 238598 w 1861812"/>
+                <a:gd name="connsiteY0" fmla="*/ 233513 h 846971"/>
+                <a:gd name="connsiteX1" fmla="*/ 84360 w 1861812"/>
+                <a:gd name="connsiteY1" fmla="*/ 25801 h 846971"/>
+                <a:gd name="connsiteX2" fmla="*/ 1779171 w 1861812"/>
+                <a:gd name="connsiteY2" fmla="*/ 25225 h 846971"/>
+                <a:gd name="connsiteX3" fmla="*/ 1616562 w 1861812"/>
+                <a:gd name="connsiteY3" fmla="*/ 225720 h 846971"/>
+                <a:gd name="connsiteX4" fmla="*/ 1616562 w 1861812"/>
+                <a:gd name="connsiteY4" fmla="*/ 780403 h 846971"/>
+                <a:gd name="connsiteX5" fmla="*/ 1549994 w 1861812"/>
+                <a:gd name="connsiteY5" fmla="*/ 846971 h 846971"/>
+                <a:gd name="connsiteX6" fmla="*/ 305455 w 1861812"/>
+                <a:gd name="connsiteY6" fmla="*/ 846971 h 846971"/>
+                <a:gd name="connsiteX7" fmla="*/ 238887 w 1861812"/>
+                <a:gd name="connsiteY7" fmla="*/ 780403 h 846971"/>
+                <a:gd name="connsiteX8" fmla="*/ 238598 w 1861812"/>
+                <a:gd name="connsiteY8" fmla="*/ 233513 h 846971"/>
+                <a:gd name="connsiteX0" fmla="*/ 238598 w 1862214"/>
+                <a:gd name="connsiteY0" fmla="*/ 233513 h 846971"/>
+                <a:gd name="connsiteX1" fmla="*/ 84360 w 1862214"/>
+                <a:gd name="connsiteY1" fmla="*/ 25801 h 846971"/>
+                <a:gd name="connsiteX2" fmla="*/ 1779171 w 1862214"/>
+                <a:gd name="connsiteY2" fmla="*/ 25225 h 846971"/>
+                <a:gd name="connsiteX3" fmla="*/ 1616562 w 1862214"/>
+                <a:gd name="connsiteY3" fmla="*/ 225720 h 846971"/>
+                <a:gd name="connsiteX4" fmla="*/ 1616562 w 1862214"/>
+                <a:gd name="connsiteY4" fmla="*/ 780403 h 846971"/>
+                <a:gd name="connsiteX5" fmla="*/ 1549994 w 1862214"/>
+                <a:gd name="connsiteY5" fmla="*/ 846971 h 846971"/>
+                <a:gd name="connsiteX6" fmla="*/ 305455 w 1862214"/>
+                <a:gd name="connsiteY6" fmla="*/ 846971 h 846971"/>
+                <a:gd name="connsiteX7" fmla="*/ 238887 w 1862214"/>
+                <a:gd name="connsiteY7" fmla="*/ 780403 h 846971"/>
+                <a:gd name="connsiteX8" fmla="*/ 238598 w 1862214"/>
+                <a:gd name="connsiteY8" fmla="*/ 233513 h 846971"/>
+                <a:gd name="connsiteX0" fmla="*/ 238160 w 1856323"/>
+                <a:gd name="connsiteY0" fmla="*/ 248080 h 861538"/>
+                <a:gd name="connsiteX1" fmla="*/ 83922 w 1856323"/>
+                <a:gd name="connsiteY1" fmla="*/ 40368 h 861538"/>
+                <a:gd name="connsiteX2" fmla="*/ 1772383 w 1856323"/>
+                <a:gd name="connsiteY2" fmla="*/ 17567 h 861538"/>
+                <a:gd name="connsiteX3" fmla="*/ 1616124 w 1856323"/>
+                <a:gd name="connsiteY3" fmla="*/ 240287 h 861538"/>
+                <a:gd name="connsiteX4" fmla="*/ 1616124 w 1856323"/>
+                <a:gd name="connsiteY4" fmla="*/ 794970 h 861538"/>
+                <a:gd name="connsiteX5" fmla="*/ 1549556 w 1856323"/>
+                <a:gd name="connsiteY5" fmla="*/ 861538 h 861538"/>
+                <a:gd name="connsiteX6" fmla="*/ 305017 w 1856323"/>
+                <a:gd name="connsiteY6" fmla="*/ 861538 h 861538"/>
+                <a:gd name="connsiteX7" fmla="*/ 238449 w 1856323"/>
+                <a:gd name="connsiteY7" fmla="*/ 794970 h 861538"/>
+                <a:gd name="connsiteX8" fmla="*/ 238160 w 1856323"/>
+                <a:gd name="connsiteY8" fmla="*/ 248080 h 861538"/>
+                <a:gd name="connsiteX0" fmla="*/ 238160 w 1785863"/>
+                <a:gd name="connsiteY0" fmla="*/ 242493 h 855951"/>
+                <a:gd name="connsiteX1" fmla="*/ 83922 w 1785863"/>
+                <a:gd name="connsiteY1" fmla="*/ 34781 h 855951"/>
+                <a:gd name="connsiteX2" fmla="*/ 1772383 w 1785863"/>
+                <a:gd name="connsiteY2" fmla="*/ 11980 h 855951"/>
+                <a:gd name="connsiteX3" fmla="*/ 1616124 w 1785863"/>
+                <a:gd name="connsiteY3" fmla="*/ 234700 h 855951"/>
+                <a:gd name="connsiteX4" fmla="*/ 1616124 w 1785863"/>
+                <a:gd name="connsiteY4" fmla="*/ 789383 h 855951"/>
+                <a:gd name="connsiteX5" fmla="*/ 1549556 w 1785863"/>
+                <a:gd name="connsiteY5" fmla="*/ 855951 h 855951"/>
+                <a:gd name="connsiteX6" fmla="*/ 305017 w 1785863"/>
+                <a:gd name="connsiteY6" fmla="*/ 855951 h 855951"/>
+                <a:gd name="connsiteX7" fmla="*/ 238449 w 1785863"/>
+                <a:gd name="connsiteY7" fmla="*/ 789383 h 855951"/>
+                <a:gd name="connsiteX8" fmla="*/ 238160 w 1785863"/>
+                <a:gd name="connsiteY8" fmla="*/ 242493 h 855951"/>
+                <a:gd name="connsiteX0" fmla="*/ 239914 w 1812854"/>
+                <a:gd name="connsiteY0" fmla="*/ 232326 h 845784"/>
+                <a:gd name="connsiteX1" fmla="*/ 85676 w 1812854"/>
+                <a:gd name="connsiteY1" fmla="*/ 24614 h 845784"/>
+                <a:gd name="connsiteX2" fmla="*/ 1799537 w 1812854"/>
+                <a:gd name="connsiteY2" fmla="*/ 17688 h 845784"/>
+                <a:gd name="connsiteX3" fmla="*/ 1617878 w 1812854"/>
+                <a:gd name="connsiteY3" fmla="*/ 224533 h 845784"/>
+                <a:gd name="connsiteX4" fmla="*/ 1617878 w 1812854"/>
+                <a:gd name="connsiteY4" fmla="*/ 779216 h 845784"/>
+                <a:gd name="connsiteX5" fmla="*/ 1551310 w 1812854"/>
+                <a:gd name="connsiteY5" fmla="*/ 845784 h 845784"/>
+                <a:gd name="connsiteX6" fmla="*/ 306771 w 1812854"/>
+                <a:gd name="connsiteY6" fmla="*/ 845784 h 845784"/>
+                <a:gd name="connsiteX7" fmla="*/ 240203 w 1812854"/>
+                <a:gd name="connsiteY7" fmla="*/ 779216 h 845784"/>
+                <a:gd name="connsiteX8" fmla="*/ 239914 w 1812854"/>
+                <a:gd name="connsiteY8" fmla="*/ 232326 h 845784"/>
+                <a:gd name="connsiteX0" fmla="*/ 241013 w 1829728"/>
+                <a:gd name="connsiteY0" fmla="*/ 230621 h 844079"/>
+                <a:gd name="connsiteX1" fmla="*/ 86775 w 1829728"/>
+                <a:gd name="connsiteY1" fmla="*/ 22909 h 844079"/>
+                <a:gd name="connsiteX2" fmla="*/ 1816511 w 1829728"/>
+                <a:gd name="connsiteY2" fmla="*/ 19158 h 844079"/>
+                <a:gd name="connsiteX3" fmla="*/ 1618977 w 1829728"/>
+                <a:gd name="connsiteY3" fmla="*/ 222828 h 844079"/>
+                <a:gd name="connsiteX4" fmla="*/ 1618977 w 1829728"/>
+                <a:gd name="connsiteY4" fmla="*/ 777511 h 844079"/>
+                <a:gd name="connsiteX5" fmla="*/ 1552409 w 1829728"/>
+                <a:gd name="connsiteY5" fmla="*/ 844079 h 844079"/>
+                <a:gd name="connsiteX6" fmla="*/ 307870 w 1829728"/>
+                <a:gd name="connsiteY6" fmla="*/ 844079 h 844079"/>
+                <a:gd name="connsiteX7" fmla="*/ 241302 w 1829728"/>
+                <a:gd name="connsiteY7" fmla="*/ 777511 h 844079"/>
+                <a:gd name="connsiteX8" fmla="*/ 241013 w 1829728"/>
+                <a:gd name="connsiteY8" fmla="*/ 230621 h 844079"/>
+                <a:gd name="connsiteX0" fmla="*/ 241013 w 1829728"/>
+                <a:gd name="connsiteY0" fmla="*/ 224021 h 837479"/>
+                <a:gd name="connsiteX1" fmla="*/ 86775 w 1829728"/>
+                <a:gd name="connsiteY1" fmla="*/ 16309 h 837479"/>
+                <a:gd name="connsiteX2" fmla="*/ 1816511 w 1829728"/>
+                <a:gd name="connsiteY2" fmla="*/ 12558 h 837479"/>
+                <a:gd name="connsiteX3" fmla="*/ 1618977 w 1829728"/>
+                <a:gd name="connsiteY3" fmla="*/ 216228 h 837479"/>
+                <a:gd name="connsiteX4" fmla="*/ 1618977 w 1829728"/>
+                <a:gd name="connsiteY4" fmla="*/ 770911 h 837479"/>
+                <a:gd name="connsiteX5" fmla="*/ 1552409 w 1829728"/>
+                <a:gd name="connsiteY5" fmla="*/ 837479 h 837479"/>
+                <a:gd name="connsiteX6" fmla="*/ 307870 w 1829728"/>
+                <a:gd name="connsiteY6" fmla="*/ 837479 h 837479"/>
+                <a:gd name="connsiteX7" fmla="*/ 241302 w 1829728"/>
+                <a:gd name="connsiteY7" fmla="*/ 770911 h 837479"/>
+                <a:gd name="connsiteX8" fmla="*/ 241013 w 1829728"/>
+                <a:gd name="connsiteY8" fmla="*/ 224021 h 837479"/>
+                <a:gd name="connsiteX0" fmla="*/ 241013 w 1829728"/>
+                <a:gd name="connsiteY0" fmla="*/ 224021 h 837479"/>
+                <a:gd name="connsiteX1" fmla="*/ 86775 w 1829728"/>
+                <a:gd name="connsiteY1" fmla="*/ 16309 h 837479"/>
+                <a:gd name="connsiteX2" fmla="*/ 1816511 w 1829728"/>
+                <a:gd name="connsiteY2" fmla="*/ 12558 h 837479"/>
+                <a:gd name="connsiteX3" fmla="*/ 1618977 w 1829728"/>
+                <a:gd name="connsiteY3" fmla="*/ 216228 h 837479"/>
+                <a:gd name="connsiteX4" fmla="*/ 1618977 w 1829728"/>
+                <a:gd name="connsiteY4" fmla="*/ 770911 h 837479"/>
+                <a:gd name="connsiteX5" fmla="*/ 1552409 w 1829728"/>
+                <a:gd name="connsiteY5" fmla="*/ 837479 h 837479"/>
+                <a:gd name="connsiteX6" fmla="*/ 307870 w 1829728"/>
+                <a:gd name="connsiteY6" fmla="*/ 837479 h 837479"/>
+                <a:gd name="connsiteX7" fmla="*/ 241302 w 1829728"/>
+                <a:gd name="connsiteY7" fmla="*/ 770911 h 837479"/>
+                <a:gd name="connsiteX8" fmla="*/ 241013 w 1829728"/>
+                <a:gd name="connsiteY8" fmla="*/ 224021 h 837479"/>
+                <a:gd name="connsiteX0" fmla="*/ 216773 w 1868784"/>
+                <a:gd name="connsiteY0" fmla="*/ 251658 h 865116"/>
+                <a:gd name="connsiteX1" fmla="*/ 91110 w 1868784"/>
+                <a:gd name="connsiteY1" fmla="*/ 18546 h 865116"/>
+                <a:gd name="connsiteX2" fmla="*/ 1792271 w 1868784"/>
+                <a:gd name="connsiteY2" fmla="*/ 40195 h 865116"/>
+                <a:gd name="connsiteX3" fmla="*/ 1594737 w 1868784"/>
+                <a:gd name="connsiteY3" fmla="*/ 243865 h 865116"/>
+                <a:gd name="connsiteX4" fmla="*/ 1594737 w 1868784"/>
+                <a:gd name="connsiteY4" fmla="*/ 798548 h 865116"/>
+                <a:gd name="connsiteX5" fmla="*/ 1528169 w 1868784"/>
+                <a:gd name="connsiteY5" fmla="*/ 865116 h 865116"/>
+                <a:gd name="connsiteX6" fmla="*/ 283630 w 1868784"/>
+                <a:gd name="connsiteY6" fmla="*/ 865116 h 865116"/>
+                <a:gd name="connsiteX7" fmla="*/ 217062 w 1868784"/>
+                <a:gd name="connsiteY7" fmla="*/ 798548 h 865116"/>
+                <a:gd name="connsiteX8" fmla="*/ 216773 w 1868784"/>
+                <a:gd name="connsiteY8" fmla="*/ 251658 h 865116"/>
+                <a:gd name="connsiteX0" fmla="*/ 216773 w 1868784"/>
+                <a:gd name="connsiteY0" fmla="*/ 274671 h 888129"/>
+                <a:gd name="connsiteX1" fmla="*/ 91110 w 1868784"/>
+                <a:gd name="connsiteY1" fmla="*/ 12984 h 888129"/>
+                <a:gd name="connsiteX2" fmla="*/ 1792271 w 1868784"/>
+                <a:gd name="connsiteY2" fmla="*/ 63208 h 888129"/>
+                <a:gd name="connsiteX3" fmla="*/ 1594737 w 1868784"/>
+                <a:gd name="connsiteY3" fmla="*/ 266878 h 888129"/>
+                <a:gd name="connsiteX4" fmla="*/ 1594737 w 1868784"/>
+                <a:gd name="connsiteY4" fmla="*/ 821561 h 888129"/>
+                <a:gd name="connsiteX5" fmla="*/ 1528169 w 1868784"/>
+                <a:gd name="connsiteY5" fmla="*/ 888129 h 888129"/>
+                <a:gd name="connsiteX6" fmla="*/ 283630 w 1868784"/>
+                <a:gd name="connsiteY6" fmla="*/ 888129 h 888129"/>
+                <a:gd name="connsiteX7" fmla="*/ 217062 w 1868784"/>
+                <a:gd name="connsiteY7" fmla="*/ 821561 h 888129"/>
+                <a:gd name="connsiteX8" fmla="*/ 216773 w 1868784"/>
+                <a:gd name="connsiteY8" fmla="*/ 274671 h 888129"/>
+                <a:gd name="connsiteX0" fmla="*/ 216325 w 1862778"/>
+                <a:gd name="connsiteY0" fmla="*/ 289222 h 902680"/>
+                <a:gd name="connsiteX1" fmla="*/ 90662 w 1862778"/>
+                <a:gd name="connsiteY1" fmla="*/ 27535 h 902680"/>
+                <a:gd name="connsiteX2" fmla="*/ 1785473 w 1862778"/>
+                <a:gd name="connsiteY2" fmla="*/ 36484 h 902680"/>
+                <a:gd name="connsiteX3" fmla="*/ 1594289 w 1862778"/>
+                <a:gd name="connsiteY3" fmla="*/ 281429 h 902680"/>
+                <a:gd name="connsiteX4" fmla="*/ 1594289 w 1862778"/>
+                <a:gd name="connsiteY4" fmla="*/ 836112 h 902680"/>
+                <a:gd name="connsiteX5" fmla="*/ 1527721 w 1862778"/>
+                <a:gd name="connsiteY5" fmla="*/ 902680 h 902680"/>
+                <a:gd name="connsiteX6" fmla="*/ 283182 w 1862778"/>
+                <a:gd name="connsiteY6" fmla="*/ 902680 h 902680"/>
+                <a:gd name="connsiteX7" fmla="*/ 216614 w 1862778"/>
+                <a:gd name="connsiteY7" fmla="*/ 836112 h 902680"/>
+                <a:gd name="connsiteX8" fmla="*/ 216325 w 1862778"/>
+                <a:gd name="connsiteY8" fmla="*/ 289222 h 902680"/>
+                <a:gd name="connsiteX0" fmla="*/ 216325 w 1862778"/>
+                <a:gd name="connsiteY0" fmla="*/ 289222 h 902680"/>
+                <a:gd name="connsiteX1" fmla="*/ 90662 w 1862778"/>
+                <a:gd name="connsiteY1" fmla="*/ 27535 h 902680"/>
+                <a:gd name="connsiteX2" fmla="*/ 1785473 w 1862778"/>
+                <a:gd name="connsiteY2" fmla="*/ 36484 h 902680"/>
+                <a:gd name="connsiteX3" fmla="*/ 1594289 w 1862778"/>
+                <a:gd name="connsiteY3" fmla="*/ 281429 h 902680"/>
+                <a:gd name="connsiteX4" fmla="*/ 1594289 w 1862778"/>
+                <a:gd name="connsiteY4" fmla="*/ 836112 h 902680"/>
+                <a:gd name="connsiteX5" fmla="*/ 1527721 w 1862778"/>
+                <a:gd name="connsiteY5" fmla="*/ 902680 h 902680"/>
+                <a:gd name="connsiteX6" fmla="*/ 283182 w 1862778"/>
+                <a:gd name="connsiteY6" fmla="*/ 902680 h 902680"/>
+                <a:gd name="connsiteX7" fmla="*/ 216614 w 1862778"/>
+                <a:gd name="connsiteY7" fmla="*/ 836112 h 902680"/>
+                <a:gd name="connsiteX8" fmla="*/ 216325 w 1862778"/>
+                <a:gd name="connsiteY8" fmla="*/ 289222 h 902680"/>
+                <a:gd name="connsiteX0" fmla="*/ 215874 w 1862327"/>
+                <a:gd name="connsiteY0" fmla="*/ 289222 h 902680"/>
+                <a:gd name="connsiteX1" fmla="*/ 90211 w 1862327"/>
+                <a:gd name="connsiteY1" fmla="*/ 27535 h 902680"/>
+                <a:gd name="connsiteX2" fmla="*/ 1785022 w 1862327"/>
+                <a:gd name="connsiteY2" fmla="*/ 36484 h 902680"/>
+                <a:gd name="connsiteX3" fmla="*/ 1593838 w 1862327"/>
+                <a:gd name="connsiteY3" fmla="*/ 281429 h 902680"/>
+                <a:gd name="connsiteX4" fmla="*/ 1593838 w 1862327"/>
+                <a:gd name="connsiteY4" fmla="*/ 836112 h 902680"/>
+                <a:gd name="connsiteX5" fmla="*/ 1527270 w 1862327"/>
+                <a:gd name="connsiteY5" fmla="*/ 902680 h 902680"/>
+                <a:gd name="connsiteX6" fmla="*/ 282731 w 1862327"/>
+                <a:gd name="connsiteY6" fmla="*/ 902680 h 902680"/>
+                <a:gd name="connsiteX7" fmla="*/ 216163 w 1862327"/>
+                <a:gd name="connsiteY7" fmla="*/ 836112 h 902680"/>
+                <a:gd name="connsiteX8" fmla="*/ 215874 w 1862327"/>
+                <a:gd name="connsiteY8" fmla="*/ 289222 h 902680"/>
+                <a:gd name="connsiteX0" fmla="*/ 218551 w 1865217"/>
+                <a:gd name="connsiteY0" fmla="*/ 271689 h 885147"/>
+                <a:gd name="connsiteX1" fmla="*/ 89713 w 1865217"/>
+                <a:gd name="connsiteY1" fmla="*/ 44927 h 885147"/>
+                <a:gd name="connsiteX2" fmla="*/ 1787699 w 1865217"/>
+                <a:gd name="connsiteY2" fmla="*/ 18951 h 885147"/>
+                <a:gd name="connsiteX3" fmla="*/ 1596515 w 1865217"/>
+                <a:gd name="connsiteY3" fmla="*/ 263896 h 885147"/>
+                <a:gd name="connsiteX4" fmla="*/ 1596515 w 1865217"/>
+                <a:gd name="connsiteY4" fmla="*/ 818579 h 885147"/>
+                <a:gd name="connsiteX5" fmla="*/ 1529947 w 1865217"/>
+                <a:gd name="connsiteY5" fmla="*/ 885147 h 885147"/>
+                <a:gd name="connsiteX6" fmla="*/ 285408 w 1865217"/>
+                <a:gd name="connsiteY6" fmla="*/ 885147 h 885147"/>
+                <a:gd name="connsiteX7" fmla="*/ 218840 w 1865217"/>
+                <a:gd name="connsiteY7" fmla="*/ 818579 h 885147"/>
+                <a:gd name="connsiteX8" fmla="*/ 218551 w 1865217"/>
+                <a:gd name="connsiteY8" fmla="*/ 271689 h 885147"/>
+                <a:gd name="connsiteX0" fmla="*/ 217882 w 1856244"/>
+                <a:gd name="connsiteY0" fmla="*/ 253205 h 866663"/>
+                <a:gd name="connsiteX1" fmla="*/ 89044 w 1856244"/>
+                <a:gd name="connsiteY1" fmla="*/ 26443 h 866663"/>
+                <a:gd name="connsiteX2" fmla="*/ 1777505 w 1856244"/>
+                <a:gd name="connsiteY2" fmla="*/ 29042 h 866663"/>
+                <a:gd name="connsiteX3" fmla="*/ 1595846 w 1856244"/>
+                <a:gd name="connsiteY3" fmla="*/ 245412 h 866663"/>
+                <a:gd name="connsiteX4" fmla="*/ 1595846 w 1856244"/>
+                <a:gd name="connsiteY4" fmla="*/ 800095 h 866663"/>
+                <a:gd name="connsiteX5" fmla="*/ 1529278 w 1856244"/>
+                <a:gd name="connsiteY5" fmla="*/ 866663 h 866663"/>
+                <a:gd name="connsiteX6" fmla="*/ 284739 w 1856244"/>
+                <a:gd name="connsiteY6" fmla="*/ 866663 h 866663"/>
+                <a:gd name="connsiteX7" fmla="*/ 218171 w 1856244"/>
+                <a:gd name="connsiteY7" fmla="*/ 800095 h 866663"/>
+                <a:gd name="connsiteX8" fmla="*/ 217882 w 1856244"/>
+                <a:gd name="connsiteY8" fmla="*/ 253205 h 866663"/>
+              </a:gdLst>
+              <a:ahLst/>
+              <a:cxnLst>
+                <a:cxn ang="0">
+                  <a:pos x="connsiteX0" y="connsiteY0"/>
+                </a:cxn>
+                <a:cxn ang="0">
+                  <a:pos x="connsiteX1" y="connsiteY1"/>
+                </a:cxn>
+                <a:cxn ang="0">
+                  <a:pos x="connsiteX2" y="connsiteY2"/>
+                </a:cxn>
+                <a:cxn ang="0">
+                  <a:pos x="connsiteX3" y="connsiteY3"/>
+                </a:cxn>
+                <a:cxn ang="0">
+                  <a:pos x="connsiteX4" y="connsiteY4"/>
+                </a:cxn>
+                <a:cxn ang="0">
+                  <a:pos x="connsiteX5" y="connsiteY5"/>
+                </a:cxn>
+                <a:cxn ang="0">
+                  <a:pos x="connsiteX6" y="connsiteY6"/>
+                </a:cxn>
+                <a:cxn ang="0">
+                  <a:pos x="connsiteX7" y="connsiteY7"/>
+                </a:cxn>
+                <a:cxn ang="0">
+                  <a:pos x="connsiteX8" y="connsiteY8"/>
+                </a:cxn>
+              </a:cxnLst>
+              <a:rect l="l" t="t" r="r" b="b"/>
+              <a:pathLst>
+                <a:path w="1856244" h="866663">
+                  <a:moveTo>
+                    <a:pt x="217882" y="253205"/>
+                  </a:moveTo>
+                  <a:cubicBezTo>
+                    <a:pt x="221345" y="-31786"/>
+                    <a:pt x="-170893" y="63803"/>
+                    <a:pt x="89044" y="26443"/>
+                  </a:cubicBezTo>
+                  <a:cubicBezTo>
+                    <a:pt x="348981" y="-10917"/>
+                    <a:pt x="1526371" y="-7453"/>
+                    <a:pt x="1777505" y="29042"/>
+                  </a:cubicBezTo>
+                  <a:cubicBezTo>
+                    <a:pt x="2028639" y="65537"/>
+                    <a:pt x="1599021" y="-34961"/>
+                    <a:pt x="1595846" y="245412"/>
+                  </a:cubicBezTo>
+                  <a:lnTo>
+                    <a:pt x="1595846" y="800095"/>
+                  </a:lnTo>
+                  <a:cubicBezTo>
+                    <a:pt x="1595846" y="836859"/>
+                    <a:pt x="1566042" y="866663"/>
+                    <a:pt x="1529278" y="866663"/>
+                  </a:cubicBezTo>
+                  <a:lnTo>
+                    <a:pt x="284739" y="866663"/>
+                  </a:lnTo>
+                  <a:cubicBezTo>
+                    <a:pt x="247975" y="866663"/>
+                    <a:pt x="218171" y="836859"/>
+                    <a:pt x="218171" y="800095"/>
+                  </a:cubicBezTo>
+                  <a:cubicBezTo>
+                    <a:pt x="217016" y="590282"/>
+                    <a:pt x="219037" y="463018"/>
+                    <a:pt x="217882" y="253205"/>
+                  </a:cubicBezTo>
+                  <a:close/>
+                </a:path>
+              </a:pathLst>
+            </a:custGeom>
+            <a:gradFill>
+              <a:gsLst>
+                <a:gs pos="8000">
+                  <a:srgbClr val="CBD3D7"/>
+                </a:gs>
+                <a:gs pos="31000">
+                  <a:srgbClr val="717D83"/>
+                </a:gs>
+              </a:gsLst>
+              <a:lin ang="5400000" scaled="0"/>
+            </a:gradFill>
+            <a:ln w="12700" cap="flat" cmpd="sng" algn="ctr">
+              <a:noFill/>
+              <a:prstDash val="solid"/>
+            </a:ln>
+            <a:effectLst/>
+          </p:spPr>
+          <p:txBody>
+            <a:bodyPr rtlCol="0" anchor="ctr"/>
+            <a:lstStyle/>
+            <a:p>
+              <a:pPr marL="0" marR="0" lvl="0" indent="0" algn="ctr" defTabSz="914377" eaLnBrk="1" fontAlgn="auto" latinLnBrk="0" hangingPunct="1">
+                <a:lnSpc>
+                  <a:spcPct val="100000"/>
+                </a:lnSpc>
+                <a:spcBef>
+                  <a:spcPts val="0"/>
+                </a:spcBef>
+                <a:spcAft>
+                  <a:spcPts val="0"/>
+                </a:spcAft>
+                <a:buClrTx/>
+                <a:buSzTx/>
+                <a:buFontTx/>
+                <a:buNone/>
+                <a:tabLst/>
+                <a:defRPr/>
+              </a:pPr>
+              <a:endParaRPr kumimoji="0" lang="en-US" sz="1600" b="0" i="0" u="none" strike="noStrike" kern="0" cap="none" spc="0" normalizeH="0" baseline="0" noProof="0" dirty="0" smtClean="0">
+                <a:ln w="0">
+                  <a:solidFill>
+                    <a:sysClr val="windowText" lastClr="000000"/>
+                  </a:solidFill>
+                </a:ln>
+                <a:solidFill>
+                  <a:srgbClr val="4B5357"/>
+                </a:solidFill>
+                <a:effectLst/>
+                <a:uLnTx/>
+                <a:uFillTx/>
+                <a:latin typeface="Calibri Light"/>
+                <a:ea typeface="+mn-ea"/>
+                <a:cs typeface="+mn-cs"/>
+              </a:endParaRPr>
+            </a:p>
+          </p:txBody>
+        </p:sp>
+        <p:grpSp>
+          <p:nvGrpSpPr>
+            <p:cNvPr id="71" name="Group 70">
+              <a:extLst>
+                <a:ext uri="{FF2B5EF4-FFF2-40B4-BE49-F238E27FC236}">
+                  <a16:creationId xmlns:a16="http://schemas.microsoft.com/office/drawing/2014/main" xmlns="" id="{CB14BA8E-033F-F344-AB7E-4FD6DB48C13F}"/>
+                </a:ext>
+              </a:extLst>
+            </p:cNvPr>
+            <p:cNvGrpSpPr/>
+            <p:nvPr/>
+          </p:nvGrpSpPr>
+          <p:grpSpPr>
+            <a:xfrm>
+              <a:off x="4407250" y="5787721"/>
+              <a:ext cx="1283487" cy="383162"/>
+              <a:chOff x="6421785" y="5373193"/>
+              <a:chExt cx="1283487" cy="383162"/>
+            </a:xfrm>
+          </p:grpSpPr>
+          <p:sp>
+            <p:nvSpPr>
+              <p:cNvPr id="72" name="Rounded Rectangle 71">
+                <a:extLst>
+                  <a:ext uri="{FF2B5EF4-FFF2-40B4-BE49-F238E27FC236}">
+                    <a16:creationId xmlns:a16="http://schemas.microsoft.com/office/drawing/2014/main" xmlns="" id="{A3523D8D-DD20-BF43-98E7-82A455E6DA6A}"/>
+                  </a:ext>
+                </a:extLst>
+              </p:cNvPr>
+              <p:cNvSpPr/>
+              <p:nvPr/>
+            </p:nvSpPr>
+            <p:spPr>
+              <a:xfrm>
+                <a:off x="6421785" y="5373193"/>
+                <a:ext cx="1240161" cy="383162"/>
+              </a:xfrm>
+              <a:prstGeom prst="roundRect">
+                <a:avLst>
+                  <a:gd name="adj" fmla="val 12736"/>
+                </a:avLst>
+              </a:prstGeom>
+              <a:solidFill>
+                <a:srgbClr val="4B5357">
+                  <a:lumMod val="50000"/>
+                </a:srgbClr>
+              </a:solidFill>
+              <a:ln w="12700" cap="flat" cmpd="sng" algn="ctr">
+                <a:noFill/>
+                <a:prstDash val="solid"/>
+              </a:ln>
+              <a:effectLst/>
+            </p:spPr>
+            <p:txBody>
+              <a:bodyPr wrap="square" tIns="36000" bIns="36000" rtlCol="0" anchor="ctr">
+                <a:noAutofit/>
+              </a:bodyPr>
+              <a:lstStyle/>
+              <a:p>
+                <a:pPr marL="0" marR="0" lvl="0" indent="0" defTabSz="914377" eaLnBrk="1" fontAlgn="auto" latinLnBrk="0" hangingPunct="1">
+                  <a:lnSpc>
+                    <a:spcPct val="100000"/>
+                  </a:lnSpc>
+                  <a:spcBef>
+                    <a:spcPts val="0"/>
+                  </a:spcBef>
+                  <a:spcAft>
+                    <a:spcPts val="0"/>
+                  </a:spcAft>
+                  <a:buClrTx/>
+                  <a:buSzTx/>
+                  <a:buFontTx/>
+                  <a:buNone/>
+                  <a:tabLst/>
+                  <a:defRPr/>
+                </a:pPr>
+                <a:endParaRPr kumimoji="0" lang="en-US" sz="1200" b="0" i="0" u="none" strike="noStrike" kern="0" cap="none" spc="0" normalizeH="0" baseline="0" noProof="0" dirty="0" smtClean="0">
+                  <a:ln>
+                    <a:noFill/>
+                  </a:ln>
+                  <a:solidFill>
+                    <a:srgbClr val="FFFFFF"/>
+                  </a:solidFill>
+                  <a:effectLst/>
+                  <a:uLnTx/>
+                  <a:uFillTx/>
+                  <a:latin typeface="Source Sans Pro Light" charset="0"/>
+                  <a:ea typeface="Source Sans Pro Light" charset="0"/>
+                  <a:cs typeface="Source Sans Pro Light" charset="0"/>
+                </a:endParaRPr>
+              </a:p>
+            </p:txBody>
+          </p:sp>
+          <p:sp>
+            <p:nvSpPr>
+              <p:cNvPr id="73" name="Rectangle 72">
+                <a:extLst>
+                  <a:ext uri="{FF2B5EF4-FFF2-40B4-BE49-F238E27FC236}">
+                    <a16:creationId xmlns:a16="http://schemas.microsoft.com/office/drawing/2014/main" xmlns="" id="{3199DF2C-0603-4344-867D-8C7BDAEEE74C}"/>
+                  </a:ext>
+                </a:extLst>
+              </p:cNvPr>
+              <p:cNvSpPr/>
+              <p:nvPr/>
+            </p:nvSpPr>
+            <p:spPr>
+              <a:xfrm>
+                <a:off x="6756463" y="5425211"/>
+                <a:ext cx="948809" cy="301407"/>
+              </a:xfrm>
+              <a:prstGeom prst="rect">
+                <a:avLst/>
+              </a:prstGeom>
+              <a:effectLst/>
+            </p:spPr>
+            <p:txBody>
+              <a:bodyPr wrap="square" lIns="0" rIns="0">
+                <a:noAutofit/>
+              </a:bodyPr>
+              <a:lstStyle/>
+              <a:p>
+                <a:pPr marL="0" marR="0" lvl="0" indent="0" algn="ctr" defTabSz="914400" eaLnBrk="1" fontAlgn="auto" latinLnBrk="0" hangingPunct="1">
+                  <a:lnSpc>
+                    <a:spcPts val="1000"/>
+                  </a:lnSpc>
+                  <a:spcBef>
+                    <a:spcPts val="0"/>
+                  </a:spcBef>
+                  <a:spcAft>
+                    <a:spcPts val="0"/>
+                  </a:spcAft>
+                  <a:buClrTx/>
+                  <a:buSzTx/>
+                  <a:buFontTx/>
+                  <a:buNone/>
+                  <a:tabLst/>
+                  <a:defRPr/>
+                </a:pPr>
+                <a:r>
+                  <a:rPr kumimoji="0" lang="fr-FR" sz="1200" b="0" i="0" u="none" strike="noStrike" kern="0" cap="none" spc="0" normalizeH="0" baseline="0" noProof="0" dirty="0">
+                    <a:ln>
+                      <a:noFill/>
+                    </a:ln>
+                    <a:solidFill>
+                      <a:srgbClr val="FFFFFF"/>
+                    </a:solidFill>
+                    <a:effectLst/>
+                    <a:uLnTx/>
+                    <a:uFillTx/>
+                    <a:latin typeface="Source Sans Pro Light" charset="0"/>
+                  </a:rPr>
+                  <a:t>PROCESSOR </a:t>
+                </a:r>
+                <a:br>
+                  <a:rPr kumimoji="0" lang="fr-FR" sz="1200" b="0" i="0" u="none" strike="noStrike" kern="0" cap="none" spc="0" normalizeH="0" baseline="0" noProof="0" dirty="0">
+                    <a:ln>
+                      <a:noFill/>
+                    </a:ln>
+                    <a:solidFill>
+                      <a:srgbClr val="FFFFFF"/>
+                    </a:solidFill>
+                    <a:effectLst/>
+                    <a:uLnTx/>
+                    <a:uFillTx/>
+                    <a:latin typeface="Source Sans Pro Light" charset="0"/>
+                  </a:rPr>
+                </a:br>
+                <a:r>
+                  <a:rPr kumimoji="0" lang="fr-FR" sz="1200" b="0" i="0" u="none" strike="noStrike" kern="0" cap="none" spc="0" normalizeH="0" baseline="0" noProof="0" dirty="0">
+                    <a:ln>
+                      <a:noFill/>
+                    </a:ln>
+                    <a:solidFill>
+                      <a:srgbClr val="FFFFFF"/>
+                    </a:solidFill>
+                    <a:effectLst/>
+                    <a:uLnTx/>
+                    <a:uFillTx/>
+                    <a:latin typeface="Source Sans Pro Light" charset="0"/>
+                  </a:rPr>
+                  <a:t>CORE</a:t>
+                </a:r>
+                <a:endParaRPr kumimoji="0" lang="en-US" sz="1200" b="0" i="0" u="none" strike="noStrike" kern="0" cap="none" spc="0" normalizeH="0" baseline="0" noProof="0" dirty="0">
+                  <a:ln>
+                    <a:noFill/>
+                  </a:ln>
+                  <a:solidFill>
+                    <a:srgbClr val="FFFFFF"/>
+                  </a:solidFill>
+                  <a:effectLst/>
+                  <a:uLnTx/>
+                  <a:uFillTx/>
+                  <a:latin typeface="Source Sans Pro Light" charset="0"/>
+                </a:endParaRPr>
+              </a:p>
+            </p:txBody>
+          </p:sp>
+          <p:pic>
+            <p:nvPicPr>
+              <p:cNvPr id="74" name="Picture 73">
+                <a:extLst>
+                  <a:ext uri="{FF2B5EF4-FFF2-40B4-BE49-F238E27FC236}">
+                    <a16:creationId xmlns:a16="http://schemas.microsoft.com/office/drawing/2014/main" xmlns="" id="{1B15E0C4-B61D-624C-9FE8-F221583A4909}"/>
+                  </a:ext>
+                </a:extLst>
+              </p:cNvPr>
+              <p:cNvPicPr>
+                <a:picLocks noChangeAspect="1"/>
+              </p:cNvPicPr>
+              <p:nvPr/>
+            </p:nvPicPr>
+            <p:blipFill>
+              <a:blip r:embed="rId2" cstate="print">
+                <a:lum bright="10000"/>
+                <a:extLst>
+                  <a:ext uri="{28A0092B-C50C-407E-A947-70E740481C1C}">
+                    <a14:useLocalDpi xmlns:a14="http://schemas.microsoft.com/office/drawing/2010/main" val="0"/>
+                  </a:ext>
+                </a:extLst>
+              </a:blip>
+              <a:stretch>
+                <a:fillRect/>
+              </a:stretch>
+            </p:blipFill>
+            <p:spPr>
+              <a:xfrm>
+                <a:off x="6482924" y="5411413"/>
+                <a:ext cx="307244" cy="309712"/>
+              </a:xfrm>
+              <a:prstGeom prst="rect">
+                <a:avLst/>
+              </a:prstGeom>
+            </p:spPr>
+          </p:pic>
+        </p:grpSp>
+      </p:grpSp>
+      <p:sp>
+        <p:nvSpPr>
+          <p:cNvPr id="75" name="TextBox 74">
+            <a:extLst>
+              <a:ext uri="{FF2B5EF4-FFF2-40B4-BE49-F238E27FC236}">
+                <a16:creationId xmlns:a16="http://schemas.microsoft.com/office/drawing/2014/main" xmlns="" id="{71CF505E-6AA5-2446-A303-54EDCA13F1E3}"/>
+              </a:ext>
+            </a:extLst>
+          </p:cNvPr>
+          <p:cNvSpPr txBox="1"/>
+          <p:nvPr/>
+        </p:nvSpPr>
+        <p:spPr>
+          <a:xfrm>
+            <a:off x="4130782" y="3876449"/>
+            <a:ext cx="1660804" cy="317236"/>
+          </a:xfrm>
+          <a:prstGeom prst="rect">
+            <a:avLst/>
+          </a:prstGeom>
+          <a:noFill/>
+          <a:ln>
+            <a:noFill/>
+          </a:ln>
+        </p:spPr>
+        <p:txBody>
+          <a:bodyPr wrap="none" tIns="36000" bIns="36000" rtlCol="0">
+            <a:noAutofit/>
+          </a:bodyPr>
+          <a:lstStyle/>
+          <a:p>
+            <a:pPr algn="ctr" defTabSz="914377">
+              <a:lnSpc>
+                <a:spcPts val="1620"/>
+              </a:lnSpc>
+            </a:pPr>
+            <a:endParaRPr lang="en-US" sz="1600" b="1" dirty="0">
+              <a:solidFill>
+                <a:srgbClr val="FFFFFF"/>
+              </a:solidFill>
+              <a:effectLst>
+                <a:outerShdw blurRad="76200" dist="38100" dir="5400000" algn="t" rotWithShape="0">
+                  <a:prstClr val="black">
+                    <a:alpha val="70000"/>
+                  </a:prstClr>
+                </a:outerShdw>
+              </a:effectLst>
+              <a:latin typeface="Source Sans Pro" charset="0"/>
+              <a:ea typeface="Source Sans Pro" charset="0"/>
+            </a:endParaRPr>
+          </a:p>
+        </p:txBody>
+      </p:sp>
+      <p:sp>
+        <p:nvSpPr>
+          <p:cNvPr id="76" name="Rounded Rectangle 75">
+            <a:extLst>
+              <a:ext uri="{FF2B5EF4-FFF2-40B4-BE49-F238E27FC236}">
+                <a16:creationId xmlns:a16="http://schemas.microsoft.com/office/drawing/2014/main" xmlns="" id="{5BFFA722-9C0D-B04B-9FB6-C1E5B168A620}"/>
               </a:ext>
             </a:extLst>
           </p:cNvPr>
@@ -3431,29 +4987,25 @@
         </p:nvSpPr>
         <p:spPr>
           <a:xfrm>
-            <a:off x="4573968" y="1593000"/>
-            <a:ext cx="1152000" cy="3960000"/>
+            <a:off x="4208581" y="3770549"/>
+            <a:ext cx="3311114" cy="306000"/>
           </a:xfrm>
           <a:prstGeom prst="roundRect">
             <a:avLst>
-              <a:gd name="adj" fmla="val 6944"/>
+              <a:gd name="adj" fmla="val 19644"/>
             </a:avLst>
           </a:prstGeom>
           <a:solidFill>
-            <a:srgbClr val="FFFFFF">
-              <a:lumMod val="95000"/>
-            </a:srgbClr>
+            <a:srgbClr val="717D83"/>
           </a:solidFill>
           <a:ln w="12700" cap="flat" cmpd="sng" algn="ctr">
-            <a:solidFill>
-              <a:srgbClr val="CBD3D7"/>
-            </a:solidFill>
+            <a:noFill/>
             <a:prstDash val="solid"/>
           </a:ln>
           <a:effectLst/>
         </p:spPr>
         <p:txBody>
-          <a:bodyPr wrap="square" tIns="36000" bIns="36000" rtlCol="0" anchor="ctr">
+          <a:bodyPr wrap="square" lIns="90000" tIns="36000" bIns="36000" rtlCol="0" anchor="ctr">
             <a:noAutofit/>
           </a:bodyPr>
           <a:lstStyle/>
@@ -3475,29 +5027,38 @@
               <a:tabLst/>
               <a:defRPr/>
             </a:pPr>
-            <a:endParaRPr kumimoji="0" lang="en-US" sz="1200" b="0" i="1" u="none" strike="noStrike" kern="0" cap="none" spc="0" normalizeH="0" baseline="0" noProof="0" dirty="0">
-              <a:ln>
-                <a:noFill/>
-              </a:ln>
-              <a:solidFill>
-                <a:srgbClr val="4B5357"/>
-              </a:solidFill>
-              <a:effectLst/>
-              <a:uLnTx/>
-              <a:uFillTx/>
-              <a:latin typeface="Source Sans Pro Light" charset="0"/>
-              <a:ea typeface="Source Sans Pro Light" charset="0"/>
-              <a:cs typeface="Source Sans Pro Light" charset="0"/>
-            </a:endParaRPr>
-          </a:p>
-        </p:txBody>
-      </p:sp>
-      <p:sp>
-        <p:nvSpPr>
-          <p:cNvPr id="9" name="Rounded Rectangle 167">
-            <a:extLst>
-              <a:ext uri="{FF2B5EF4-FFF2-40B4-BE49-F238E27FC236}">
-                <a16:creationId xmlns:a16="http://schemas.microsoft.com/office/drawing/2014/main" id="{A40CF69C-1297-4F80-9090-FD79B8B31953}"/>
+            <a:r>
+              <a:rPr kumimoji="0" lang="en-US" sz="1600" b="1" i="0" u="none" strike="noStrike" kern="0" cap="none" spc="0" normalizeH="0" baseline="0" noProof="0" dirty="0" smtClean="0">
+                <a:ln>
+                  <a:noFill/>
+                </a:ln>
+                <a:solidFill>
+                  <a:srgbClr val="FFFFFF"/>
+                </a:solidFill>
+                <a:effectLst>
+                  <a:outerShdw blurRad="76200" dist="38100" dir="5400000" algn="t" rotWithShape="0">
+                    <a:prstClr val="black">
+                      <a:alpha val="70000"/>
+                    </a:prstClr>
+                  </a:outerShdw>
+                </a:effectLst>
+                <a:uLnTx/>
+                <a:uFillTx/>
+                <a:latin typeface="Source Sans Pro" charset="0"/>
+                <a:ea typeface="Source Sans Pro" charset="0"/>
+                <a:cs typeface="Source Sans Pro" charset="0"/>
+              </a:rPr>
+              <a:t>RTOS/OS</a:t>
+            </a:r>
+          </a:p>
+        </p:txBody>
+      </p:sp>
+      <p:sp>
+        <p:nvSpPr>
+          <p:cNvPr id="77" name="Round Same Side Corner Rectangle 101">
+            <a:extLst>
+              <a:ext uri="{FF2B5EF4-FFF2-40B4-BE49-F238E27FC236}">
+                <a16:creationId xmlns:a16="http://schemas.microsoft.com/office/drawing/2014/main" xmlns="" id="{73F7B064-9C3F-2240-9A91-A618CBC1BB57}"/>
               </a:ext>
             </a:extLst>
           </p:cNvPr>
@@ -3505,32 +5066,35 @@
           <p:nvPr/>
         </p:nvSpPr>
         <p:spPr>
-          <a:xfrm>
-            <a:off x="5826886" y="1593000"/>
-            <a:ext cx="1152000" cy="3960000"/>
+          <a:xfrm rot="10800000">
+            <a:off x="6152507" y="2421515"/>
+            <a:ext cx="1295162" cy="1219087"/>
           </a:xfrm>
-          <a:prstGeom prst="roundRect">
+          <a:prstGeom prst="round2SameRect">
             <a:avLst>
-              <a:gd name="adj" fmla="val 6944"/>
+              <a:gd name="adj1" fmla="val 9357"/>
+              <a:gd name="adj2" fmla="val 0"/>
             </a:avLst>
           </a:prstGeom>
-          <a:solidFill>
-            <a:srgbClr val="FFFFFF">
-              <a:lumMod val="95000"/>
-            </a:srgbClr>
-          </a:solidFill>
+          <a:gradFill>
+            <a:gsLst>
+              <a:gs pos="57000">
+                <a:srgbClr val="EE502E"/>
+              </a:gs>
+              <a:gs pos="100000">
+                <a:srgbClr val="717D83"/>
+              </a:gs>
+            </a:gsLst>
+            <a:lin ang="16200000" scaled="0"/>
+          </a:gradFill>
           <a:ln w="12700" cap="flat" cmpd="sng" algn="ctr">
-            <a:solidFill>
-              <a:srgbClr val="CBD3D7"/>
-            </a:solidFill>
+            <a:noFill/>
             <a:prstDash val="solid"/>
           </a:ln>
           <a:effectLst/>
         </p:spPr>
         <p:txBody>
-          <a:bodyPr wrap="square" tIns="36000" bIns="36000" rtlCol="0" anchor="ctr">
-            <a:noAutofit/>
-          </a:bodyPr>
+          <a:bodyPr rtlCol="0" anchor="ctr"/>
           <a:lstStyle/>
           <a:p>
             <a:pPr marL="0" marR="0" lvl="0" indent="0" algn="ctr" defTabSz="914377" eaLnBrk="1" fontAlgn="auto" latinLnBrk="0" hangingPunct="1">
@@ -3550,9 +5114,11 @@
               <a:tabLst/>
               <a:defRPr/>
             </a:pPr>
-            <a:endParaRPr kumimoji="0" lang="en-US" sz="1200" b="0" i="1" u="none" strike="noStrike" kern="0" cap="none" spc="0" normalizeH="0" baseline="0" noProof="0" dirty="0">
-              <a:ln>
-                <a:noFill/>
+            <a:endParaRPr kumimoji="0" lang="en-US" sz="1600" b="0" i="0" u="none" strike="noStrike" kern="0" cap="none" spc="0" normalizeH="0" baseline="0" noProof="0" dirty="0" smtClean="0">
+              <a:ln w="0">
+                <a:solidFill>
+                  <a:sysClr val="windowText" lastClr="000000"/>
+                </a:solidFill>
               </a:ln>
               <a:solidFill>
                 <a:srgbClr val="4B5357"/>
@@ -3560,19 +5126,19 @@
               <a:effectLst/>
               <a:uLnTx/>
               <a:uFillTx/>
-              <a:latin typeface="Source Sans Pro Light" charset="0"/>
-              <a:ea typeface="Source Sans Pro Light" charset="0"/>
-              <a:cs typeface="Source Sans Pro Light" charset="0"/>
+              <a:latin typeface="Calibri Light"/>
+              <a:ea typeface="+mn-ea"/>
+              <a:cs typeface="+mn-cs"/>
             </a:endParaRPr>
           </a:p>
         </p:txBody>
       </p:sp>
       <p:sp>
         <p:nvSpPr>
-          <p:cNvPr id="10" name="Rounded Rectangle 167">
-            <a:extLst>
-              <a:ext uri="{FF2B5EF4-FFF2-40B4-BE49-F238E27FC236}">
-                <a16:creationId xmlns:a16="http://schemas.microsoft.com/office/drawing/2014/main" id="{0A5B5B85-EBF2-47D8-A37E-EA92C1ED3EC0}"/>
+          <p:cNvPr id="78" name="Round Same Side Corner Rectangle 98">
+            <a:extLst>
+              <a:ext uri="{FF2B5EF4-FFF2-40B4-BE49-F238E27FC236}">
+                <a16:creationId xmlns:a16="http://schemas.microsoft.com/office/drawing/2014/main" xmlns="" id="{62C0FE9E-84FD-FB4A-B9E2-2BFDD29E8265}"/>
               </a:ext>
             </a:extLst>
           </p:cNvPr>
@@ -3580,32 +5146,31 @@
           <p:nvPr/>
         </p:nvSpPr>
         <p:spPr>
-          <a:xfrm>
-            <a:off x="7079804" y="1593000"/>
-            <a:ext cx="1152000" cy="3960000"/>
+          <a:xfrm rot="10800000">
+            <a:off x="6273525" y="2421515"/>
+            <a:ext cx="1069874" cy="468184"/>
           </a:xfrm>
-          <a:prstGeom prst="roundRect">
+          <a:prstGeom prst="round2SameRect">
             <a:avLst>
-              <a:gd name="adj" fmla="val 6944"/>
+              <a:gd name="adj1" fmla="val 29929"/>
+              <a:gd name="adj2" fmla="val 0"/>
             </a:avLst>
           </a:prstGeom>
           <a:solidFill>
-            <a:srgbClr val="FFFFFF">
-              <a:lumMod val="95000"/>
+            <a:srgbClr val="717D83">
+              <a:lumMod val="20000"/>
+              <a:lumOff val="80000"/>
             </a:srgbClr>
           </a:solidFill>
           <a:ln w="12700" cap="flat" cmpd="sng" algn="ctr">
-            <a:solidFill>
-              <a:srgbClr val="CBD3D7"/>
-            </a:solidFill>
+            <a:noFill/>
             <a:prstDash val="solid"/>
+            <a:round/>
           </a:ln>
           <a:effectLst/>
         </p:spPr>
         <p:txBody>
-          <a:bodyPr wrap="square" tIns="36000" bIns="36000" rtlCol="0" anchor="ctr">
-            <a:noAutofit/>
-          </a:bodyPr>
+          <a:bodyPr rtlCol="0" anchor="ctr"/>
           <a:lstStyle/>
           <a:p>
             <a:pPr marL="0" marR="0" lvl="0" indent="0" algn="ctr" defTabSz="914377" eaLnBrk="1" fontAlgn="auto" latinLnBrk="0" hangingPunct="1">
@@ -3625,29 +5190,772 @@
               <a:tabLst/>
               <a:defRPr/>
             </a:pPr>
-            <a:endParaRPr kumimoji="0" lang="en-US" sz="1200" b="0" i="1" u="none" strike="noStrike" kern="0" cap="none" spc="0" normalizeH="0" baseline="0" noProof="0" dirty="0">
+            <a:endParaRPr kumimoji="0" lang="en-US" sz="1800" b="0" i="0" u="none" strike="noStrike" kern="0" cap="none" spc="0" normalizeH="0" baseline="0" noProof="0" smtClean="0">
               <a:ln>
                 <a:noFill/>
               </a:ln>
               <a:solidFill>
-                <a:srgbClr val="4B5357"/>
+                <a:srgbClr val="FFFFFF"/>
               </a:solidFill>
               <a:effectLst/>
               <a:uLnTx/>
               <a:uFillTx/>
-              <a:latin typeface="Source Sans Pro Light" charset="0"/>
-              <a:ea typeface="Source Sans Pro Light" charset="0"/>
-              <a:cs typeface="Source Sans Pro Light" charset="0"/>
+              <a:latin typeface="Calibri Light"/>
+              <a:ea typeface="+mn-ea"/>
+              <a:cs typeface="+mn-cs"/>
             </a:endParaRPr>
           </a:p>
         </p:txBody>
       </p:sp>
-      <p:sp>
-        <p:nvSpPr>
-          <p:cNvPr id="11" name="Rounded Rectangle 165">
-            <a:extLst>
-              <a:ext uri="{FF2B5EF4-FFF2-40B4-BE49-F238E27FC236}">
-                <a16:creationId xmlns:a16="http://schemas.microsoft.com/office/drawing/2014/main" id="{FAAF1C87-D9F5-4451-8945-2722C04BE769}"/>
+      <p:grpSp>
+        <p:nvGrpSpPr>
+          <p:cNvPr id="79" name="Group 78">
+            <a:extLst>
+              <a:ext uri="{FF2B5EF4-FFF2-40B4-BE49-F238E27FC236}">
+                <a16:creationId xmlns:a16="http://schemas.microsoft.com/office/drawing/2014/main" xmlns="" id="{FFC54847-C13D-1449-80CA-94D660614B5E}"/>
+              </a:ext>
+            </a:extLst>
+          </p:cNvPr>
+          <p:cNvGrpSpPr/>
+          <p:nvPr/>
+        </p:nvGrpSpPr>
+        <p:grpSpPr>
+          <a:xfrm>
+            <a:off x="6228645" y="3220985"/>
+            <a:ext cx="1162432" cy="359571"/>
+            <a:chOff x="3671478" y="3950249"/>
+            <a:chExt cx="1308417" cy="404729"/>
+          </a:xfrm>
+        </p:grpSpPr>
+        <p:sp>
+          <p:nvSpPr>
+            <p:cNvPr id="80" name="Rounded Rectangle 79">
+              <a:extLst>
+                <a:ext uri="{FF2B5EF4-FFF2-40B4-BE49-F238E27FC236}">
+                  <a16:creationId xmlns:a16="http://schemas.microsoft.com/office/drawing/2014/main" xmlns="" id="{644A1B58-76CF-8D47-A199-8D087ADCF583}"/>
+                </a:ext>
+              </a:extLst>
+            </p:cNvPr>
+            <p:cNvSpPr/>
+            <p:nvPr/>
+          </p:nvSpPr>
+          <p:spPr>
+            <a:xfrm>
+              <a:off x="3671478" y="3950249"/>
+              <a:ext cx="1305271" cy="404729"/>
+            </a:xfrm>
+            <a:prstGeom prst="roundRect">
+              <a:avLst>
+                <a:gd name="adj" fmla="val 12736"/>
+              </a:avLst>
+            </a:prstGeom>
+            <a:solidFill>
+              <a:srgbClr val="FFFFFF"/>
+            </a:solidFill>
+            <a:ln w="12700" cap="flat" cmpd="sng" algn="ctr">
+              <a:noFill/>
+              <a:prstDash val="solid"/>
+            </a:ln>
+            <a:effectLst/>
+          </p:spPr>
+          <p:txBody>
+            <a:bodyPr wrap="square" tIns="36000" bIns="36000" rtlCol="0" anchor="ctr">
+              <a:noAutofit/>
+            </a:bodyPr>
+            <a:lstStyle/>
+            <a:p>
+              <a:pPr marL="0" marR="0" lvl="0" indent="0" defTabSz="914377" eaLnBrk="1" fontAlgn="auto" latinLnBrk="0" hangingPunct="1">
+                <a:lnSpc>
+                  <a:spcPct val="100000"/>
+                </a:lnSpc>
+                <a:spcBef>
+                  <a:spcPts val="0"/>
+                </a:spcBef>
+                <a:spcAft>
+                  <a:spcPts val="0"/>
+                </a:spcAft>
+                <a:buClrTx/>
+                <a:buSzTx/>
+                <a:buFontTx/>
+                <a:buNone/>
+                <a:tabLst/>
+                <a:defRPr/>
+              </a:pPr>
+              <a:endParaRPr kumimoji="0" lang="en-US" sz="1200" b="0" i="0" u="none" strike="noStrike" kern="0" cap="none" spc="0" normalizeH="0" baseline="0" noProof="0" dirty="0" smtClean="0">
+                <a:ln>
+                  <a:noFill/>
+                </a:ln>
+                <a:solidFill>
+                  <a:srgbClr val="FFFFFF"/>
+                </a:solidFill>
+                <a:effectLst/>
+                <a:uLnTx/>
+                <a:uFillTx/>
+                <a:latin typeface="Source Sans Pro Light" charset="0"/>
+                <a:ea typeface="Source Sans Pro Light" charset="0"/>
+                <a:cs typeface="Source Sans Pro Light" charset="0"/>
+              </a:endParaRPr>
+            </a:p>
+          </p:txBody>
+        </p:sp>
+        <p:grpSp>
+          <p:nvGrpSpPr>
+            <p:cNvPr id="81" name="Group 80">
+              <a:extLst>
+                <a:ext uri="{FF2B5EF4-FFF2-40B4-BE49-F238E27FC236}">
+                  <a16:creationId xmlns:a16="http://schemas.microsoft.com/office/drawing/2014/main" xmlns="" id="{2FCAE15D-A842-2247-B3B8-C3CD6E00EBE3}"/>
+                </a:ext>
+              </a:extLst>
+            </p:cNvPr>
+            <p:cNvGrpSpPr/>
+            <p:nvPr/>
+          </p:nvGrpSpPr>
+          <p:grpSpPr>
+            <a:xfrm>
+              <a:off x="3760494" y="3990159"/>
+              <a:ext cx="1219401" cy="352084"/>
+              <a:chOff x="3760494" y="3990159"/>
+              <a:chExt cx="1219401" cy="352084"/>
+            </a:xfrm>
+          </p:grpSpPr>
+          <p:pic>
+            <p:nvPicPr>
+              <p:cNvPr id="82" name="Picture 81">
+                <a:extLst>
+                  <a:ext uri="{FF2B5EF4-FFF2-40B4-BE49-F238E27FC236}">
+                    <a16:creationId xmlns:a16="http://schemas.microsoft.com/office/drawing/2014/main" xmlns="" id="{6863CF84-3F53-4641-9CB4-E8F4BC7513D0}"/>
+                  </a:ext>
+                </a:extLst>
+              </p:cNvPr>
+              <p:cNvPicPr>
+                <a:picLocks noChangeAspect="1"/>
+              </p:cNvPicPr>
+              <p:nvPr/>
+            </p:nvPicPr>
+            <p:blipFill>
+              <a:blip r:embed="rId3" cstate="print">
+                <a:extLst>
+                  <a:ext uri="{28A0092B-C50C-407E-A947-70E740481C1C}">
+                    <a14:useLocalDpi xmlns:a14="http://schemas.microsoft.com/office/drawing/2010/main" val="0"/>
+                  </a:ext>
+                </a:extLst>
+              </a:blip>
+              <a:stretch>
+                <a:fillRect/>
+              </a:stretch>
+            </p:blipFill>
+            <p:spPr>
+              <a:xfrm>
+                <a:off x="4079422" y="3992059"/>
+                <a:ext cx="900473" cy="350184"/>
+              </a:xfrm>
+              <a:prstGeom prst="rect">
+                <a:avLst/>
+              </a:prstGeom>
+            </p:spPr>
+          </p:pic>
+          <p:pic>
+            <p:nvPicPr>
+              <p:cNvPr id="83" name="Picture 82">
+                <a:extLst>
+                  <a:ext uri="{FF2B5EF4-FFF2-40B4-BE49-F238E27FC236}">
+                    <a16:creationId xmlns:a16="http://schemas.microsoft.com/office/drawing/2014/main" xmlns="" id="{AC88CDED-584E-E048-AF8A-BB91CE480319}"/>
+                  </a:ext>
+                </a:extLst>
+              </p:cNvPr>
+              <p:cNvPicPr>
+                <a:picLocks noChangeAspect="1"/>
+              </p:cNvPicPr>
+              <p:nvPr/>
+            </p:nvPicPr>
+            <p:blipFill>
+              <a:blip r:embed="rId4" cstate="print">
+                <a:extLst>
+                  <a:ext uri="{28A0092B-C50C-407E-A947-70E740481C1C}">
+                    <a14:useLocalDpi xmlns:a14="http://schemas.microsoft.com/office/drawing/2010/main" val="0"/>
+                  </a:ext>
+                </a:extLst>
+              </a:blip>
+              <a:stretch>
+                <a:fillRect/>
+              </a:stretch>
+            </p:blipFill>
+            <p:spPr>
+              <a:xfrm>
+                <a:off x="3760494" y="3990159"/>
+                <a:ext cx="322073" cy="324658"/>
+              </a:xfrm>
+              <a:prstGeom prst="rect">
+                <a:avLst/>
+              </a:prstGeom>
+            </p:spPr>
+          </p:pic>
+        </p:grpSp>
+      </p:grpSp>
+      <p:grpSp>
+        <p:nvGrpSpPr>
+          <p:cNvPr id="84" name="Group 83">
+            <a:extLst>
+              <a:ext uri="{FF2B5EF4-FFF2-40B4-BE49-F238E27FC236}">
+                <a16:creationId xmlns:a16="http://schemas.microsoft.com/office/drawing/2014/main" xmlns="" id="{7588ED5A-8853-E248-B047-D817CAB378FF}"/>
+              </a:ext>
+            </a:extLst>
+          </p:cNvPr>
+          <p:cNvGrpSpPr/>
+          <p:nvPr/>
+        </p:nvGrpSpPr>
+        <p:grpSpPr>
+          <a:xfrm>
+            <a:off x="6837840" y="1581014"/>
+            <a:ext cx="457006" cy="1249080"/>
+            <a:chOff x="2035374" y="1665402"/>
+            <a:chExt cx="457006" cy="1249080"/>
+          </a:xfrm>
+        </p:grpSpPr>
+        <p:sp>
+          <p:nvSpPr>
+            <p:cNvPr id="85" name="Rounded Rectangle 84">
+              <a:extLst>
+                <a:ext uri="{FF2B5EF4-FFF2-40B4-BE49-F238E27FC236}">
+                  <a16:creationId xmlns:a16="http://schemas.microsoft.com/office/drawing/2014/main" xmlns="" id="{21A435B2-D1D4-924E-881F-EFDD75B14444}"/>
+                </a:ext>
+              </a:extLst>
+            </p:cNvPr>
+            <p:cNvSpPr/>
+            <p:nvPr/>
+          </p:nvSpPr>
+          <p:spPr>
+            <a:xfrm rot="16200000">
+              <a:off x="1639337" y="2061439"/>
+              <a:ext cx="1249080" cy="457006"/>
+            </a:xfrm>
+            <a:prstGeom prst="roundRect">
+              <a:avLst>
+                <a:gd name="adj" fmla="val 26239"/>
+              </a:avLst>
+            </a:prstGeom>
+            <a:solidFill>
+              <a:srgbClr val="FFFFFF"/>
+            </a:solidFill>
+            <a:ln w="12700" cap="flat" cmpd="sng" algn="ctr">
+              <a:solidFill>
+                <a:srgbClr val="CBD3D7">
+                  <a:lumMod val="75000"/>
+                </a:srgbClr>
+              </a:solidFill>
+              <a:prstDash val="solid"/>
+            </a:ln>
+            <a:effectLst/>
+          </p:spPr>
+          <p:txBody>
+            <a:bodyPr lIns="180000" tIns="0" bIns="0" rtlCol="0" anchor="ctr"/>
+            <a:lstStyle/>
+            <a:p>
+              <a:pPr marL="0" marR="0" lvl="0" indent="0" defTabSz="914377" eaLnBrk="1" fontAlgn="auto" latinLnBrk="0" hangingPunct="1">
+                <a:lnSpc>
+                  <a:spcPct val="100000"/>
+                </a:lnSpc>
+                <a:spcBef>
+                  <a:spcPts val="0"/>
+                </a:spcBef>
+                <a:spcAft>
+                  <a:spcPts val="0"/>
+                </a:spcAft>
+                <a:buClrTx/>
+                <a:buSzTx/>
+                <a:buFontTx/>
+                <a:buNone/>
+                <a:tabLst/>
+                <a:defRPr/>
+              </a:pPr>
+              <a:endParaRPr kumimoji="0" lang="en-US" sz="1200" b="0" i="0" u="none" strike="noStrike" kern="0" cap="none" spc="0" normalizeH="0" baseline="0" noProof="0" dirty="0" smtClean="0">
+                <a:ln>
+                  <a:noFill/>
+                </a:ln>
+                <a:solidFill>
+                  <a:srgbClr val="4B5357"/>
+                </a:solidFill>
+                <a:effectLst/>
+                <a:uLnTx/>
+                <a:uFillTx/>
+                <a:latin typeface="Source Sans Pro" panose="020B0503030403020204" pitchFamily="34" charset="0"/>
+                <a:ea typeface="Source Sans Pro" panose="020B0503030403020204" pitchFamily="34" charset="0"/>
+                <a:cs typeface="+mn-cs"/>
+              </a:endParaRPr>
+            </a:p>
+          </p:txBody>
+        </p:sp>
+        <p:grpSp>
+          <p:nvGrpSpPr>
+            <p:cNvPr id="86" name="Group 85">
+              <a:extLst>
+                <a:ext uri="{FF2B5EF4-FFF2-40B4-BE49-F238E27FC236}">
+                  <a16:creationId xmlns:a16="http://schemas.microsoft.com/office/drawing/2014/main" xmlns="" id="{31A2CEBA-9424-CE4B-8875-9F4EF9B80405}"/>
+                </a:ext>
+              </a:extLst>
+            </p:cNvPr>
+            <p:cNvGrpSpPr/>
+            <p:nvPr/>
+          </p:nvGrpSpPr>
+          <p:grpSpPr>
+            <a:xfrm>
+              <a:off x="2070728" y="1671500"/>
+              <a:ext cx="386296" cy="1198121"/>
+              <a:chOff x="6408118" y="2620915"/>
+              <a:chExt cx="386296" cy="1198121"/>
+            </a:xfrm>
+          </p:grpSpPr>
+          <p:sp>
+            <p:nvSpPr>
+              <p:cNvPr id="87" name="Round Same Side Corner Rectangle 50">
+                <a:extLst>
+                  <a:ext uri="{FF2B5EF4-FFF2-40B4-BE49-F238E27FC236}">
+                    <a16:creationId xmlns:a16="http://schemas.microsoft.com/office/drawing/2014/main" xmlns="" id="{D4C5EF9C-AE46-8844-9C31-32C4F403BBF6}"/>
+                  </a:ext>
+                </a:extLst>
+              </p:cNvPr>
+              <p:cNvSpPr/>
+              <p:nvPr/>
+            </p:nvSpPr>
+            <p:spPr>
+              <a:xfrm rot="10800000">
+                <a:off x="6413930" y="3536977"/>
+                <a:ext cx="380481" cy="282059"/>
+              </a:xfrm>
+              <a:prstGeom prst="round2SameRect">
+                <a:avLst>
+                  <a:gd name="adj1" fmla="val 24382"/>
+                  <a:gd name="adj2" fmla="val 0"/>
+                </a:avLst>
+              </a:prstGeom>
+              <a:solidFill>
+                <a:srgbClr val="EE502E">
+                  <a:lumMod val="40000"/>
+                  <a:lumOff val="60000"/>
+                </a:srgbClr>
+              </a:solidFill>
+              <a:ln w="12700" cap="flat" cmpd="sng" algn="ctr">
+                <a:noFill/>
+                <a:prstDash val="solid"/>
+                <a:round/>
+              </a:ln>
+              <a:effectLst/>
+            </p:spPr>
+            <p:txBody>
+              <a:bodyPr rtlCol="0" anchor="ctr"/>
+              <a:lstStyle/>
+              <a:p>
+                <a:pPr marL="0" marR="0" lvl="0" indent="0" algn="ctr" defTabSz="914377" eaLnBrk="1" fontAlgn="auto" latinLnBrk="0" hangingPunct="1">
+                  <a:lnSpc>
+                    <a:spcPct val="100000"/>
+                  </a:lnSpc>
+                  <a:spcBef>
+                    <a:spcPts val="0"/>
+                  </a:spcBef>
+                  <a:spcAft>
+                    <a:spcPts val="0"/>
+                  </a:spcAft>
+                  <a:buClrTx/>
+                  <a:buSzTx/>
+                  <a:buFontTx/>
+                  <a:buNone/>
+                  <a:tabLst/>
+                  <a:defRPr/>
+                </a:pPr>
+                <a:endParaRPr kumimoji="0" lang="en-US" sz="1800" b="0" i="0" u="none" strike="noStrike" kern="0" cap="none" spc="0" normalizeH="0" baseline="0" noProof="0" smtClean="0">
+                  <a:ln>
+                    <a:noFill/>
+                  </a:ln>
+                  <a:solidFill>
+                    <a:srgbClr val="FFFFFF"/>
+                  </a:solidFill>
+                  <a:effectLst/>
+                  <a:uLnTx/>
+                  <a:uFillTx/>
+                  <a:latin typeface="Calibri Light"/>
+                  <a:ea typeface="+mn-ea"/>
+                  <a:cs typeface="+mn-cs"/>
+                </a:endParaRPr>
+              </a:p>
+            </p:txBody>
+          </p:sp>
+          <p:sp>
+            <p:nvSpPr>
+              <p:cNvPr id="88" name="Rounded Rectangle 87">
+                <a:extLst>
+                  <a:ext uri="{FF2B5EF4-FFF2-40B4-BE49-F238E27FC236}">
+                    <a16:creationId xmlns:a16="http://schemas.microsoft.com/office/drawing/2014/main" xmlns="" id="{91AB64CB-4F0F-F24E-95B8-BC5C2470ECF1}"/>
+                  </a:ext>
+                </a:extLst>
+              </p:cNvPr>
+              <p:cNvSpPr/>
+              <p:nvPr/>
+            </p:nvSpPr>
+            <p:spPr>
+              <a:xfrm rot="16200000">
+                <a:off x="6002205" y="3026828"/>
+                <a:ext cx="1198121" cy="386296"/>
+              </a:xfrm>
+              <a:prstGeom prst="roundRect">
+                <a:avLst>
+                  <a:gd name="adj" fmla="val 17902"/>
+                </a:avLst>
+              </a:prstGeom>
+              <a:noFill/>
+              <a:ln w="12700" cap="flat" cmpd="sng" algn="ctr">
+                <a:noFill/>
+                <a:prstDash val="solid"/>
+              </a:ln>
+              <a:effectLst/>
+            </p:spPr>
+            <p:txBody>
+              <a:bodyPr lIns="72000" tIns="0" rIns="0" bIns="0" rtlCol="0" anchor="ctr"/>
+              <a:lstStyle/>
+              <a:p>
+                <a:pPr marL="0" marR="0" lvl="0" indent="0" defTabSz="914377" eaLnBrk="1" fontAlgn="auto" latinLnBrk="0" hangingPunct="1">
+                  <a:lnSpc>
+                    <a:spcPct val="100000"/>
+                  </a:lnSpc>
+                  <a:spcBef>
+                    <a:spcPts val="0"/>
+                  </a:spcBef>
+                  <a:spcAft>
+                    <a:spcPts val="0"/>
+                  </a:spcAft>
+                  <a:buClrTx/>
+                  <a:buSzTx/>
+                  <a:buFontTx/>
+                  <a:buNone/>
+                  <a:tabLst/>
+                  <a:defRPr/>
+                </a:pPr>
+                <a:r>
+                  <a:rPr kumimoji="0" lang="en-US" sz="1200" b="0" i="0" u="none" strike="noStrike" kern="0" cap="none" spc="0" normalizeH="0" baseline="0" noProof="0" dirty="0" smtClean="0">
+                    <a:ln>
+                      <a:noFill/>
+                    </a:ln>
+                    <a:solidFill>
+                      <a:srgbClr val="EE502E">
+                        <a:lumMod val="50000"/>
+                      </a:srgbClr>
+                    </a:solidFill>
+                    <a:effectLst/>
+                    <a:uLnTx/>
+                    <a:uFillTx/>
+                    <a:latin typeface="Source Sans Pro" panose="020B0503030403020204" pitchFamily="34" charset="0"/>
+                    <a:ea typeface="Source Sans Pro" panose="020B0503030403020204" pitchFamily="34" charset="0"/>
+                    <a:cs typeface="+mn-cs"/>
+                  </a:rPr>
+                  <a:t>Thread 02 stack</a:t>
+                </a:r>
+              </a:p>
+            </p:txBody>
+          </p:sp>
+        </p:grpSp>
+      </p:grpSp>
+      <p:grpSp>
+        <p:nvGrpSpPr>
+          <p:cNvPr id="89" name="Group 88">
+            <a:extLst>
+              <a:ext uri="{FF2B5EF4-FFF2-40B4-BE49-F238E27FC236}">
+                <a16:creationId xmlns:a16="http://schemas.microsoft.com/office/drawing/2014/main" xmlns="" id="{F6F898C3-EA75-634D-87ED-FBE9F7FD21E4}"/>
+              </a:ext>
+            </a:extLst>
+          </p:cNvPr>
+          <p:cNvGrpSpPr/>
+          <p:nvPr/>
+        </p:nvGrpSpPr>
+        <p:grpSpPr>
+          <a:xfrm>
+            <a:off x="6319649" y="1581015"/>
+            <a:ext cx="457006" cy="1249079"/>
+            <a:chOff x="1478332" y="1665403"/>
+            <a:chExt cx="457006" cy="1249079"/>
+          </a:xfrm>
+        </p:grpSpPr>
+        <p:sp>
+          <p:nvSpPr>
+            <p:cNvPr id="90" name="Rounded Rectangle 89">
+              <a:extLst>
+                <a:ext uri="{FF2B5EF4-FFF2-40B4-BE49-F238E27FC236}">
+                  <a16:creationId xmlns:a16="http://schemas.microsoft.com/office/drawing/2014/main" xmlns="" id="{08B87B98-DDE2-B344-8732-DCD1CE8BF92F}"/>
+                </a:ext>
+              </a:extLst>
+            </p:cNvPr>
+            <p:cNvSpPr/>
+            <p:nvPr/>
+          </p:nvSpPr>
+          <p:spPr>
+            <a:xfrm rot="16200000">
+              <a:off x="1082295" y="2061440"/>
+              <a:ext cx="1249079" cy="457006"/>
+            </a:xfrm>
+            <a:prstGeom prst="roundRect">
+              <a:avLst>
+                <a:gd name="adj" fmla="val 26239"/>
+              </a:avLst>
+            </a:prstGeom>
+            <a:solidFill>
+              <a:srgbClr val="FFFFFF"/>
+            </a:solidFill>
+            <a:ln w="12700" cap="flat" cmpd="sng" algn="ctr">
+              <a:solidFill>
+                <a:srgbClr val="CBD3D7">
+                  <a:lumMod val="75000"/>
+                </a:srgbClr>
+              </a:solidFill>
+              <a:prstDash val="solid"/>
+            </a:ln>
+            <a:effectLst/>
+          </p:spPr>
+          <p:txBody>
+            <a:bodyPr lIns="180000" tIns="0" bIns="0" rtlCol="0" anchor="ctr"/>
+            <a:lstStyle/>
+            <a:p>
+              <a:pPr marL="0" marR="0" lvl="0" indent="0" defTabSz="914377" eaLnBrk="1" fontAlgn="auto" latinLnBrk="0" hangingPunct="1">
+                <a:lnSpc>
+                  <a:spcPct val="100000"/>
+                </a:lnSpc>
+                <a:spcBef>
+                  <a:spcPts val="0"/>
+                </a:spcBef>
+                <a:spcAft>
+                  <a:spcPts val="0"/>
+                </a:spcAft>
+                <a:buClrTx/>
+                <a:buSzTx/>
+                <a:buFontTx/>
+                <a:buNone/>
+                <a:tabLst/>
+                <a:defRPr/>
+              </a:pPr>
+              <a:endParaRPr kumimoji="0" lang="en-US" sz="1200" b="0" i="0" u="none" strike="noStrike" kern="0" cap="none" spc="0" normalizeH="0" baseline="0" noProof="0" dirty="0" smtClean="0">
+                <a:ln>
+                  <a:noFill/>
+                </a:ln>
+                <a:solidFill>
+                  <a:srgbClr val="4B5357"/>
+                </a:solidFill>
+                <a:effectLst/>
+                <a:uLnTx/>
+                <a:uFillTx/>
+                <a:latin typeface="Source Sans Pro" panose="020B0503030403020204" pitchFamily="34" charset="0"/>
+                <a:ea typeface="Source Sans Pro" panose="020B0503030403020204" pitchFamily="34" charset="0"/>
+                <a:cs typeface="+mn-cs"/>
+              </a:endParaRPr>
+            </a:p>
+          </p:txBody>
+        </p:sp>
+        <p:grpSp>
+          <p:nvGrpSpPr>
+            <p:cNvPr id="91" name="Group 90">
+              <a:extLst>
+                <a:ext uri="{FF2B5EF4-FFF2-40B4-BE49-F238E27FC236}">
+                  <a16:creationId xmlns:a16="http://schemas.microsoft.com/office/drawing/2014/main" xmlns="" id="{A59B9267-E3E2-8847-9195-9F7079E18415}"/>
+                </a:ext>
+              </a:extLst>
+            </p:cNvPr>
+            <p:cNvGrpSpPr/>
+            <p:nvPr/>
+          </p:nvGrpSpPr>
+          <p:grpSpPr>
+            <a:xfrm>
+              <a:off x="1513686" y="1671500"/>
+              <a:ext cx="386296" cy="1198122"/>
+              <a:chOff x="6408118" y="2620915"/>
+              <a:chExt cx="386296" cy="1198122"/>
+            </a:xfrm>
+          </p:grpSpPr>
+          <p:sp>
+            <p:nvSpPr>
+              <p:cNvPr id="92" name="Round Same Side Corner Rectangle 50">
+                <a:extLst>
+                  <a:ext uri="{FF2B5EF4-FFF2-40B4-BE49-F238E27FC236}">
+                    <a16:creationId xmlns:a16="http://schemas.microsoft.com/office/drawing/2014/main" xmlns="" id="{02CEE8DD-4399-314A-9870-E299038E7973}"/>
+                  </a:ext>
+                </a:extLst>
+              </p:cNvPr>
+              <p:cNvSpPr/>
+              <p:nvPr/>
+            </p:nvSpPr>
+            <p:spPr>
+              <a:xfrm rot="10800000">
+                <a:off x="6413932" y="2837437"/>
+                <a:ext cx="380481" cy="981600"/>
+              </a:xfrm>
+              <a:prstGeom prst="round2SameRect">
+                <a:avLst>
+                  <a:gd name="adj1" fmla="val 24382"/>
+                  <a:gd name="adj2" fmla="val 0"/>
+                </a:avLst>
+              </a:prstGeom>
+              <a:solidFill>
+                <a:srgbClr val="EE502E">
+                  <a:lumMod val="40000"/>
+                  <a:lumOff val="60000"/>
+                </a:srgbClr>
+              </a:solidFill>
+              <a:ln w="12700" cap="flat" cmpd="sng" algn="ctr">
+                <a:noFill/>
+                <a:prstDash val="solid"/>
+                <a:round/>
+              </a:ln>
+              <a:effectLst/>
+            </p:spPr>
+            <p:txBody>
+              <a:bodyPr rtlCol="0" anchor="ctr"/>
+              <a:lstStyle/>
+              <a:p>
+                <a:pPr marL="0" marR="0" lvl="0" indent="0" algn="ctr" defTabSz="914377" eaLnBrk="1" fontAlgn="auto" latinLnBrk="0" hangingPunct="1">
+                  <a:lnSpc>
+                    <a:spcPct val="100000"/>
+                  </a:lnSpc>
+                  <a:spcBef>
+                    <a:spcPts val="0"/>
+                  </a:spcBef>
+                  <a:spcAft>
+                    <a:spcPts val="0"/>
+                  </a:spcAft>
+                  <a:buClrTx/>
+                  <a:buSzTx/>
+                  <a:buFontTx/>
+                  <a:buNone/>
+                  <a:tabLst/>
+                  <a:defRPr/>
+                </a:pPr>
+                <a:endParaRPr kumimoji="0" lang="en-US" sz="1800" b="0" i="0" u="none" strike="noStrike" kern="0" cap="none" spc="0" normalizeH="0" baseline="0" noProof="0" smtClean="0">
+                  <a:ln>
+                    <a:noFill/>
+                  </a:ln>
+                  <a:solidFill>
+                    <a:srgbClr val="FFFFFF"/>
+                  </a:solidFill>
+                  <a:effectLst/>
+                  <a:uLnTx/>
+                  <a:uFillTx/>
+                  <a:latin typeface="Calibri Light"/>
+                  <a:ea typeface="+mn-ea"/>
+                  <a:cs typeface="+mn-cs"/>
+                </a:endParaRPr>
+              </a:p>
+            </p:txBody>
+          </p:sp>
+          <p:sp>
+            <p:nvSpPr>
+              <p:cNvPr id="93" name="Rounded Rectangle 92">
+                <a:extLst>
+                  <a:ext uri="{FF2B5EF4-FFF2-40B4-BE49-F238E27FC236}">
+                    <a16:creationId xmlns:a16="http://schemas.microsoft.com/office/drawing/2014/main" xmlns="" id="{CE725D48-A97E-9843-B343-73B099DDD6DD}"/>
+                  </a:ext>
+                </a:extLst>
+              </p:cNvPr>
+              <p:cNvSpPr/>
+              <p:nvPr/>
+            </p:nvSpPr>
+            <p:spPr>
+              <a:xfrm rot="16200000">
+                <a:off x="6002205" y="3026828"/>
+                <a:ext cx="1198121" cy="386296"/>
+              </a:xfrm>
+              <a:prstGeom prst="roundRect">
+                <a:avLst>
+                  <a:gd name="adj" fmla="val 17902"/>
+                </a:avLst>
+              </a:prstGeom>
+              <a:noFill/>
+              <a:ln w="12700" cap="flat" cmpd="sng" algn="ctr">
+                <a:noFill/>
+                <a:prstDash val="solid"/>
+              </a:ln>
+              <a:effectLst/>
+            </p:spPr>
+            <p:txBody>
+              <a:bodyPr lIns="72000" tIns="0" rIns="0" bIns="0" rtlCol="0" anchor="ctr"/>
+              <a:lstStyle/>
+              <a:p>
+                <a:pPr marL="0" marR="0" lvl="0" indent="0" defTabSz="914377" eaLnBrk="1" fontAlgn="auto" latinLnBrk="0" hangingPunct="1">
+                  <a:lnSpc>
+                    <a:spcPct val="100000"/>
+                  </a:lnSpc>
+                  <a:spcBef>
+                    <a:spcPts val="0"/>
+                  </a:spcBef>
+                  <a:spcAft>
+                    <a:spcPts val="0"/>
+                  </a:spcAft>
+                  <a:buClrTx/>
+                  <a:buSzTx/>
+                  <a:buFontTx/>
+                  <a:buNone/>
+                  <a:tabLst/>
+                  <a:defRPr/>
+                </a:pPr>
+                <a:r>
+                  <a:rPr kumimoji="0" lang="en-US" sz="1200" b="0" i="0" u="none" strike="noStrike" kern="0" cap="none" spc="0" normalizeH="0" baseline="0" noProof="0" dirty="0" smtClean="0">
+                    <a:ln>
+                      <a:noFill/>
+                    </a:ln>
+                    <a:solidFill>
+                      <a:srgbClr val="EE502E">
+                        <a:lumMod val="50000"/>
+                      </a:srgbClr>
+                    </a:solidFill>
+                    <a:effectLst/>
+                    <a:uLnTx/>
+                    <a:uFillTx/>
+                    <a:latin typeface="Source Sans Pro" panose="020B0503030403020204" pitchFamily="34" charset="0"/>
+                    <a:ea typeface="Source Sans Pro" panose="020B0503030403020204" pitchFamily="34" charset="0"/>
+                    <a:cs typeface="+mn-cs"/>
+                  </a:rPr>
+                  <a:t>Thread 01 stack</a:t>
+                </a:r>
+              </a:p>
+            </p:txBody>
+          </p:sp>
+        </p:grpSp>
+      </p:grpSp>
+      <p:pic>
+        <p:nvPicPr>
+          <p:cNvPr id="94" name="Picture 93">
+            <a:extLst>
+              <a:ext uri="{FF2B5EF4-FFF2-40B4-BE49-F238E27FC236}">
+                <a16:creationId xmlns:a16="http://schemas.microsoft.com/office/drawing/2014/main" xmlns="" id="{38E1CC46-0252-844D-BDCC-00ADE42A00EF}"/>
+              </a:ext>
+            </a:extLst>
+          </p:cNvPr>
+          <p:cNvPicPr>
+            <a:picLocks noChangeAspect="1"/>
+          </p:cNvPicPr>
+          <p:nvPr/>
+        </p:nvPicPr>
+        <p:blipFill>
+          <a:blip r:embed="rId5" cstate="print">
+            <a:extLst>
+              <a:ext uri="{28A0092B-C50C-407E-A947-70E740481C1C}">
+                <a14:useLocalDpi xmlns:a14="http://schemas.microsoft.com/office/drawing/2010/main" val="0"/>
+              </a:ext>
+            </a:extLst>
+          </a:blip>
+          <a:stretch>
+            <a:fillRect/>
+          </a:stretch>
+        </p:blipFill>
+        <p:spPr>
+          <a:xfrm>
+            <a:off x="6171431" y="2927108"/>
+            <a:ext cx="1276237" cy="215542"/>
+          </a:xfrm>
+          <a:prstGeom prst="rect">
+            <a:avLst/>
+          </a:prstGeom>
+        </p:spPr>
+      </p:pic>
+      <p:sp>
+        <p:nvSpPr>
+          <p:cNvPr id="95" name="Rounded Rectangle 94">
+            <a:extLst>
+              <a:ext uri="{FF2B5EF4-FFF2-40B4-BE49-F238E27FC236}">
+                <a16:creationId xmlns:a16="http://schemas.microsoft.com/office/drawing/2014/main" xmlns="" id="{ED572452-17D4-214A-A23B-707FEE9619E8}"/>
               </a:ext>
             </a:extLst>
           </p:cNvPr>
@@ -3655,18 +5963,16 @@
           <p:nvPr/>
         </p:nvSpPr>
         <p:spPr>
-          <a:xfrm rot="5400000">
-            <a:off x="2417576" y="3886107"/>
-            <a:ext cx="2958948" cy="246414"/>
+          <a:xfrm rot="16200000">
+            <a:off x="5272821" y="2746060"/>
+            <a:ext cx="1459406" cy="386296"/>
           </a:xfrm>
           <a:prstGeom prst="roundRect">
             <a:avLst>
-              <a:gd name="adj" fmla="val 29004"/>
+              <a:gd name="adj" fmla="val 17902"/>
             </a:avLst>
           </a:prstGeom>
-          <a:solidFill>
-            <a:srgbClr val="6CC24A"/>
-          </a:solidFill>
+          <a:noFill/>
           <a:ln w="12700" cap="flat" cmpd="sng" algn="ctr">
             <a:noFill/>
             <a:prstDash val="solid"/>
@@ -3674,12 +5980,10 @@
           <a:effectLst/>
         </p:spPr>
         <p:txBody>
-          <a:bodyPr wrap="square" tIns="10800" rIns="90000" bIns="10800" rtlCol="0" anchor="ctr">
-            <a:spAutoFit/>
-          </a:bodyPr>
+          <a:bodyPr lIns="72000" tIns="0" rIns="0" bIns="0" rtlCol="0" anchor="ctr"/>
           <a:lstStyle/>
           <a:p>
-            <a:pPr marL="0" marR="0" lvl="0" indent="0" algn="ctr" defTabSz="914377" eaLnBrk="1" fontAlgn="auto" latinLnBrk="0" hangingPunct="1">
+            <a:pPr marL="0" marR="0" lvl="0" indent="0" defTabSz="914377" eaLnBrk="1" fontAlgn="auto" latinLnBrk="0" hangingPunct="1">
               <a:lnSpc>
                 <a:spcPct val="100000"/>
               </a:lnSpc>
@@ -3697,31 +6001,31 @@
               <a:defRPr/>
             </a:pPr>
             <a:r>
-              <a:rPr kumimoji="0" lang="en-US" sz="1200" b="1" u="none" strike="noStrike" kern="0" cap="none" spc="0" normalizeH="0" baseline="0" noProof="0" dirty="0">
+              <a:rPr kumimoji="0" lang="en-US" sz="1200" b="0" i="0" u="none" strike="noStrike" kern="0" cap="none" spc="0" normalizeH="0" baseline="0" noProof="0" dirty="0" smtClean="0">
                 <a:ln>
                   <a:noFill/>
                 </a:ln>
                 <a:solidFill>
-                  <a:srgbClr val="FFFFFF"/>
+                  <a:srgbClr val="4B5357"/>
                 </a:solidFill>
                 <a:effectLst/>
                 <a:uLnTx/>
                 <a:uFillTx/>
-                <a:latin typeface="Source Sans Pro Light" charset="0"/>
-                <a:ea typeface="Source Sans Pro Light" charset="0"/>
-                <a:cs typeface="Source Sans Pro Light" charset="0"/>
+                <a:latin typeface="Source Sans Pro" panose="020B0503030403020204" pitchFamily="34" charset="0"/>
+                <a:ea typeface="Source Sans Pro" panose="020B0503030403020204" pitchFamily="34" charset="0"/>
+                <a:cs typeface="+mn-cs"/>
               </a:rPr>
-              <a:t>Green Thread 2</a:t>
+              <a:t>MEJ32 Task stack</a:t>
             </a:r>
           </a:p>
         </p:txBody>
       </p:sp>
       <p:sp>
         <p:nvSpPr>
-          <p:cNvPr id="12" name="Rounded Rectangle 165">
-            <a:extLst>
-              <a:ext uri="{FF2B5EF4-FFF2-40B4-BE49-F238E27FC236}">
-                <a16:creationId xmlns:a16="http://schemas.microsoft.com/office/drawing/2014/main" id="{C733F54E-B563-4EF0-8544-6704534ECAEA}"/>
+          <p:cNvPr id="96" name="Rounded Rectangle 95">
+            <a:extLst>
+              <a:ext uri="{FF2B5EF4-FFF2-40B4-BE49-F238E27FC236}">
+                <a16:creationId xmlns:a16="http://schemas.microsoft.com/office/drawing/2014/main" xmlns="" id="{79894AE0-B1C5-8040-94A8-2DC043796F32}"/>
               </a:ext>
             </a:extLst>
           </p:cNvPr>
@@ -3729,31 +6033,33 @@
           <p:nvPr/>
         </p:nvSpPr>
         <p:spPr>
-          <a:xfrm rot="5400000">
-            <a:off x="2767180" y="3886107"/>
-            <a:ext cx="2958948" cy="246414"/>
+          <a:xfrm rot="16200000">
+            <a:off x="4303715" y="2786562"/>
+            <a:ext cx="1354933" cy="457006"/>
           </a:xfrm>
           <a:prstGeom prst="roundRect">
             <a:avLst>
-              <a:gd name="adj" fmla="val 29004"/>
+              <a:gd name="adj" fmla="val 26239"/>
             </a:avLst>
           </a:prstGeom>
           <a:solidFill>
-            <a:srgbClr val="6CC24A"/>
+            <a:srgbClr val="FFFFFF"/>
           </a:solidFill>
           <a:ln w="12700" cap="flat" cmpd="sng" algn="ctr">
-            <a:noFill/>
+            <a:solidFill>
+              <a:srgbClr val="CBD3D7">
+                <a:lumMod val="75000"/>
+              </a:srgbClr>
+            </a:solidFill>
             <a:prstDash val="solid"/>
           </a:ln>
           <a:effectLst/>
         </p:spPr>
         <p:txBody>
-          <a:bodyPr wrap="square" tIns="10800" rIns="90000" bIns="10800" rtlCol="0" anchor="ctr">
-            <a:spAutoFit/>
-          </a:bodyPr>
+          <a:bodyPr lIns="180000" tIns="0" bIns="0" rtlCol="0" anchor="ctr"/>
           <a:lstStyle/>
           <a:p>
-            <a:pPr marL="0" marR="0" lvl="0" indent="0" algn="ctr" defTabSz="914377" eaLnBrk="1" fontAlgn="auto" latinLnBrk="0" hangingPunct="1">
+            <a:pPr marL="0" marR="0" lvl="0" indent="0" defTabSz="914377" eaLnBrk="1" fontAlgn="auto" latinLnBrk="0" hangingPunct="1">
               <a:lnSpc>
                 <a:spcPct val="100000"/>
               </a:lnSpc>
@@ -3770,8 +6076,100 @@
               <a:tabLst/>
               <a:defRPr/>
             </a:pPr>
-            <a:r>
-              <a:rPr kumimoji="0" lang="en-US" sz="1200" b="1" u="none" strike="noStrike" kern="0" cap="none" spc="0" normalizeH="0" baseline="0" noProof="0" dirty="0">
+            <a:endParaRPr kumimoji="0" lang="en-US" sz="1200" b="0" i="0" u="none" strike="noStrike" kern="0" cap="none" spc="0" normalizeH="0" baseline="0" noProof="0" dirty="0" smtClean="0">
+              <a:ln>
+                <a:noFill/>
+              </a:ln>
+              <a:solidFill>
+                <a:srgbClr val="4B5357"/>
+              </a:solidFill>
+              <a:effectLst/>
+              <a:uLnTx/>
+              <a:uFillTx/>
+              <a:latin typeface="Source Sans Pro" panose="020B0503030403020204" pitchFamily="34" charset="0"/>
+              <a:ea typeface="Source Sans Pro" panose="020B0503030403020204" pitchFamily="34" charset="0"/>
+              <a:cs typeface="+mn-cs"/>
+            </a:endParaRPr>
+          </a:p>
+        </p:txBody>
+      </p:sp>
+      <p:grpSp>
+        <p:nvGrpSpPr>
+          <p:cNvPr id="97" name="Group 96">
+            <a:extLst>
+              <a:ext uri="{FF2B5EF4-FFF2-40B4-BE49-F238E27FC236}">
+                <a16:creationId xmlns:a16="http://schemas.microsoft.com/office/drawing/2014/main" xmlns="" id="{0DE0A111-12E5-D745-B18A-A84159FD1342}"/>
+              </a:ext>
+            </a:extLst>
+          </p:cNvPr>
+          <p:cNvGrpSpPr/>
+          <p:nvPr/>
+        </p:nvGrpSpPr>
+        <p:grpSpPr>
+          <a:xfrm>
+            <a:off x="4788034" y="2549109"/>
+            <a:ext cx="386296" cy="1098562"/>
+            <a:chOff x="6408119" y="2014454"/>
+            <a:chExt cx="386296" cy="1804583"/>
+          </a:xfrm>
+        </p:grpSpPr>
+        <p:sp>
+          <p:nvSpPr>
+            <p:cNvPr id="98" name="Round Same Side Corner Rectangle 50">
+              <a:extLst>
+                <a:ext uri="{FF2B5EF4-FFF2-40B4-BE49-F238E27FC236}">
+                  <a16:creationId xmlns:a16="http://schemas.microsoft.com/office/drawing/2014/main" xmlns="" id="{F2D8E32B-399D-174F-A245-9333171A142D}"/>
+                </a:ext>
+              </a:extLst>
+            </p:cNvPr>
+            <p:cNvSpPr/>
+            <p:nvPr/>
+          </p:nvSpPr>
+          <p:spPr>
+            <a:xfrm rot="10800000">
+              <a:off x="6413928" y="3303938"/>
+              <a:ext cx="380481" cy="515098"/>
+            </a:xfrm>
+            <a:prstGeom prst="round2SameRect">
+              <a:avLst>
+                <a:gd name="adj1" fmla="val 24382"/>
+                <a:gd name="adj2" fmla="val 0"/>
+              </a:avLst>
+            </a:prstGeom>
+            <a:solidFill>
+              <a:srgbClr val="CBD3D7">
+                <a:lumMod val="90000"/>
+              </a:srgbClr>
+            </a:solidFill>
+            <a:ln w="12700" cap="flat" cmpd="sng" algn="ctr">
+              <a:noFill/>
+              <a:prstDash val="solid"/>
+              <a:round/>
+            </a:ln>
+            <a:effectLst/>
+          </p:spPr>
+          <p:txBody>
+            <a:bodyPr rtlCol="0" anchor="ctr"/>
+            <a:lstStyle/>
+            <a:p>
+              <a:pPr marL="0" marR="0" lvl="0" indent="0" algn="ctr" defTabSz="914377" eaLnBrk="1" fontAlgn="auto" latinLnBrk="0" hangingPunct="1">
+                <a:lnSpc>
+                  <a:spcPct val="100000"/>
+                </a:lnSpc>
+                <a:spcBef>
+                  <a:spcPts val="0"/>
+                </a:spcBef>
+                <a:spcAft>
+                  <a:spcPts val="0"/>
+                </a:spcAft>
+                <a:buClrTx/>
+                <a:buSzTx/>
+                <a:buFontTx/>
+                <a:buNone/>
+                <a:tabLst/>
+                <a:defRPr/>
+              </a:pPr>
+              <a:endParaRPr kumimoji="0" lang="en-US" sz="1800" b="0" i="0" u="none" strike="noStrike" kern="0" cap="none" spc="0" normalizeH="0" baseline="0" noProof="0" smtClean="0">
                 <a:ln>
                   <a:noFill/>
                 </a:ln>
@@ -3781,21 +6179,90 @@
                 <a:effectLst/>
                 <a:uLnTx/>
                 <a:uFillTx/>
-                <a:latin typeface="Source Sans Pro Light" charset="0"/>
-                <a:ea typeface="Source Sans Pro Light" charset="0"/>
-                <a:cs typeface="Source Sans Pro Light" charset="0"/>
-              </a:rPr>
-              <a:t>Green Thread 3</a:t>
-            </a:r>
-          </a:p>
-        </p:txBody>
-      </p:sp>
-      <p:sp>
-        <p:nvSpPr>
-          <p:cNvPr id="13" name="Rounded Rectangle 165">
-            <a:extLst>
-              <a:ext uri="{FF2B5EF4-FFF2-40B4-BE49-F238E27FC236}">
-                <a16:creationId xmlns:a16="http://schemas.microsoft.com/office/drawing/2014/main" id="{6C44AEBB-391E-461C-BAA6-82F2346E78CF}"/>
+                <a:latin typeface="Calibri Light"/>
+                <a:ea typeface="+mn-ea"/>
+                <a:cs typeface="+mn-cs"/>
+              </a:endParaRPr>
+            </a:p>
+          </p:txBody>
+        </p:sp>
+        <p:sp>
+          <p:nvSpPr>
+            <p:cNvPr id="99" name="Rounded Rectangle 98">
+              <a:extLst>
+                <a:ext uri="{FF2B5EF4-FFF2-40B4-BE49-F238E27FC236}">
+                  <a16:creationId xmlns:a16="http://schemas.microsoft.com/office/drawing/2014/main" xmlns="" id="{CC0E7432-7D24-BD47-B5BE-0C7612671DE7}"/>
+                </a:ext>
+              </a:extLst>
+            </p:cNvPr>
+            <p:cNvSpPr/>
+            <p:nvPr/>
+          </p:nvSpPr>
+          <p:spPr>
+            <a:xfrm rot="16200000">
+              <a:off x="5698975" y="2723598"/>
+              <a:ext cx="1804583" cy="386296"/>
+            </a:xfrm>
+            <a:prstGeom prst="roundRect">
+              <a:avLst>
+                <a:gd name="adj" fmla="val 17902"/>
+              </a:avLst>
+            </a:prstGeom>
+            <a:noFill/>
+            <a:ln w="12700" cap="flat" cmpd="sng" algn="ctr">
+              <a:noFill/>
+              <a:prstDash val="solid"/>
+            </a:ln>
+            <a:effectLst/>
+          </p:spPr>
+          <p:txBody>
+            <a:bodyPr lIns="72000" tIns="0" rIns="0" bIns="0" rtlCol="0" anchor="ctr"/>
+            <a:lstStyle/>
+            <a:p>
+              <a:pPr marL="0" marR="0" lvl="0" indent="0" defTabSz="914377" eaLnBrk="1" fontAlgn="auto" latinLnBrk="0" hangingPunct="1">
+                <a:lnSpc>
+                  <a:spcPct val="100000"/>
+                </a:lnSpc>
+                <a:spcBef>
+                  <a:spcPts val="0"/>
+                </a:spcBef>
+                <a:spcAft>
+                  <a:spcPts val="0"/>
+                </a:spcAft>
+                <a:buClrTx/>
+                <a:buSzTx/>
+                <a:buFontTx/>
+                <a:buNone/>
+                <a:tabLst/>
+                <a:defRPr/>
+              </a:pPr>
+              <a:r>
+                <a:rPr kumimoji="0" lang="en-US" sz="1200" b="0" i="0" u="none" strike="noStrike" kern="0" cap="none" spc="0" normalizeH="0" baseline="0" noProof="0" dirty="0" smtClean="0">
+                  <a:ln>
+                    <a:noFill/>
+                  </a:ln>
+                  <a:solidFill>
+                    <a:srgbClr val="4B5357"/>
+                  </a:solidFill>
+                  <a:effectLst/>
+                  <a:uLnTx/>
+                  <a:uFillTx/>
+                  <a:latin typeface="Source Sans Pro" panose="020B0503030403020204" pitchFamily="34" charset="0"/>
+                  <a:ea typeface="Source Sans Pro" panose="020B0503030403020204" pitchFamily="34" charset="0"/>
+                  <a:cs typeface="+mn-cs"/>
+                </a:rPr>
+                <a:t>Task 02 stack</a:t>
+              </a:r>
+            </a:p>
+          </p:txBody>
+        </p:sp>
+      </p:grpSp>
+      <p:sp>
+        <p:nvSpPr>
+          <p:cNvPr id="100" name="Rounded Rectangle 99">
+            <a:extLst>
+              <a:ext uri="{FF2B5EF4-FFF2-40B4-BE49-F238E27FC236}">
+                <a16:creationId xmlns:a16="http://schemas.microsoft.com/office/drawing/2014/main" xmlns="" id="{192ACE99-6AA2-D140-A519-8A6B1FAF5844}"/>
               </a:ext>
             </a:extLst>
           </p:cNvPr>
@@ -3803,31 +6270,33 @@
           <p:nvPr/>
         </p:nvSpPr>
         <p:spPr>
-          <a:xfrm rot="5400000">
-            <a:off x="2065701" y="3886107"/>
-            <a:ext cx="2958948" cy="246414"/>
+          <a:xfrm rot="16200000">
+            <a:off x="3755914" y="2786563"/>
+            <a:ext cx="1354932" cy="457006"/>
           </a:xfrm>
           <a:prstGeom prst="roundRect">
             <a:avLst>
-              <a:gd name="adj" fmla="val 29004"/>
+              <a:gd name="adj" fmla="val 26239"/>
             </a:avLst>
           </a:prstGeom>
           <a:solidFill>
-            <a:srgbClr val="6CC24A"/>
+            <a:srgbClr val="FFFFFF"/>
           </a:solidFill>
           <a:ln w="12700" cap="flat" cmpd="sng" algn="ctr">
-            <a:noFill/>
+            <a:solidFill>
+              <a:srgbClr val="CBD3D7">
+                <a:lumMod val="75000"/>
+              </a:srgbClr>
+            </a:solidFill>
             <a:prstDash val="solid"/>
           </a:ln>
           <a:effectLst/>
         </p:spPr>
         <p:txBody>
-          <a:bodyPr wrap="square" tIns="10800" rIns="90000" bIns="10800" rtlCol="0" anchor="ctr">
-            <a:spAutoFit/>
-          </a:bodyPr>
+          <a:bodyPr lIns="180000" tIns="0" bIns="0" rtlCol="0" anchor="ctr"/>
           <a:lstStyle/>
           <a:p>
-            <a:pPr marL="0" marR="0" lvl="0" indent="0" algn="ctr" defTabSz="914377" eaLnBrk="1" fontAlgn="auto" latinLnBrk="0" hangingPunct="1">
+            <a:pPr marL="0" marR="0" lvl="0" indent="0" defTabSz="914377" eaLnBrk="1" fontAlgn="auto" latinLnBrk="0" hangingPunct="1">
               <a:lnSpc>
                 <a:spcPct val="100000"/>
               </a:lnSpc>
@@ -3844,8 +6313,100 @@
               <a:tabLst/>
               <a:defRPr/>
             </a:pPr>
-            <a:r>
-              <a:rPr kumimoji="0" lang="en-US" sz="1200" b="1" u="none" strike="noStrike" kern="0" cap="none" spc="0" normalizeH="0" baseline="0" noProof="0" dirty="0">
+            <a:endParaRPr kumimoji="0" lang="en-US" sz="1200" b="0" i="0" u="none" strike="noStrike" kern="0" cap="none" spc="0" normalizeH="0" baseline="0" noProof="0" dirty="0" smtClean="0">
+              <a:ln>
+                <a:noFill/>
+              </a:ln>
+              <a:solidFill>
+                <a:srgbClr val="4B5357"/>
+              </a:solidFill>
+              <a:effectLst/>
+              <a:uLnTx/>
+              <a:uFillTx/>
+              <a:latin typeface="Source Sans Pro" panose="020B0503030403020204" pitchFamily="34" charset="0"/>
+              <a:ea typeface="Source Sans Pro" panose="020B0503030403020204" pitchFamily="34" charset="0"/>
+              <a:cs typeface="+mn-cs"/>
+            </a:endParaRPr>
+          </a:p>
+        </p:txBody>
+      </p:sp>
+      <p:grpSp>
+        <p:nvGrpSpPr>
+          <p:cNvPr id="101" name="Group 100">
+            <a:extLst>
+              <a:ext uri="{FF2B5EF4-FFF2-40B4-BE49-F238E27FC236}">
+                <a16:creationId xmlns:a16="http://schemas.microsoft.com/office/drawing/2014/main" xmlns="" id="{5D69285B-504A-544F-B73C-F193EFA7FC56}"/>
+              </a:ext>
+            </a:extLst>
+          </p:cNvPr>
+          <p:cNvGrpSpPr/>
+          <p:nvPr/>
+        </p:nvGrpSpPr>
+        <p:grpSpPr>
+          <a:xfrm>
+            <a:off x="4240230" y="2528151"/>
+            <a:ext cx="386296" cy="1119522"/>
+            <a:chOff x="6408117" y="1980025"/>
+            <a:chExt cx="386296" cy="1839012"/>
+          </a:xfrm>
+        </p:grpSpPr>
+        <p:sp>
+          <p:nvSpPr>
+            <p:cNvPr id="102" name="Round Same Side Corner Rectangle 50">
+              <a:extLst>
+                <a:ext uri="{FF2B5EF4-FFF2-40B4-BE49-F238E27FC236}">
+                  <a16:creationId xmlns:a16="http://schemas.microsoft.com/office/drawing/2014/main" xmlns="" id="{9DAA079F-F173-494D-8740-976F048DB640}"/>
+                </a:ext>
+              </a:extLst>
+            </p:cNvPr>
+            <p:cNvSpPr/>
+            <p:nvPr/>
+          </p:nvSpPr>
+          <p:spPr>
+            <a:xfrm rot="10800000">
+              <a:off x="6413930" y="1980025"/>
+              <a:ext cx="380481" cy="1839012"/>
+            </a:xfrm>
+            <a:prstGeom prst="round2SameRect">
+              <a:avLst>
+                <a:gd name="adj1" fmla="val 24382"/>
+                <a:gd name="adj2" fmla="val 0"/>
+              </a:avLst>
+            </a:prstGeom>
+            <a:solidFill>
+              <a:srgbClr val="CBD3D7">
+                <a:lumMod val="90000"/>
+              </a:srgbClr>
+            </a:solidFill>
+            <a:ln w="12700" cap="flat" cmpd="sng" algn="ctr">
+              <a:noFill/>
+              <a:prstDash val="solid"/>
+              <a:round/>
+            </a:ln>
+            <a:effectLst/>
+          </p:spPr>
+          <p:txBody>
+            <a:bodyPr rtlCol="0" anchor="ctr"/>
+            <a:lstStyle/>
+            <a:p>
+              <a:pPr marL="0" marR="0" lvl="0" indent="0" algn="ctr" defTabSz="914377" eaLnBrk="1" fontAlgn="auto" latinLnBrk="0" hangingPunct="1">
+                <a:lnSpc>
+                  <a:spcPct val="100000"/>
+                </a:lnSpc>
+                <a:spcBef>
+                  <a:spcPts val="0"/>
+                </a:spcBef>
+                <a:spcAft>
+                  <a:spcPts val="0"/>
+                </a:spcAft>
+                <a:buClrTx/>
+                <a:buSzTx/>
+                <a:buFontTx/>
+                <a:buNone/>
+                <a:tabLst/>
+                <a:defRPr/>
+              </a:pPr>
+              <a:endParaRPr kumimoji="0" lang="en-US" sz="1800" b="0" i="0" u="none" strike="noStrike" kern="0" cap="none" spc="0" normalizeH="0" baseline="0" noProof="0" smtClean="0">
                 <a:ln>
                   <a:noFill/>
                 </a:ln>
@@ -3855,44 +6416,124 @@
                 <a:effectLst/>
                 <a:uLnTx/>
                 <a:uFillTx/>
-                <a:latin typeface="Source Sans Pro Light" charset="0"/>
-                <a:ea typeface="Source Sans Pro Light" charset="0"/>
-                <a:cs typeface="Source Sans Pro Light" charset="0"/>
-              </a:rPr>
-              <a:t>Green Thread 1</a:t>
-            </a:r>
-          </a:p>
-        </p:txBody>
-      </p:sp>
-      <p:sp>
-        <p:nvSpPr>
-          <p:cNvPr id="15" name="TextBox 14">
-            <a:extLst>
-              <a:ext uri="{FF2B5EF4-FFF2-40B4-BE49-F238E27FC236}">
-                <a16:creationId xmlns:a16="http://schemas.microsoft.com/office/drawing/2014/main" id="{CBA6235C-4D84-4DD3-BE0F-F805878EF189}"/>
-              </a:ext>
-            </a:extLst>
-          </p:cNvPr>
-          <p:cNvSpPr txBox="1"/>
+                <a:latin typeface="Calibri Light"/>
+                <a:ea typeface="+mn-ea"/>
+                <a:cs typeface="+mn-cs"/>
+              </a:endParaRPr>
+            </a:p>
+          </p:txBody>
+        </p:sp>
+        <p:sp>
+          <p:nvSpPr>
+            <p:cNvPr id="103" name="Rounded Rectangle 102">
+              <a:extLst>
+                <a:ext uri="{FF2B5EF4-FFF2-40B4-BE49-F238E27FC236}">
+                  <a16:creationId xmlns:a16="http://schemas.microsoft.com/office/drawing/2014/main" xmlns="" id="{501C64AB-C705-064D-9072-B95DF7A69B2F}"/>
+                </a:ext>
+              </a:extLst>
+            </p:cNvPr>
+            <p:cNvSpPr/>
+            <p:nvPr/>
+          </p:nvSpPr>
+          <p:spPr>
+            <a:xfrm rot="16200000">
+              <a:off x="5698975" y="2723598"/>
+              <a:ext cx="1804580" cy="386296"/>
+            </a:xfrm>
+            <a:prstGeom prst="roundRect">
+              <a:avLst>
+                <a:gd name="adj" fmla="val 17902"/>
+              </a:avLst>
+            </a:prstGeom>
+            <a:noFill/>
+            <a:ln w="12700" cap="flat" cmpd="sng" algn="ctr">
+              <a:noFill/>
+              <a:prstDash val="solid"/>
+            </a:ln>
+            <a:effectLst/>
+          </p:spPr>
+          <p:txBody>
+            <a:bodyPr lIns="72000" tIns="0" rIns="0" bIns="0" rtlCol="0" anchor="ctr"/>
+            <a:lstStyle/>
+            <a:p>
+              <a:pPr marL="0" marR="0" lvl="0" indent="0" defTabSz="914377" eaLnBrk="1" fontAlgn="auto" latinLnBrk="0" hangingPunct="1">
+                <a:lnSpc>
+                  <a:spcPct val="100000"/>
+                </a:lnSpc>
+                <a:spcBef>
+                  <a:spcPts val="0"/>
+                </a:spcBef>
+                <a:spcAft>
+                  <a:spcPts val="0"/>
+                </a:spcAft>
+                <a:buClrTx/>
+                <a:buSzTx/>
+                <a:buFontTx/>
+                <a:buNone/>
+                <a:tabLst/>
+                <a:defRPr/>
+              </a:pPr>
+              <a:r>
+                <a:rPr kumimoji="0" lang="en-US" sz="1200" b="0" i="0" u="none" strike="noStrike" kern="0" cap="none" spc="0" normalizeH="0" baseline="0" noProof="0" dirty="0" smtClean="0">
+                  <a:ln>
+                    <a:noFill/>
+                  </a:ln>
+                  <a:solidFill>
+                    <a:srgbClr val="4B5357"/>
+                  </a:solidFill>
+                  <a:effectLst/>
+                  <a:uLnTx/>
+                  <a:uFillTx/>
+                  <a:latin typeface="Source Sans Pro" panose="020B0503030403020204" pitchFamily="34" charset="0"/>
+                  <a:ea typeface="Source Sans Pro" panose="020B0503030403020204" pitchFamily="34" charset="0"/>
+                  <a:cs typeface="+mn-cs"/>
+                </a:rPr>
+                <a:t>Task 01 stack</a:t>
+              </a:r>
+            </a:p>
+          </p:txBody>
+        </p:sp>
+      </p:grpSp>
+      <p:sp>
+        <p:nvSpPr>
+          <p:cNvPr id="104" name="Rounded Rectangle 103">
+            <a:extLst>
+              <a:ext uri="{FF2B5EF4-FFF2-40B4-BE49-F238E27FC236}">
+                <a16:creationId xmlns:a16="http://schemas.microsoft.com/office/drawing/2014/main" xmlns="" id="{DDA57B5B-6D93-7D43-A266-FA158A55DE6F}"/>
+              </a:ext>
+            </a:extLst>
+          </p:cNvPr>
+          <p:cNvSpPr/>
           <p:nvPr/>
         </p:nvSpPr>
         <p:spPr>
-          <a:xfrm>
-            <a:off x="2932163" y="5553000"/>
-            <a:ext cx="1929774" cy="276999"/>
+          <a:xfrm rot="16200000">
+            <a:off x="4851678" y="2786562"/>
+            <a:ext cx="1354934" cy="457006"/>
           </a:xfrm>
-          <a:prstGeom prst="rect">
-            <a:avLst/>
+          <a:prstGeom prst="roundRect">
+            <a:avLst>
+              <a:gd name="adj" fmla="val 26239"/>
+            </a:avLst>
           </a:prstGeom>
-          <a:noFill/>
+          <a:solidFill>
+            <a:srgbClr val="FFFFFF"/>
+          </a:solidFill>
+          <a:ln w="12700" cap="flat" cmpd="sng" algn="ctr">
+            <a:solidFill>
+              <a:srgbClr val="CBD3D7">
+                <a:lumMod val="75000"/>
+              </a:srgbClr>
+            </a:solidFill>
+            <a:prstDash val="solid"/>
+          </a:ln>
+          <a:effectLst/>
         </p:spPr>
         <p:txBody>
-          <a:bodyPr wrap="square" lIns="108000" rIns="108000" rtlCol="0">
-            <a:spAutoFit/>
-          </a:bodyPr>
+          <a:bodyPr lIns="180000" tIns="0" bIns="0" rtlCol="0" anchor="ctr"/>
           <a:lstStyle/>
           <a:p>
-            <a:pPr marL="0" marR="0" lvl="0" indent="0" algn="ctr" defTabSz="914377" eaLnBrk="1" fontAlgn="auto" latinLnBrk="0" hangingPunct="1">
+            <a:pPr marL="0" marR="0" lvl="0" indent="0" defTabSz="914377" eaLnBrk="1" fontAlgn="auto" latinLnBrk="0" hangingPunct="1">
               <a:lnSpc>
                 <a:spcPct val="100000"/>
               </a:lnSpc>
@@ -3909,221 +6550,187 @@
               <a:tabLst/>
               <a:defRPr/>
             </a:pPr>
-            <a:r>
-              <a:rPr kumimoji="0" lang="en-US" sz="1200" b="1" i="0" u="none" strike="noStrike" kern="0" cap="none" spc="0" normalizeH="0" baseline="0" noProof="0" dirty="0">
+            <a:endParaRPr kumimoji="0" lang="en-US" sz="1200" b="0" i="0" u="none" strike="noStrike" kern="0" cap="none" spc="0" normalizeH="0" baseline="0" noProof="0" dirty="0" smtClean="0">
+              <a:ln>
+                <a:noFill/>
+              </a:ln>
+              <a:solidFill>
+                <a:srgbClr val="4B5357"/>
+              </a:solidFill>
+              <a:effectLst/>
+              <a:uLnTx/>
+              <a:uFillTx/>
+              <a:latin typeface="Source Sans Pro" panose="020B0503030403020204" pitchFamily="34" charset="0"/>
+              <a:ea typeface="Source Sans Pro" panose="020B0503030403020204" pitchFamily="34" charset="0"/>
+              <a:cs typeface="+mn-cs"/>
+            </a:endParaRPr>
+          </a:p>
+        </p:txBody>
+      </p:sp>
+      <p:grpSp>
+        <p:nvGrpSpPr>
+          <p:cNvPr id="105" name="Group 104">
+            <a:extLst>
+              <a:ext uri="{FF2B5EF4-FFF2-40B4-BE49-F238E27FC236}">
+                <a16:creationId xmlns:a16="http://schemas.microsoft.com/office/drawing/2014/main" xmlns="" id="{2F37F752-3B13-0B4A-932C-AC8DC2EAE62C}"/>
+              </a:ext>
+            </a:extLst>
+          </p:cNvPr>
+          <p:cNvGrpSpPr/>
+          <p:nvPr/>
+        </p:nvGrpSpPr>
+        <p:grpSpPr>
+          <a:xfrm>
+            <a:off x="5335996" y="2549109"/>
+            <a:ext cx="386296" cy="1098562"/>
+            <a:chOff x="6408118" y="2014454"/>
+            <a:chExt cx="386296" cy="1804583"/>
+          </a:xfrm>
+        </p:grpSpPr>
+        <p:sp>
+          <p:nvSpPr>
+            <p:cNvPr id="106" name="Round Same Side Corner Rectangle 50">
+              <a:extLst>
+                <a:ext uri="{FF2B5EF4-FFF2-40B4-BE49-F238E27FC236}">
+                  <a16:creationId xmlns:a16="http://schemas.microsoft.com/office/drawing/2014/main" xmlns="" id="{F82AB6F9-5D61-FB4D-BC89-F88A52F23D5F}"/>
+                </a:ext>
+              </a:extLst>
+            </p:cNvPr>
+            <p:cNvSpPr/>
+            <p:nvPr/>
+          </p:nvSpPr>
+          <p:spPr>
+            <a:xfrm rot="10800000">
+              <a:off x="6413929" y="2626755"/>
+              <a:ext cx="380481" cy="1192278"/>
+            </a:xfrm>
+            <a:prstGeom prst="round2SameRect">
+              <a:avLst>
+                <a:gd name="adj1" fmla="val 24382"/>
+                <a:gd name="adj2" fmla="val 0"/>
+              </a:avLst>
+            </a:prstGeom>
+            <a:solidFill>
+              <a:srgbClr val="CBD3D7">
+                <a:lumMod val="90000"/>
+              </a:srgbClr>
+            </a:solidFill>
+            <a:ln w="12700" cap="flat" cmpd="sng" algn="ctr">
+              <a:noFill/>
+              <a:prstDash val="solid"/>
+              <a:round/>
+            </a:ln>
+            <a:effectLst/>
+          </p:spPr>
+          <p:txBody>
+            <a:bodyPr rtlCol="0" anchor="ctr"/>
+            <a:lstStyle/>
+            <a:p>
+              <a:pPr marL="0" marR="0" lvl="0" indent="0" algn="ctr" defTabSz="914377" eaLnBrk="1" fontAlgn="auto" latinLnBrk="0" hangingPunct="1">
+                <a:lnSpc>
+                  <a:spcPct val="100000"/>
+                </a:lnSpc>
+                <a:spcBef>
+                  <a:spcPts val="0"/>
+                </a:spcBef>
+                <a:spcAft>
+                  <a:spcPts val="0"/>
+                </a:spcAft>
+                <a:buClrTx/>
+                <a:buSzTx/>
+                <a:buFontTx/>
+                <a:buNone/>
+                <a:tabLst/>
+                <a:defRPr/>
+              </a:pPr>
+              <a:endParaRPr kumimoji="0" lang="en-US" sz="1800" b="0" i="0" u="none" strike="noStrike" kern="0" cap="none" spc="0" normalizeH="0" baseline="0" noProof="0" smtClean="0">
                 <a:ln>
                   <a:noFill/>
                 </a:ln>
                 <a:solidFill>
-                  <a:srgbClr val="4B5357"/>
+                  <a:srgbClr val="FFFFFF"/>
                 </a:solidFill>
                 <a:effectLst/>
                 <a:uLnTx/>
                 <a:uFillTx/>
-                <a:latin typeface="Source Sans Pro Light" charset="0"/>
-                <a:ea typeface="Source Sans Pro Light" charset="0"/>
-                <a:cs typeface="Source Sans Pro Light" charset="0"/>
-              </a:rPr>
-              <a:t>RTOS Task 1</a:t>
-            </a:r>
-          </a:p>
-        </p:txBody>
-      </p:sp>
-      <p:sp>
-        <p:nvSpPr>
-          <p:cNvPr id="16" name="TextBox 15">
-            <a:extLst>
-              <a:ext uri="{FF2B5EF4-FFF2-40B4-BE49-F238E27FC236}">
-                <a16:creationId xmlns:a16="http://schemas.microsoft.com/office/drawing/2014/main" id="{5533C208-E75E-47C2-8951-CBF3D80E8EC0}"/>
-              </a:ext>
-            </a:extLst>
-          </p:cNvPr>
-          <p:cNvSpPr txBox="1"/>
-          <p:nvPr/>
-        </p:nvSpPr>
-        <p:spPr>
-          <a:xfrm>
-            <a:off x="4185081" y="5552999"/>
-            <a:ext cx="1929774" cy="276999"/>
-          </a:xfrm>
-          <a:prstGeom prst="rect">
-            <a:avLst/>
-          </a:prstGeom>
-          <a:noFill/>
-        </p:spPr>
-        <p:txBody>
-          <a:bodyPr wrap="square" lIns="108000" rIns="108000" rtlCol="0">
-            <a:spAutoFit/>
-          </a:bodyPr>
-          <a:lstStyle/>
-          <a:p>
-            <a:pPr marL="0" marR="0" lvl="0" indent="0" algn="ctr" defTabSz="914377" eaLnBrk="1" fontAlgn="auto" latinLnBrk="0" hangingPunct="1">
-              <a:lnSpc>
-                <a:spcPct val="100000"/>
-              </a:lnSpc>
-              <a:spcBef>
-                <a:spcPts val="0"/>
-              </a:spcBef>
-              <a:spcAft>
-                <a:spcPts val="0"/>
-              </a:spcAft>
-              <a:buClrTx/>
-              <a:buSzTx/>
-              <a:buFontTx/>
-              <a:buNone/>
-              <a:tabLst/>
-              <a:defRPr/>
-            </a:pPr>
-            <a:r>
-              <a:rPr kumimoji="0" lang="en-US" sz="1200" b="1" i="0" u="none" strike="noStrike" kern="0" cap="none" spc="0" normalizeH="0" baseline="0" noProof="0" dirty="0">
-                <a:ln>
-                  <a:noFill/>
-                </a:ln>
-                <a:solidFill>
-                  <a:srgbClr val="4B5357"/>
-                </a:solidFill>
-                <a:effectLst/>
-                <a:uLnTx/>
-                <a:uFillTx/>
-                <a:latin typeface="Source Sans Pro Light" charset="0"/>
-                <a:ea typeface="Source Sans Pro Light" charset="0"/>
-                <a:cs typeface="Source Sans Pro Light" charset="0"/>
-              </a:rPr>
-              <a:t>RTOS Task 2</a:t>
-            </a:r>
-          </a:p>
-        </p:txBody>
-      </p:sp>
-      <p:sp>
-        <p:nvSpPr>
-          <p:cNvPr id="17" name="TextBox 16">
-            <a:extLst>
-              <a:ext uri="{FF2B5EF4-FFF2-40B4-BE49-F238E27FC236}">
-                <a16:creationId xmlns:a16="http://schemas.microsoft.com/office/drawing/2014/main" id="{3119A948-3F9C-4893-AF3A-3321449F8158}"/>
-              </a:ext>
-            </a:extLst>
-          </p:cNvPr>
-          <p:cNvSpPr txBox="1"/>
-          <p:nvPr/>
-        </p:nvSpPr>
-        <p:spPr>
-          <a:xfrm>
-            <a:off x="5437999" y="5553000"/>
-            <a:ext cx="1929774" cy="276999"/>
-          </a:xfrm>
-          <a:prstGeom prst="rect">
-            <a:avLst/>
-          </a:prstGeom>
-          <a:noFill/>
-        </p:spPr>
-        <p:txBody>
-          <a:bodyPr wrap="square" lIns="108000" rIns="108000" rtlCol="0">
-            <a:spAutoFit/>
-          </a:bodyPr>
-          <a:lstStyle/>
-          <a:p>
-            <a:pPr marL="0" marR="0" lvl="0" indent="0" algn="ctr" defTabSz="914377" eaLnBrk="1" fontAlgn="auto" latinLnBrk="0" hangingPunct="1">
-              <a:lnSpc>
-                <a:spcPct val="100000"/>
-              </a:lnSpc>
-              <a:spcBef>
-                <a:spcPts val="0"/>
-              </a:spcBef>
-              <a:spcAft>
-                <a:spcPts val="0"/>
-              </a:spcAft>
-              <a:buClrTx/>
-              <a:buSzTx/>
-              <a:buFontTx/>
-              <a:buNone/>
-              <a:tabLst/>
-              <a:defRPr/>
-            </a:pPr>
-            <a:r>
-              <a:rPr kumimoji="0" lang="en-US" sz="1200" b="1" i="0" u="none" strike="noStrike" kern="0" cap="none" spc="0" normalizeH="0" baseline="0" noProof="0" dirty="0">
-                <a:ln>
-                  <a:noFill/>
-                </a:ln>
-                <a:solidFill>
-                  <a:srgbClr val="4B5357"/>
-                </a:solidFill>
-                <a:effectLst/>
-                <a:uLnTx/>
-                <a:uFillTx/>
-                <a:latin typeface="Source Sans Pro Light" charset="0"/>
-                <a:ea typeface="Source Sans Pro Light" charset="0"/>
-                <a:cs typeface="Source Sans Pro Light" charset="0"/>
-              </a:rPr>
-              <a:t>RTOS Task 3</a:t>
-            </a:r>
-          </a:p>
-        </p:txBody>
-      </p:sp>
-      <p:sp>
-        <p:nvSpPr>
-          <p:cNvPr id="18" name="TextBox 17">
-            <a:extLst>
-              <a:ext uri="{FF2B5EF4-FFF2-40B4-BE49-F238E27FC236}">
-                <a16:creationId xmlns:a16="http://schemas.microsoft.com/office/drawing/2014/main" id="{FC5679C5-36D1-4757-8EDF-EBDB82829E97}"/>
-              </a:ext>
-            </a:extLst>
-          </p:cNvPr>
-          <p:cNvSpPr txBox="1"/>
-          <p:nvPr/>
-        </p:nvSpPr>
-        <p:spPr>
-          <a:xfrm>
-            <a:off x="6690917" y="5553000"/>
-            <a:ext cx="1929774" cy="276999"/>
-          </a:xfrm>
-          <a:prstGeom prst="rect">
-            <a:avLst/>
-          </a:prstGeom>
-          <a:noFill/>
-        </p:spPr>
-        <p:txBody>
-          <a:bodyPr wrap="square" lIns="108000" rIns="108000" rtlCol="0">
-            <a:spAutoFit/>
-          </a:bodyPr>
-          <a:lstStyle/>
-          <a:p>
-            <a:pPr marL="0" marR="0" lvl="0" indent="0" algn="ctr" defTabSz="914377" eaLnBrk="1" fontAlgn="auto" latinLnBrk="0" hangingPunct="1">
-              <a:lnSpc>
-                <a:spcPct val="100000"/>
-              </a:lnSpc>
-              <a:spcBef>
-                <a:spcPts val="0"/>
-              </a:spcBef>
-              <a:spcAft>
-                <a:spcPts val="0"/>
-              </a:spcAft>
-              <a:buClrTx/>
-              <a:buSzTx/>
-              <a:buFontTx/>
-              <a:buNone/>
-              <a:tabLst/>
-              <a:defRPr/>
-            </a:pPr>
-            <a:r>
-              <a:rPr kumimoji="0" lang="en-US" sz="1200" b="1" i="0" u="none" strike="noStrike" kern="0" cap="none" spc="0" normalizeH="0" baseline="0" noProof="0" dirty="0">
-                <a:ln>
-                  <a:noFill/>
-                </a:ln>
-                <a:solidFill>
-                  <a:srgbClr val="4B5357"/>
-                </a:solidFill>
-                <a:effectLst/>
-                <a:uLnTx/>
-                <a:uFillTx/>
-                <a:latin typeface="Source Sans Pro Light" charset="0"/>
-                <a:ea typeface="Source Sans Pro Light" charset="0"/>
-                <a:cs typeface="Source Sans Pro Light" charset="0"/>
-              </a:rPr>
-              <a:t>RTOS Task 4</a:t>
-            </a:r>
-          </a:p>
-        </p:txBody>
-      </p:sp>
+                <a:latin typeface="Calibri Light"/>
+                <a:ea typeface="+mn-ea"/>
+                <a:cs typeface="+mn-cs"/>
+              </a:endParaRPr>
+            </a:p>
+          </p:txBody>
+        </p:sp>
+        <p:sp>
+          <p:nvSpPr>
+            <p:cNvPr id="107" name="Rounded Rectangle 106">
+              <a:extLst>
+                <a:ext uri="{FF2B5EF4-FFF2-40B4-BE49-F238E27FC236}">
+                  <a16:creationId xmlns:a16="http://schemas.microsoft.com/office/drawing/2014/main" xmlns="" id="{2F4AC810-C170-1B4F-A3BD-67C24993C9E1}"/>
+                </a:ext>
+              </a:extLst>
+            </p:cNvPr>
+            <p:cNvSpPr/>
+            <p:nvPr/>
+          </p:nvSpPr>
+          <p:spPr>
+            <a:xfrm rot="16200000">
+              <a:off x="5698974" y="2723598"/>
+              <a:ext cx="1804583" cy="386296"/>
+            </a:xfrm>
+            <a:prstGeom prst="roundRect">
+              <a:avLst>
+                <a:gd name="adj" fmla="val 17902"/>
+              </a:avLst>
+            </a:prstGeom>
+            <a:noFill/>
+            <a:ln w="12700" cap="flat" cmpd="sng" algn="ctr">
+              <a:noFill/>
+              <a:prstDash val="solid"/>
+            </a:ln>
+            <a:effectLst/>
+          </p:spPr>
+          <p:txBody>
+            <a:bodyPr lIns="72000" tIns="0" rIns="0" bIns="0" rtlCol="0" anchor="ctr"/>
+            <a:lstStyle/>
+            <a:p>
+              <a:pPr marL="0" marR="0" lvl="0" indent="0" defTabSz="914377" eaLnBrk="1" fontAlgn="auto" latinLnBrk="0" hangingPunct="1">
+                <a:lnSpc>
+                  <a:spcPct val="100000"/>
+                </a:lnSpc>
+                <a:spcBef>
+                  <a:spcPts val="0"/>
+                </a:spcBef>
+                <a:spcAft>
+                  <a:spcPts val="0"/>
+                </a:spcAft>
+                <a:buClrTx/>
+                <a:buSzTx/>
+                <a:buFontTx/>
+                <a:buNone/>
+                <a:tabLst/>
+                <a:defRPr/>
+              </a:pPr>
+              <a:r>
+                <a:rPr kumimoji="0" lang="en-US" sz="1200" b="0" i="0" u="none" strike="noStrike" kern="0" cap="none" spc="0" normalizeH="0" baseline="0" noProof="0" dirty="0" smtClean="0">
+                  <a:ln>
+                    <a:noFill/>
+                  </a:ln>
+                  <a:solidFill>
+                    <a:srgbClr val="4B5357"/>
+                  </a:solidFill>
+                  <a:effectLst/>
+                  <a:uLnTx/>
+                  <a:uFillTx/>
+                  <a:latin typeface="Source Sans Pro" panose="020B0503030403020204" pitchFamily="34" charset="0"/>
+                  <a:ea typeface="Source Sans Pro" panose="020B0503030403020204" pitchFamily="34" charset="0"/>
+                  <a:cs typeface="+mn-cs"/>
+                </a:rPr>
+                <a:t>Task 03 stack</a:t>
+              </a:r>
+            </a:p>
+          </p:txBody>
+        </p:sp>
+      </p:grpSp>
     </p:spTree>
     <p:extLst>
       <p:ext uri="{BB962C8B-B14F-4D97-AF65-F5344CB8AC3E}">

</xml_diff>